<commit_message>
edits part 4 080221
</commit_message>
<xml_diff>
--- a/docs/images/SIOS Protection Suite architecture.pptx
+++ b/docs/images/SIOS Protection Suite architecture.pptx
@@ -3545,8 +3545,8 @@
         </p:nvSpPr>
         <p:spPr>
           <a:xfrm>
-            <a:off x="2899579" y="1942075"/>
-            <a:ext cx="3577277" cy="1035522"/>
+            <a:off x="2799088" y="1942075"/>
+            <a:ext cx="3754111" cy="1035522"/>
           </a:xfrm>
           <a:prstGeom prst="rect">
             <a:avLst/>
@@ -4535,7 +4535,7 @@
         </p:nvSpPr>
         <p:spPr>
           <a:xfrm>
-            <a:off x="1730901" y="2510978"/>
+            <a:off x="1676400" y="2510978"/>
             <a:ext cx="1236442" cy="276999"/>
           </a:xfrm>
           <a:prstGeom prst="rect">
@@ -4614,7 +4614,7 @@
         </p:blipFill>
         <p:spPr>
           <a:xfrm>
-            <a:off x="2114172" y="2032718"/>
+            <a:off x="2059671" y="2032718"/>
             <a:ext cx="469900" cy="469900"/>
           </a:xfrm>
           <a:prstGeom prst="rect">
@@ -4673,7 +4673,7 @@
         <p:spPr>
           <a:xfrm>
             <a:off x="2667000" y="4092822"/>
-            <a:ext cx="1513305" cy="276999"/>
+            <a:ext cx="1513305" cy="461665"/>
           </a:xfrm>
           <a:prstGeom prst="rect">
             <a:avLst/>
@@ -4718,7 +4718,24 @@
                 <a:ea typeface="Amazon Ember" panose="020B0603020204020204" pitchFamily="34" charset="0"/>
                 <a:cs typeface="Arial" panose="020B0604020202020204" pitchFamily="34" charset="0"/>
               </a:rPr>
-              <a:t>Cluster node 1</a:t>
+              <a:t>SIOS Protection</a:t>
+            </a:r>
+            <a:r>
+              <a:rPr kumimoji="0" lang="en-US" sz="1200" b="0" i="0" u="none" strike="noStrike" kern="1200" cap="none" spc="0" normalizeH="0" noProof="0" dirty="0" smtClean="0">
+                <a:ln>
+                  <a:noFill/>
+                </a:ln>
+                <a:solidFill>
+                  <a:prstClr val="black"/>
+                </a:solidFill>
+                <a:effectLst/>
+                <a:uLnTx/>
+                <a:uFillTx/>
+                <a:latin typeface="Arial" panose="020B0604020202020204" pitchFamily="34" charset="0"/>
+                <a:ea typeface="Amazon Ember" panose="020B0603020204020204" pitchFamily="34" charset="0"/>
+                <a:cs typeface="Arial" panose="020B0604020202020204" pitchFamily="34" charset="0"/>
+              </a:rPr>
+              <a:t> Suite for Linux</a:t>
             </a:r>
             <a:endParaRPr kumimoji="0" lang="en-US" sz="1200" b="0" i="0" u="none" strike="noStrike" kern="1200" cap="none" spc="0" normalizeH="0" baseline="0" noProof="0" dirty="0">
               <a:ln>
@@ -4751,8 +4768,8 @@
         </p:nvSpPr>
         <p:spPr>
           <a:xfrm>
-            <a:off x="2899579" y="3585857"/>
-            <a:ext cx="3577277" cy="833743"/>
+            <a:off x="2799088" y="3585857"/>
+            <a:ext cx="3754111" cy="953693"/>
           </a:xfrm>
           <a:prstGeom prst="rect">
             <a:avLst/>
@@ -5355,9 +5372,9 @@
         <p:grpSpPr>
           <a:xfrm>
             <a:off x="5138928" y="2032718"/>
-            <a:ext cx="1513305" cy="2337103"/>
+            <a:ext cx="1513305" cy="2521769"/>
             <a:chOff x="5105400" y="2032718"/>
-            <a:chExt cx="1513305" cy="2337103"/>
+            <a:chExt cx="1513305" cy="2521769"/>
           </a:xfrm>
         </p:grpSpPr>
         <p:pic>
@@ -5411,7 +5428,7 @@
           <p:spPr>
             <a:xfrm>
               <a:off x="5105400" y="4092822"/>
-              <a:ext cx="1513305" cy="276999"/>
+              <a:ext cx="1513305" cy="461665"/>
             </a:xfrm>
             <a:prstGeom prst="rect">
               <a:avLst/>
@@ -5456,7 +5473,24 @@
                   <a:ea typeface="Amazon Ember" panose="020B0603020204020204" pitchFamily="34" charset="0"/>
                   <a:cs typeface="Arial" panose="020B0604020202020204" pitchFamily="34" charset="0"/>
                 </a:rPr>
-                <a:t>Cluster node 2</a:t>
+                <a:t>SIOS Protection</a:t>
+              </a:r>
+              <a:r>
+                <a:rPr kumimoji="0" lang="en-US" sz="1200" b="0" i="0" u="none" strike="noStrike" kern="1200" cap="none" spc="0" normalizeH="0" noProof="0" dirty="0" smtClean="0">
+                  <a:ln>
+                    <a:noFill/>
+                  </a:ln>
+                  <a:solidFill>
+                    <a:prstClr val="black"/>
+                  </a:solidFill>
+                  <a:effectLst/>
+                  <a:uLnTx/>
+                  <a:uFillTx/>
+                  <a:latin typeface="Arial" panose="020B0604020202020204" pitchFamily="34" charset="0"/>
+                  <a:ea typeface="Amazon Ember" panose="020B0603020204020204" pitchFamily="34" charset="0"/>
+                  <a:cs typeface="Arial" panose="020B0604020202020204" pitchFamily="34" charset="0"/>
+                </a:rPr>
+                <a:t> Suite for Linux</a:t>
               </a:r>
               <a:endParaRPr kumimoji="0" lang="en-US" sz="1200" b="0" i="0" u="none" strike="noStrike" kern="1200" cap="none" spc="0" normalizeH="0" baseline="0" noProof="0" dirty="0">
                 <a:ln>
@@ -5641,7 +5675,7 @@
         </p:nvSpPr>
         <p:spPr>
           <a:xfrm flipH="1">
-            <a:off x="6374185" y="2510978"/>
+            <a:off x="6459758" y="2510978"/>
             <a:ext cx="1236442" cy="276999"/>
           </a:xfrm>
           <a:prstGeom prst="rect">
@@ -5720,7 +5754,7 @@
         </p:blipFill>
         <p:spPr>
           <a:xfrm>
-            <a:off x="6757456" y="2032718"/>
+            <a:off x="6843029" y="2032718"/>
             <a:ext cx="469900" cy="469900"/>
           </a:xfrm>
           <a:prstGeom prst="rect">

</xml_diff>

<commit_message>
Production doc builds - 2021/08/03 21:57:23 UTC
</commit_message>
<xml_diff>
--- a/docs/images/SIOS Protection Suite architecture.pptx
+++ b/docs/images/SIOS Protection Suite architecture.pptx
@@ -4,8 +4,11 @@
   <p:sldMasterIdLst>
     <p:sldMasterId id="2147483648" r:id="rId1"/>
   </p:sldMasterIdLst>
+  <p:notesMasterIdLst>
+    <p:notesMasterId r:id="rId3"/>
+  </p:notesMasterIdLst>
   <p:sldIdLst>
-    <p:sldId id="256" r:id="rId2"/>
+    <p:sldId id="258" r:id="rId2"/>
   </p:sldIdLst>
   <p:sldSz cx="12192000" cy="6858000"/>
   <p:notesSz cx="6858000" cy="9144000"/>
@@ -112,6 +115,440 @@
 </p:presentation>
 </file>
 
+<file path=ppt/notesMasters/notesMaster1.xml><?xml version="1.0" encoding="utf-8"?>
+<p:notesMaster xmlns:a="http://schemas.openxmlformats.org/drawingml/2006/main" xmlns:r="http://schemas.openxmlformats.org/officeDocument/2006/relationships" xmlns:p="http://schemas.openxmlformats.org/presentationml/2006/main">
+  <p:cSld>
+    <p:bg>
+      <p:bgRef idx="1001">
+        <a:schemeClr val="bg1"/>
+      </p:bgRef>
+    </p:bg>
+    <p:spTree>
+      <p:nvGrpSpPr>
+        <p:cNvPr id="1" name=""/>
+        <p:cNvGrpSpPr/>
+        <p:nvPr/>
+      </p:nvGrpSpPr>
+      <p:grpSpPr>
+        <a:xfrm>
+          <a:off x="0" y="0"/>
+          <a:ext cx="0" cy="0"/>
+          <a:chOff x="0" y="0"/>
+          <a:chExt cx="0" cy="0"/>
+        </a:xfrm>
+      </p:grpSpPr>
+      <p:sp>
+        <p:nvSpPr>
+          <p:cNvPr id="2" name="Header Placeholder 1"/>
+          <p:cNvSpPr>
+            <a:spLocks noGrp="1"/>
+          </p:cNvSpPr>
+          <p:nvPr>
+            <p:ph type="hdr" sz="quarter"/>
+          </p:nvPr>
+        </p:nvSpPr>
+        <p:spPr>
+          <a:xfrm>
+            <a:off x="0" y="0"/>
+            <a:ext cx="2971800" cy="458788"/>
+          </a:xfrm>
+          <a:prstGeom prst="rect">
+            <a:avLst/>
+          </a:prstGeom>
+        </p:spPr>
+        <p:txBody>
+          <a:bodyPr vert="horz" lIns="91440" tIns="45720" rIns="91440" bIns="45720" rtlCol="0"/>
+          <a:lstStyle>
+            <a:lvl1pPr algn="l">
+              <a:defRPr sz="1200"/>
+            </a:lvl1pPr>
+          </a:lstStyle>
+          <a:p>
+            <a:endParaRPr lang="en-US"/>
+          </a:p>
+        </p:txBody>
+      </p:sp>
+      <p:sp>
+        <p:nvSpPr>
+          <p:cNvPr id="3" name="Date Placeholder 2"/>
+          <p:cNvSpPr>
+            <a:spLocks noGrp="1"/>
+          </p:cNvSpPr>
+          <p:nvPr>
+            <p:ph type="dt" idx="1"/>
+          </p:nvPr>
+        </p:nvSpPr>
+        <p:spPr>
+          <a:xfrm>
+            <a:off x="3884613" y="0"/>
+            <a:ext cx="2971800" cy="458788"/>
+          </a:xfrm>
+          <a:prstGeom prst="rect">
+            <a:avLst/>
+          </a:prstGeom>
+        </p:spPr>
+        <p:txBody>
+          <a:bodyPr vert="horz" lIns="91440" tIns="45720" rIns="91440" bIns="45720" rtlCol="0"/>
+          <a:lstStyle>
+            <a:lvl1pPr algn="r">
+              <a:defRPr sz="1200"/>
+            </a:lvl1pPr>
+          </a:lstStyle>
+          <a:p>
+            <a:fld id="{DDA22B2B-E623-4DF3-A755-253FAC27032F}" type="datetimeFigureOut">
+              <a:rPr lang="en-US" smtClean="0"/>
+              <a:t>8/2/2021</a:t>
+            </a:fld>
+            <a:endParaRPr lang="en-US"/>
+          </a:p>
+        </p:txBody>
+      </p:sp>
+      <p:sp>
+        <p:nvSpPr>
+          <p:cNvPr id="4" name="Slide Image Placeholder 3"/>
+          <p:cNvSpPr>
+            <a:spLocks noGrp="1" noRot="1" noChangeAspect="1"/>
+          </p:cNvSpPr>
+          <p:nvPr>
+            <p:ph type="sldImg" idx="2"/>
+          </p:nvPr>
+        </p:nvSpPr>
+        <p:spPr>
+          <a:xfrm>
+            <a:off x="685800" y="1143000"/>
+            <a:ext cx="5486400" cy="3086100"/>
+          </a:xfrm>
+          <a:prstGeom prst="rect">
+            <a:avLst/>
+          </a:prstGeom>
+          <a:noFill/>
+          <a:ln w="12700">
+            <a:solidFill>
+              <a:prstClr val="black"/>
+            </a:solidFill>
+          </a:ln>
+        </p:spPr>
+        <p:txBody>
+          <a:bodyPr vert="horz" lIns="91440" tIns="45720" rIns="91440" bIns="45720" rtlCol="0" anchor="ctr"/>
+          <a:lstStyle/>
+          <a:p>
+            <a:endParaRPr lang="en-US"/>
+          </a:p>
+        </p:txBody>
+      </p:sp>
+      <p:sp>
+        <p:nvSpPr>
+          <p:cNvPr id="5" name="Notes Placeholder 4"/>
+          <p:cNvSpPr>
+            <a:spLocks noGrp="1"/>
+          </p:cNvSpPr>
+          <p:nvPr>
+            <p:ph type="body" sz="quarter" idx="3"/>
+          </p:nvPr>
+        </p:nvSpPr>
+        <p:spPr>
+          <a:xfrm>
+            <a:off x="685800" y="4400550"/>
+            <a:ext cx="5486400" cy="3600450"/>
+          </a:xfrm>
+          <a:prstGeom prst="rect">
+            <a:avLst/>
+          </a:prstGeom>
+        </p:spPr>
+        <p:txBody>
+          <a:bodyPr vert="horz" lIns="91440" tIns="45720" rIns="91440" bIns="45720" rtlCol="0"/>
+          <a:lstStyle/>
+          <a:p>
+            <a:pPr lvl="0"/>
+            <a:r>
+              <a:rPr lang="en-US" smtClean="0"/>
+              <a:t>Edit Master text styles</a:t>
+            </a:r>
+          </a:p>
+          <a:p>
+            <a:pPr lvl="1"/>
+            <a:r>
+              <a:rPr lang="en-US" smtClean="0"/>
+              <a:t>Second level</a:t>
+            </a:r>
+          </a:p>
+          <a:p>
+            <a:pPr lvl="2"/>
+            <a:r>
+              <a:rPr lang="en-US" smtClean="0"/>
+              <a:t>Third level</a:t>
+            </a:r>
+          </a:p>
+          <a:p>
+            <a:pPr lvl="3"/>
+            <a:r>
+              <a:rPr lang="en-US" smtClean="0"/>
+              <a:t>Fourth level</a:t>
+            </a:r>
+          </a:p>
+          <a:p>
+            <a:pPr lvl="4"/>
+            <a:r>
+              <a:rPr lang="en-US" smtClean="0"/>
+              <a:t>Fifth level</a:t>
+            </a:r>
+            <a:endParaRPr lang="en-US"/>
+          </a:p>
+        </p:txBody>
+      </p:sp>
+      <p:sp>
+        <p:nvSpPr>
+          <p:cNvPr id="6" name="Footer Placeholder 5"/>
+          <p:cNvSpPr>
+            <a:spLocks noGrp="1"/>
+          </p:cNvSpPr>
+          <p:nvPr>
+            <p:ph type="ftr" sz="quarter" idx="4"/>
+          </p:nvPr>
+        </p:nvSpPr>
+        <p:spPr>
+          <a:xfrm>
+            <a:off x="0" y="8685213"/>
+            <a:ext cx="2971800" cy="458787"/>
+          </a:xfrm>
+          <a:prstGeom prst="rect">
+            <a:avLst/>
+          </a:prstGeom>
+        </p:spPr>
+        <p:txBody>
+          <a:bodyPr vert="horz" lIns="91440" tIns="45720" rIns="91440" bIns="45720" rtlCol="0" anchor="b"/>
+          <a:lstStyle>
+            <a:lvl1pPr algn="l">
+              <a:defRPr sz="1200"/>
+            </a:lvl1pPr>
+          </a:lstStyle>
+          <a:p>
+            <a:endParaRPr lang="en-US"/>
+          </a:p>
+        </p:txBody>
+      </p:sp>
+      <p:sp>
+        <p:nvSpPr>
+          <p:cNvPr id="7" name="Slide Number Placeholder 6"/>
+          <p:cNvSpPr>
+            <a:spLocks noGrp="1"/>
+          </p:cNvSpPr>
+          <p:nvPr>
+            <p:ph type="sldNum" sz="quarter" idx="5"/>
+          </p:nvPr>
+        </p:nvSpPr>
+        <p:spPr>
+          <a:xfrm>
+            <a:off x="3884613" y="8685213"/>
+            <a:ext cx="2971800" cy="458787"/>
+          </a:xfrm>
+          <a:prstGeom prst="rect">
+            <a:avLst/>
+          </a:prstGeom>
+        </p:spPr>
+        <p:txBody>
+          <a:bodyPr vert="horz" lIns="91440" tIns="45720" rIns="91440" bIns="45720" rtlCol="0" anchor="b"/>
+          <a:lstStyle>
+            <a:lvl1pPr algn="r">
+              <a:defRPr sz="1200"/>
+            </a:lvl1pPr>
+          </a:lstStyle>
+          <a:p>
+            <a:fld id="{AAC8DD1B-2708-4BFD-9168-B0056FD2D881}" type="slidenum">
+              <a:rPr lang="en-US" smtClean="0"/>
+              <a:t>‹#›</a:t>
+            </a:fld>
+            <a:endParaRPr lang="en-US"/>
+          </a:p>
+        </p:txBody>
+      </p:sp>
+    </p:spTree>
+    <p:extLst>
+      <p:ext uri="{BB962C8B-B14F-4D97-AF65-F5344CB8AC3E}">
+        <p14:creationId xmlns:p14="http://schemas.microsoft.com/office/powerpoint/2010/main" val="2186120604"/>
+      </p:ext>
+    </p:extLst>
+  </p:cSld>
+  <p:clrMap bg1="lt1" tx1="dk1" bg2="lt2" tx2="dk2" accent1="accent1" accent2="accent2" accent3="accent3" accent4="accent4" accent5="accent5" accent6="accent6" hlink="hlink" folHlink="folHlink"/>
+  <p:notesStyle>
+    <a:lvl1pPr marL="0" algn="l" defTabSz="914400" rtl="0" eaLnBrk="1" latinLnBrk="0" hangingPunct="1">
+      <a:defRPr sz="1200" kern="1200">
+        <a:solidFill>
+          <a:schemeClr val="tx1"/>
+        </a:solidFill>
+        <a:latin typeface="+mn-lt"/>
+        <a:ea typeface="+mn-ea"/>
+        <a:cs typeface="+mn-cs"/>
+      </a:defRPr>
+    </a:lvl1pPr>
+    <a:lvl2pPr marL="457200" algn="l" defTabSz="914400" rtl="0" eaLnBrk="1" latinLnBrk="0" hangingPunct="1">
+      <a:defRPr sz="1200" kern="1200">
+        <a:solidFill>
+          <a:schemeClr val="tx1"/>
+        </a:solidFill>
+        <a:latin typeface="+mn-lt"/>
+        <a:ea typeface="+mn-ea"/>
+        <a:cs typeface="+mn-cs"/>
+      </a:defRPr>
+    </a:lvl2pPr>
+    <a:lvl3pPr marL="914400" algn="l" defTabSz="914400" rtl="0" eaLnBrk="1" latinLnBrk="0" hangingPunct="1">
+      <a:defRPr sz="1200" kern="1200">
+        <a:solidFill>
+          <a:schemeClr val="tx1"/>
+        </a:solidFill>
+        <a:latin typeface="+mn-lt"/>
+        <a:ea typeface="+mn-ea"/>
+        <a:cs typeface="+mn-cs"/>
+      </a:defRPr>
+    </a:lvl3pPr>
+    <a:lvl4pPr marL="1371600" algn="l" defTabSz="914400" rtl="0" eaLnBrk="1" latinLnBrk="0" hangingPunct="1">
+      <a:defRPr sz="1200" kern="1200">
+        <a:solidFill>
+          <a:schemeClr val="tx1"/>
+        </a:solidFill>
+        <a:latin typeface="+mn-lt"/>
+        <a:ea typeface="+mn-ea"/>
+        <a:cs typeface="+mn-cs"/>
+      </a:defRPr>
+    </a:lvl4pPr>
+    <a:lvl5pPr marL="1828800" algn="l" defTabSz="914400" rtl="0" eaLnBrk="1" latinLnBrk="0" hangingPunct="1">
+      <a:defRPr sz="1200" kern="1200">
+        <a:solidFill>
+          <a:schemeClr val="tx1"/>
+        </a:solidFill>
+        <a:latin typeface="+mn-lt"/>
+        <a:ea typeface="+mn-ea"/>
+        <a:cs typeface="+mn-cs"/>
+      </a:defRPr>
+    </a:lvl5pPr>
+    <a:lvl6pPr marL="2286000" algn="l" defTabSz="914400" rtl="0" eaLnBrk="1" latinLnBrk="0" hangingPunct="1">
+      <a:defRPr sz="1200" kern="1200">
+        <a:solidFill>
+          <a:schemeClr val="tx1"/>
+        </a:solidFill>
+        <a:latin typeface="+mn-lt"/>
+        <a:ea typeface="+mn-ea"/>
+        <a:cs typeface="+mn-cs"/>
+      </a:defRPr>
+    </a:lvl6pPr>
+    <a:lvl7pPr marL="2743200" algn="l" defTabSz="914400" rtl="0" eaLnBrk="1" latinLnBrk="0" hangingPunct="1">
+      <a:defRPr sz="1200" kern="1200">
+        <a:solidFill>
+          <a:schemeClr val="tx1"/>
+        </a:solidFill>
+        <a:latin typeface="+mn-lt"/>
+        <a:ea typeface="+mn-ea"/>
+        <a:cs typeface="+mn-cs"/>
+      </a:defRPr>
+    </a:lvl7pPr>
+    <a:lvl8pPr marL="3200400" algn="l" defTabSz="914400" rtl="0" eaLnBrk="1" latinLnBrk="0" hangingPunct="1">
+      <a:defRPr sz="1200" kern="1200">
+        <a:solidFill>
+          <a:schemeClr val="tx1"/>
+        </a:solidFill>
+        <a:latin typeface="+mn-lt"/>
+        <a:ea typeface="+mn-ea"/>
+        <a:cs typeface="+mn-cs"/>
+      </a:defRPr>
+    </a:lvl8pPr>
+    <a:lvl9pPr marL="3657600" algn="l" defTabSz="914400" rtl="0" eaLnBrk="1" latinLnBrk="0" hangingPunct="1">
+      <a:defRPr sz="1200" kern="1200">
+        <a:solidFill>
+          <a:schemeClr val="tx1"/>
+        </a:solidFill>
+        <a:latin typeface="+mn-lt"/>
+        <a:ea typeface="+mn-ea"/>
+        <a:cs typeface="+mn-cs"/>
+      </a:defRPr>
+    </a:lvl9pPr>
+  </p:notesStyle>
+</p:notesMaster>
+</file>
+
+<file path=ppt/notesSlides/notesSlide1.xml><?xml version="1.0" encoding="utf-8"?>
+<p:notes xmlns:a="http://schemas.openxmlformats.org/drawingml/2006/main" xmlns:r="http://schemas.openxmlformats.org/officeDocument/2006/relationships" xmlns:p="http://schemas.openxmlformats.org/presentationml/2006/main">
+  <p:cSld>
+    <p:spTree>
+      <p:nvGrpSpPr>
+        <p:cNvPr id="1" name=""/>
+        <p:cNvGrpSpPr/>
+        <p:nvPr/>
+      </p:nvGrpSpPr>
+      <p:grpSpPr>
+        <a:xfrm>
+          <a:off x="0" y="0"/>
+          <a:ext cx="0" cy="0"/>
+          <a:chOff x="0" y="0"/>
+          <a:chExt cx="0" cy="0"/>
+        </a:xfrm>
+      </p:grpSpPr>
+      <p:sp>
+        <p:nvSpPr>
+          <p:cNvPr id="2" name="Slide Image Placeholder 1"/>
+          <p:cNvSpPr>
+            <a:spLocks noGrp="1" noRot="1" noChangeAspect="1"/>
+          </p:cNvSpPr>
+          <p:nvPr>
+            <p:ph type="sldImg"/>
+          </p:nvPr>
+        </p:nvSpPr>
+        <p:spPr/>
+      </p:sp>
+      <p:sp>
+        <p:nvSpPr>
+          <p:cNvPr id="3" name="Notes Placeholder 2"/>
+          <p:cNvSpPr>
+            <a:spLocks noGrp="1"/>
+          </p:cNvSpPr>
+          <p:nvPr>
+            <p:ph type="body" idx="1"/>
+          </p:nvPr>
+        </p:nvSpPr>
+        <p:spPr/>
+        <p:txBody>
+          <a:bodyPr/>
+          <a:lstStyle/>
+          <a:p>
+            <a:endParaRPr lang="en-US" dirty="0"/>
+          </a:p>
+        </p:txBody>
+      </p:sp>
+      <p:sp>
+        <p:nvSpPr>
+          <p:cNvPr id="4" name="Slide Number Placeholder 3"/>
+          <p:cNvSpPr>
+            <a:spLocks noGrp="1"/>
+          </p:cNvSpPr>
+          <p:nvPr>
+            <p:ph type="sldNum" sz="quarter" idx="10"/>
+          </p:nvPr>
+        </p:nvSpPr>
+        <p:spPr/>
+        <p:txBody>
+          <a:bodyPr/>
+          <a:lstStyle/>
+          <a:p>
+            <a:fld id="{AAC8DD1B-2708-4BFD-9168-B0056FD2D881}" type="slidenum">
+              <a:rPr lang="en-US" smtClean="0"/>
+              <a:t>1</a:t>
+            </a:fld>
+            <a:endParaRPr lang="en-US"/>
+          </a:p>
+        </p:txBody>
+      </p:sp>
+    </p:spTree>
+    <p:extLst>
+      <p:ext uri="{BB962C8B-B14F-4D97-AF65-F5344CB8AC3E}">
+        <p14:creationId xmlns:p14="http://schemas.microsoft.com/office/powerpoint/2010/main" val="786090769"/>
+      </p:ext>
+    </p:extLst>
+  </p:cSld>
+  <p:clrMapOvr>
+    <a:masterClrMapping/>
+  </p:clrMapOvr>
+</p:notes>
+</file>
+
 <file path=ppt/slideLayouts/slideLayout1.xml><?xml version="1.0" encoding="utf-8"?>
 <p:sldLayout xmlns:a="http://schemas.openxmlformats.org/drawingml/2006/main" xmlns:r="http://schemas.openxmlformats.org/officeDocument/2006/relationships" xmlns:p="http://schemas.openxmlformats.org/presentationml/2006/main" type="title" preserve="1">
   <p:cSld name="Title Slide">
@@ -243,7 +680,7 @@
           <a:p>
             <a:fld id="{B1E5028E-09A8-4225-BF6F-265C8079DC33}" type="datetimeFigureOut">
               <a:rPr lang="en-US" smtClean="0"/>
-              <a:t>7/23/2021</a:t>
+              <a:t>8/2/2021</a:t>
             </a:fld>
             <a:endParaRPr lang="en-US"/>
           </a:p>
@@ -413,7 +850,7 @@
           <a:p>
             <a:fld id="{B1E5028E-09A8-4225-BF6F-265C8079DC33}" type="datetimeFigureOut">
               <a:rPr lang="en-US" smtClean="0"/>
-              <a:t>7/23/2021</a:t>
+              <a:t>8/2/2021</a:t>
             </a:fld>
             <a:endParaRPr lang="en-US"/>
           </a:p>
@@ -593,7 +1030,7 @@
           <a:p>
             <a:fld id="{B1E5028E-09A8-4225-BF6F-265C8079DC33}" type="datetimeFigureOut">
               <a:rPr lang="en-US" smtClean="0"/>
-              <a:t>7/23/2021</a:t>
+              <a:t>8/2/2021</a:t>
             </a:fld>
             <a:endParaRPr lang="en-US"/>
           </a:p>
@@ -763,7 +1200,7 @@
           <a:p>
             <a:fld id="{B1E5028E-09A8-4225-BF6F-265C8079DC33}" type="datetimeFigureOut">
               <a:rPr lang="en-US" smtClean="0"/>
-              <a:t>7/23/2021</a:t>
+              <a:t>8/2/2021</a:t>
             </a:fld>
             <a:endParaRPr lang="en-US"/>
           </a:p>
@@ -1009,7 +1446,7 @@
           <a:p>
             <a:fld id="{B1E5028E-09A8-4225-BF6F-265C8079DC33}" type="datetimeFigureOut">
               <a:rPr lang="en-US" smtClean="0"/>
-              <a:t>7/23/2021</a:t>
+              <a:t>8/2/2021</a:t>
             </a:fld>
             <a:endParaRPr lang="en-US"/>
           </a:p>
@@ -1241,7 +1678,7 @@
           <a:p>
             <a:fld id="{B1E5028E-09A8-4225-BF6F-265C8079DC33}" type="datetimeFigureOut">
               <a:rPr lang="en-US" smtClean="0"/>
-              <a:t>7/23/2021</a:t>
+              <a:t>8/2/2021</a:t>
             </a:fld>
             <a:endParaRPr lang="en-US"/>
           </a:p>
@@ -1608,7 +2045,7 @@
           <a:p>
             <a:fld id="{B1E5028E-09A8-4225-BF6F-265C8079DC33}" type="datetimeFigureOut">
               <a:rPr lang="en-US" smtClean="0"/>
-              <a:t>7/23/2021</a:t>
+              <a:t>8/2/2021</a:t>
             </a:fld>
             <a:endParaRPr lang="en-US"/>
           </a:p>
@@ -1726,7 +2163,7 @@
           <a:p>
             <a:fld id="{B1E5028E-09A8-4225-BF6F-265C8079DC33}" type="datetimeFigureOut">
               <a:rPr lang="en-US" smtClean="0"/>
-              <a:t>7/23/2021</a:t>
+              <a:t>8/2/2021</a:t>
             </a:fld>
             <a:endParaRPr lang="en-US"/>
           </a:p>
@@ -1821,7 +2258,7 @@
           <a:p>
             <a:fld id="{B1E5028E-09A8-4225-BF6F-265C8079DC33}" type="datetimeFigureOut">
               <a:rPr lang="en-US" smtClean="0"/>
-              <a:t>7/23/2021</a:t>
+              <a:t>8/2/2021</a:t>
             </a:fld>
             <a:endParaRPr lang="en-US"/>
           </a:p>
@@ -2098,7 +2535,7 @@
           <a:p>
             <a:fld id="{B1E5028E-09A8-4225-BF6F-265C8079DC33}" type="datetimeFigureOut">
               <a:rPr lang="en-US" smtClean="0"/>
-              <a:t>7/23/2021</a:t>
+              <a:t>8/2/2021</a:t>
             </a:fld>
             <a:endParaRPr lang="en-US"/>
           </a:p>
@@ -2351,7 +2788,7 @@
           <a:p>
             <a:fld id="{B1E5028E-09A8-4225-BF6F-265C8079DC33}" type="datetimeFigureOut">
               <a:rPr lang="en-US" smtClean="0"/>
-              <a:t>7/23/2021</a:t>
+              <a:t>8/2/2021</a:t>
             </a:fld>
             <a:endParaRPr lang="en-US"/>
           </a:p>
@@ -2564,7 +3001,7 @@
           <a:p>
             <a:fld id="{B1E5028E-09A8-4225-BF6F-265C8079DC33}" type="datetimeFigureOut">
               <a:rPr lang="en-US" smtClean="0"/>
-              <a:t>7/23/2021</a:t>
+              <a:t>8/2/2021</a:t>
             </a:fld>
             <a:endParaRPr lang="en-US"/>
           </a:p>
@@ -2983,8 +3420,8 @@
         </p:nvSpPr>
         <p:spPr>
           <a:xfrm>
-            <a:off x="588108" y="685800"/>
-            <a:ext cx="9317892" cy="4800600"/>
+            <a:off x="848378" y="457200"/>
+            <a:ext cx="8981422" cy="4724400"/>
           </a:xfrm>
           <a:prstGeom prst="rect">
             <a:avLst/>
@@ -3021,12 +3458,34 @@
           </a:bodyPr>
           <a:lstStyle/>
           <a:p>
-            <a:pPr algn="l"/>
-            <a:r>
-              <a:rPr lang="en-US" sz="1200" dirty="0">
+            <a:pPr marL="0" marR="0" lvl="0" indent="0" algn="l" defTabSz="914400" rtl="0" eaLnBrk="1" fontAlgn="auto" latinLnBrk="0" hangingPunct="1">
+              <a:lnSpc>
+                <a:spcPct val="100000"/>
+              </a:lnSpc>
+              <a:spcBef>
+                <a:spcPts val="0"/>
+              </a:spcBef>
+              <a:spcAft>
+                <a:spcPts val="0"/>
+              </a:spcAft>
+              <a:buClrTx/>
+              <a:buSzTx/>
+              <a:buFontTx/>
+              <a:buNone/>
+              <a:tabLst/>
+              <a:defRPr/>
+            </a:pPr>
+            <a:r>
+              <a:rPr kumimoji="0" lang="en-US" sz="1200" b="0" i="0" u="none" strike="noStrike" kern="1200" cap="none" spc="0" normalizeH="0" baseline="0" noProof="0" dirty="0">
+                <a:ln>
+                  <a:noFill/>
+                </a:ln>
                 <a:solidFill>
                   <a:sysClr val="windowText" lastClr="000000"/>
                 </a:solidFill>
+                <a:effectLst/>
+                <a:uLnTx/>
+                <a:uFillTx/>
                 <a:latin typeface="Arial" panose="020B0604020202020204" pitchFamily="34" charset="0"/>
                 <a:ea typeface="Amazon Ember" panose="020B0603020204020204" pitchFamily="34" charset="0"/>
                 <a:cs typeface="Arial" panose="020B0604020202020204" pitchFamily="34" charset="0"/>
@@ -3051,10 +3510,10 @@
           <p:nvPr/>
         </p:nvPicPr>
         <p:blipFill>
-          <a:blip r:embed="rId2">
+          <a:blip r:embed="rId3">
             <a:extLst>
               <a:ext uri="{96DAC541-7B7A-43D3-8B79-37D633B846F1}">
-                <asvg:svgBlip xmlns="" xmlns:asvg="http://schemas.microsoft.com/office/drawing/2016/SVG/main" r:embed="rId3"/>
+                <asvg:svgBlip xmlns="" xmlns:asvg="http://schemas.microsoft.com/office/drawing/2016/SVG/main" r:embed="rId4"/>
               </a:ext>
             </a:extLst>
           </a:blip>
@@ -3064,7 +3523,7 @@
         </p:blipFill>
         <p:spPr>
           <a:xfrm>
-            <a:off x="588108" y="697523"/>
+            <a:off x="848378" y="457200"/>
             <a:ext cx="330200" cy="330200"/>
           </a:xfrm>
           <a:prstGeom prst="rect">
@@ -3072,6 +3531,523 @@
           </a:prstGeom>
         </p:spPr>
       </p:pic>
+      <p:sp>
+        <p:nvSpPr>
+          <p:cNvPr id="10" name="Rectangle 9">
+            <a:extLst>
+              <a:ext uri="{FF2B5EF4-FFF2-40B4-BE49-F238E27FC236}">
+                <a16:creationId xmlns:a16="http://schemas.microsoft.com/office/drawing/2014/main" id="{25B2706C-95D8-A94F-9EC8-6497FA7FB136}"/>
+              </a:ext>
+            </a:extLst>
+          </p:cNvPr>
+          <p:cNvSpPr/>
+          <p:nvPr/>
+        </p:nvSpPr>
+        <p:spPr>
+          <a:xfrm>
+            <a:off x="2799088" y="1942075"/>
+            <a:ext cx="3754111" cy="1035522"/>
+          </a:xfrm>
+          <a:prstGeom prst="rect">
+            <a:avLst/>
+          </a:prstGeom>
+          <a:noFill/>
+          <a:ln w="12700">
+            <a:solidFill>
+              <a:srgbClr val="D86613"/>
+            </a:solidFill>
+            <a:prstDash val="dash"/>
+          </a:ln>
+        </p:spPr>
+        <p:style>
+          <a:lnRef idx="2">
+            <a:schemeClr val="accent1">
+              <a:shade val="50000"/>
+            </a:schemeClr>
+          </a:lnRef>
+          <a:fillRef idx="1">
+            <a:schemeClr val="accent1"/>
+          </a:fillRef>
+          <a:effectRef idx="0">
+            <a:schemeClr val="accent1"/>
+          </a:effectRef>
+          <a:fontRef idx="minor">
+            <a:schemeClr val="lt1"/>
+          </a:fontRef>
+        </p:style>
+        <p:txBody>
+          <a:bodyPr rot="0" spcFirstLastPara="0" vertOverflow="overflow" horzOverflow="overflow" vert="horz" wrap="square" lIns="91440" tIns="91440" rIns="91440" bIns="45720" numCol="1" spcCol="0" rtlCol="0" fromWordArt="0" anchor="t" anchorCtr="0" forceAA="0" compatLnSpc="1">
+            <a:prstTxWarp prst="textNoShape">
+              <a:avLst/>
+            </a:prstTxWarp>
+            <a:noAutofit/>
+          </a:bodyPr>
+          <a:lstStyle/>
+          <a:p>
+            <a:pPr marL="0" marR="0" lvl="0" indent="0" algn="ctr" defTabSz="914400" rtl="0" eaLnBrk="1" fontAlgn="auto" latinLnBrk="0" hangingPunct="1">
+              <a:lnSpc>
+                <a:spcPct val="100000"/>
+              </a:lnSpc>
+              <a:spcBef>
+                <a:spcPts val="0"/>
+              </a:spcBef>
+              <a:spcAft>
+                <a:spcPts val="0"/>
+              </a:spcAft>
+              <a:buClrTx/>
+              <a:buSzTx/>
+              <a:buFontTx/>
+              <a:buNone/>
+              <a:tabLst/>
+              <a:defRPr/>
+            </a:pPr>
+            <a:endParaRPr kumimoji="0" lang="en-US" sz="1200" b="0" i="0" u="none" strike="noStrike" kern="1200" cap="none" spc="0" normalizeH="0" baseline="0" noProof="0" dirty="0">
+              <a:ln>
+                <a:noFill/>
+              </a:ln>
+              <a:solidFill>
+                <a:srgbClr val="D86613"/>
+              </a:solidFill>
+              <a:effectLst/>
+              <a:uLnTx/>
+              <a:uFillTx/>
+              <a:latin typeface="Arial" panose="020B0604020202020204" pitchFamily="34" charset="0"/>
+              <a:ea typeface="Amazon Ember" panose="020B0603020204020204" pitchFamily="34" charset="0"/>
+              <a:cs typeface="Arial" panose="020B0604020202020204" pitchFamily="34" charset="0"/>
+            </a:endParaRPr>
+          </a:p>
+          <a:p>
+            <a:pPr marL="0" marR="0" lvl="0" indent="0" algn="ctr" defTabSz="914400" rtl="0" eaLnBrk="1" fontAlgn="auto" latinLnBrk="0" hangingPunct="1">
+              <a:lnSpc>
+                <a:spcPct val="100000"/>
+              </a:lnSpc>
+              <a:spcBef>
+                <a:spcPts val="0"/>
+              </a:spcBef>
+              <a:spcAft>
+                <a:spcPts val="0"/>
+              </a:spcAft>
+              <a:buClrTx/>
+              <a:buSzTx/>
+              <a:buFontTx/>
+              <a:buNone/>
+              <a:tabLst/>
+              <a:defRPr/>
+            </a:pPr>
+            <a:endParaRPr kumimoji="0" lang="en-US" sz="1200" b="0" i="0" u="none" strike="noStrike" kern="1200" cap="none" spc="0" normalizeH="0" baseline="0" noProof="0" dirty="0">
+              <a:ln>
+                <a:noFill/>
+              </a:ln>
+              <a:solidFill>
+                <a:srgbClr val="D86613"/>
+              </a:solidFill>
+              <a:effectLst/>
+              <a:uLnTx/>
+              <a:uFillTx/>
+              <a:latin typeface="Arial" panose="020B0604020202020204" pitchFamily="34" charset="0"/>
+              <a:ea typeface="Amazon Ember" panose="020B0603020204020204" pitchFamily="34" charset="0"/>
+              <a:cs typeface="Arial" panose="020B0604020202020204" pitchFamily="34" charset="0"/>
+            </a:endParaRPr>
+          </a:p>
+          <a:p>
+            <a:pPr marL="0" marR="0" lvl="0" indent="0" algn="ctr" defTabSz="914400" rtl="0" eaLnBrk="1" fontAlgn="auto" latinLnBrk="0" hangingPunct="1">
+              <a:lnSpc>
+                <a:spcPct val="100000"/>
+              </a:lnSpc>
+              <a:spcBef>
+                <a:spcPts val="0"/>
+              </a:spcBef>
+              <a:spcAft>
+                <a:spcPts val="0"/>
+              </a:spcAft>
+              <a:buClrTx/>
+              <a:buSzTx/>
+              <a:buFontTx/>
+              <a:buNone/>
+              <a:tabLst/>
+              <a:defRPr/>
+            </a:pPr>
+            <a:r>
+              <a:rPr kumimoji="0" lang="en-US" sz="1200" b="0" i="0" u="none" strike="noStrike" kern="1200" cap="none" spc="0" normalizeH="0" baseline="0" noProof="0" dirty="0">
+                <a:ln>
+                  <a:noFill/>
+                </a:ln>
+                <a:solidFill>
+                  <a:srgbClr val="D86613"/>
+                </a:solidFill>
+                <a:effectLst/>
+                <a:uLnTx/>
+                <a:uFillTx/>
+                <a:latin typeface="Arial" panose="020B0604020202020204" pitchFamily="34" charset="0"/>
+                <a:ea typeface="Amazon Ember" panose="020B0603020204020204" pitchFamily="34" charset="0"/>
+                <a:cs typeface="Arial" panose="020B0604020202020204" pitchFamily="34" charset="0"/>
+              </a:rPr>
+              <a:t>Auto </a:t>
+            </a:r>
+            <a:r>
+              <a:rPr kumimoji="0" lang="en-US" sz="1200" b="0" i="0" u="none" strike="noStrike" kern="1200" cap="none" spc="0" normalizeH="0" baseline="0" noProof="0" dirty="0" smtClean="0">
+                <a:ln>
+                  <a:noFill/>
+                </a:ln>
+                <a:solidFill>
+                  <a:srgbClr val="D86613"/>
+                </a:solidFill>
+                <a:effectLst/>
+                <a:uLnTx/>
+                <a:uFillTx/>
+                <a:latin typeface="Arial" panose="020B0604020202020204" pitchFamily="34" charset="0"/>
+                <a:ea typeface="Amazon Ember" panose="020B0603020204020204" pitchFamily="34" charset="0"/>
+                <a:cs typeface="Arial" panose="020B0604020202020204" pitchFamily="34" charset="0"/>
+              </a:rPr>
+              <a:t>Scaling</a:t>
+            </a:r>
+          </a:p>
+          <a:p>
+            <a:pPr marL="0" marR="0" lvl="0" indent="0" algn="ctr" defTabSz="914400" rtl="0" eaLnBrk="1" fontAlgn="auto" latinLnBrk="0" hangingPunct="1">
+              <a:lnSpc>
+                <a:spcPct val="100000"/>
+              </a:lnSpc>
+              <a:spcBef>
+                <a:spcPts val="0"/>
+              </a:spcBef>
+              <a:spcAft>
+                <a:spcPts val="0"/>
+              </a:spcAft>
+              <a:buClrTx/>
+              <a:buSzTx/>
+              <a:buFontTx/>
+              <a:buNone/>
+              <a:tabLst/>
+              <a:defRPr/>
+            </a:pPr>
+            <a:r>
+              <a:rPr kumimoji="0" lang="en-US" sz="1200" b="0" i="0" u="none" strike="noStrike" kern="1200" cap="none" spc="0" normalizeH="0" baseline="0" noProof="0" dirty="0" smtClean="0">
+                <a:ln>
+                  <a:noFill/>
+                </a:ln>
+                <a:solidFill>
+                  <a:srgbClr val="D86613"/>
+                </a:solidFill>
+                <a:effectLst/>
+                <a:uLnTx/>
+                <a:uFillTx/>
+                <a:latin typeface="Arial" panose="020B0604020202020204" pitchFamily="34" charset="0"/>
+                <a:ea typeface="Amazon Ember" panose="020B0603020204020204" pitchFamily="34" charset="0"/>
+                <a:cs typeface="Arial" panose="020B0604020202020204" pitchFamily="34" charset="0"/>
+              </a:rPr>
+              <a:t>group</a:t>
+            </a:r>
+            <a:endParaRPr kumimoji="0" lang="en-US" sz="1200" b="0" i="0" u="none" strike="noStrike" kern="1200" cap="none" spc="0" normalizeH="0" baseline="0" noProof="0" dirty="0">
+              <a:ln>
+                <a:noFill/>
+              </a:ln>
+              <a:solidFill>
+                <a:srgbClr val="D86613"/>
+              </a:solidFill>
+              <a:effectLst/>
+              <a:uLnTx/>
+              <a:uFillTx/>
+              <a:latin typeface="Arial" panose="020B0604020202020204" pitchFamily="34" charset="0"/>
+              <a:ea typeface="Amazon Ember" panose="020B0603020204020204" pitchFamily="34" charset="0"/>
+              <a:cs typeface="Arial" panose="020B0604020202020204" pitchFamily="34" charset="0"/>
+            </a:endParaRPr>
+          </a:p>
+        </p:txBody>
+      </p:sp>
+      <p:pic>
+        <p:nvPicPr>
+          <p:cNvPr id="11" name="Graphic 3">
+            <a:extLst>
+              <a:ext uri="{FF2B5EF4-FFF2-40B4-BE49-F238E27FC236}">
+                <a16:creationId xmlns:a16="http://schemas.microsoft.com/office/drawing/2014/main" id="{D7A7873E-A1CC-804E-816C-DC0FF152D82D}"/>
+              </a:ext>
+            </a:extLst>
+          </p:cNvPr>
+          <p:cNvPicPr>
+            <a:picLocks noChangeAspect="1"/>
+          </p:cNvPicPr>
+          <p:nvPr/>
+        </p:nvPicPr>
+        <p:blipFill>
+          <a:blip r:embed="rId5">
+            <a:extLst>
+              <a:ext uri="{96DAC541-7B7A-43D3-8B79-37D633B846F1}">
+                <asvg:svgBlip xmlns="" xmlns:asvg="http://schemas.microsoft.com/office/drawing/2016/SVG/main" r:embed="rId11"/>
+              </a:ext>
+            </a:extLst>
+          </a:blip>
+          <a:stretch>
+            <a:fillRect/>
+          </a:stretch>
+        </p:blipFill>
+        <p:spPr>
+          <a:xfrm>
+            <a:off x="4523117" y="1935264"/>
+            <a:ext cx="330200" cy="330200"/>
+          </a:xfrm>
+          <a:prstGeom prst="rect">
+            <a:avLst/>
+          </a:prstGeom>
+        </p:spPr>
+      </p:pic>
+      <p:sp>
+        <p:nvSpPr>
+          <p:cNvPr id="39" name="Rectangle 38">
+            <a:extLst>
+              <a:ext uri="{FF2B5EF4-FFF2-40B4-BE49-F238E27FC236}">
+                <a16:creationId xmlns:a16="http://schemas.microsoft.com/office/drawing/2014/main" id="{34D72B91-09F3-9A42-B66A-106F01CCE8B4}"/>
+              </a:ext>
+            </a:extLst>
+          </p:cNvPr>
+          <p:cNvSpPr/>
+          <p:nvPr/>
+        </p:nvSpPr>
+        <p:spPr>
+          <a:xfrm>
+            <a:off x="1178578" y="1214882"/>
+            <a:ext cx="6898622" cy="3661918"/>
+          </a:xfrm>
+          <a:prstGeom prst="rect">
+            <a:avLst/>
+          </a:prstGeom>
+          <a:noFill/>
+          <a:ln w="12700">
+            <a:solidFill>
+              <a:srgbClr val="1E8900"/>
+            </a:solidFill>
+          </a:ln>
+        </p:spPr>
+        <p:style>
+          <a:lnRef idx="2">
+            <a:schemeClr val="accent1">
+              <a:shade val="50000"/>
+            </a:schemeClr>
+          </a:lnRef>
+          <a:fillRef idx="1">
+            <a:schemeClr val="accent1"/>
+          </a:fillRef>
+          <a:effectRef idx="0">
+            <a:schemeClr val="accent1"/>
+          </a:effectRef>
+          <a:fontRef idx="minor">
+            <a:schemeClr val="lt1"/>
+          </a:fontRef>
+        </p:style>
+        <p:txBody>
+          <a:bodyPr lIns="457200" tIns="91440"/>
+          <a:lstStyle/>
+          <a:p>
+            <a:pPr marL="0" marR="0" lvl="0" indent="0" algn="l" defTabSz="914400" rtl="0" eaLnBrk="1" fontAlgn="auto" latinLnBrk="0" hangingPunct="1">
+              <a:lnSpc>
+                <a:spcPct val="100000"/>
+              </a:lnSpc>
+              <a:spcBef>
+                <a:spcPts val="0"/>
+              </a:spcBef>
+              <a:spcAft>
+                <a:spcPts val="0"/>
+              </a:spcAft>
+              <a:buClrTx/>
+              <a:buSzTx/>
+              <a:buFontTx/>
+              <a:buNone/>
+              <a:tabLst/>
+              <a:defRPr/>
+            </a:pPr>
+            <a:r>
+              <a:rPr kumimoji="0" lang="en-US" sz="1200" b="0" i="0" u="none" strike="noStrike" kern="1200" cap="none" spc="0" normalizeH="0" baseline="0" noProof="0" dirty="0">
+                <a:ln w="0"/>
+                <a:solidFill>
+                  <a:srgbClr val="1E8900"/>
+                </a:solidFill>
+                <a:effectLst/>
+                <a:uLnTx/>
+                <a:uFillTx/>
+                <a:latin typeface="Arial" panose="020B0604020202020204" pitchFamily="34" charset="0"/>
+                <a:ea typeface="+mn-ea"/>
+                <a:cs typeface="Arial" panose="020B0604020202020204" pitchFamily="34" charset="0"/>
+              </a:rPr>
+              <a:t>VPC</a:t>
+            </a:r>
+          </a:p>
+        </p:txBody>
+      </p:sp>
+      <p:pic>
+        <p:nvPicPr>
+          <p:cNvPr id="40" name="Graphic 28">
+            <a:extLst>
+              <a:ext uri="{FF2B5EF4-FFF2-40B4-BE49-F238E27FC236}">
+                <a16:creationId xmlns:a16="http://schemas.microsoft.com/office/drawing/2014/main" id="{88C69878-A4A8-CE45-B624-0223CB16619E}"/>
+              </a:ext>
+            </a:extLst>
+          </p:cNvPr>
+          <p:cNvPicPr>
+            <a:picLocks noChangeAspect="1" noChangeArrowheads="1"/>
+          </p:cNvPicPr>
+          <p:nvPr/>
+        </p:nvPicPr>
+        <p:blipFill>
+          <a:blip r:embed="rId12" cstate="print">
+            <a:extLst>
+              <a:ext uri="{28A0092B-C50C-407E-A947-70E740481C1C}">
+                <a14:useLocalDpi xmlns:a14="http://schemas.microsoft.com/office/drawing/2010/main" val="0"/>
+              </a:ext>
+            </a:extLst>
+          </a:blip>
+          <a:srcRect/>
+          <a:stretch>
+            <a:fillRect/>
+          </a:stretch>
+        </p:blipFill>
+        <p:spPr bwMode="auto">
+          <a:xfrm>
+            <a:off x="1178578" y="1214882"/>
+            <a:ext cx="330200" cy="330200"/>
+          </a:xfrm>
+          <a:prstGeom prst="rect">
+            <a:avLst/>
+          </a:prstGeom>
+          <a:noFill/>
+          <a:ln>
+            <a:noFill/>
+          </a:ln>
+          <a:extLst>
+            <a:ext uri="{909E8E84-426E-40DD-AFC4-6F175D3DCCD1}">
+              <a14:hiddenFill xmlns:a14="http://schemas.microsoft.com/office/drawing/2010/main">
+                <a:solidFill>
+                  <a:srgbClr val="FFFFFF"/>
+                </a:solidFill>
+              </a14:hiddenFill>
+            </a:ext>
+            <a:ext uri="{91240B29-F687-4F45-9708-019B960494DF}">
+              <a14:hiddenLine xmlns:a14="http://schemas.microsoft.com/office/drawing/2010/main" w="9525">
+                <a:solidFill>
+                  <a:srgbClr val="000000"/>
+                </a:solidFill>
+                <a:miter lim="800000"/>
+                <a:headEnd/>
+                <a:tailEnd/>
+              </a14:hiddenLine>
+            </a:ext>
+          </a:extLst>
+        </p:spPr>
+      </p:pic>
+      <p:sp>
+        <p:nvSpPr>
+          <p:cNvPr id="41" name="Rectangle 40">
+            <a:extLst>
+              <a:ext uri="{FF2B5EF4-FFF2-40B4-BE49-F238E27FC236}">
+                <a16:creationId xmlns:a16="http://schemas.microsoft.com/office/drawing/2014/main" id="{D246DAA1-0260-E449-8CA2-92FF0101149D}"/>
+              </a:ext>
+            </a:extLst>
+          </p:cNvPr>
+          <p:cNvSpPr/>
+          <p:nvPr/>
+        </p:nvSpPr>
+        <p:spPr>
+          <a:xfrm>
+            <a:off x="1611821" y="863600"/>
+            <a:ext cx="2502979" cy="4165600"/>
+          </a:xfrm>
+          <a:prstGeom prst="rect">
+            <a:avLst/>
+          </a:prstGeom>
+          <a:noFill/>
+          <a:ln w="12700">
+            <a:solidFill>
+              <a:srgbClr val="5B9CD5"/>
+            </a:solidFill>
+            <a:prstDash val="dash"/>
+          </a:ln>
+        </p:spPr>
+        <p:style>
+          <a:lnRef idx="2">
+            <a:schemeClr val="accent1">
+              <a:shade val="50000"/>
+            </a:schemeClr>
+          </a:lnRef>
+          <a:fillRef idx="1">
+            <a:schemeClr val="accent1"/>
+          </a:fillRef>
+          <a:effectRef idx="0">
+            <a:schemeClr val="accent1"/>
+          </a:effectRef>
+          <a:fontRef idx="minor">
+            <a:schemeClr val="lt1"/>
+          </a:fontRef>
+        </p:style>
+        <p:txBody>
+          <a:bodyPr tIns="91440"/>
+          <a:lstStyle/>
+          <a:p>
+            <a:pPr marL="0" marR="0" lvl="0" indent="0" algn="ctr" defTabSz="914400" rtl="0" eaLnBrk="1" fontAlgn="auto" latinLnBrk="0" hangingPunct="1">
+              <a:lnSpc>
+                <a:spcPct val="100000"/>
+              </a:lnSpc>
+              <a:spcBef>
+                <a:spcPts val="0"/>
+              </a:spcBef>
+              <a:spcAft>
+                <a:spcPts val="0"/>
+              </a:spcAft>
+              <a:buClrTx/>
+              <a:buSzTx/>
+              <a:buFontTx/>
+              <a:buNone/>
+              <a:tabLst/>
+              <a:defRPr/>
+            </a:pPr>
+            <a:r>
+              <a:rPr kumimoji="0" lang="en-US" sz="1200" b="0" i="0" u="none" strike="noStrike" kern="1200" cap="none" spc="0" normalizeH="0" baseline="0" noProof="0">
+                <a:ln>
+                  <a:noFill/>
+                </a:ln>
+                <a:solidFill>
+                  <a:srgbClr val="5B9CD5"/>
+                </a:solidFill>
+                <a:effectLst/>
+                <a:uLnTx/>
+                <a:uFillTx/>
+                <a:latin typeface="Arial" panose="020B0604020202020204" pitchFamily="34" charset="0"/>
+                <a:ea typeface="+mn-ea"/>
+                <a:cs typeface="Arial" panose="020B0604020202020204" pitchFamily="34" charset="0"/>
+              </a:rPr>
+              <a:t>Availability </a:t>
+            </a:r>
+            <a:r>
+              <a:rPr kumimoji="0" lang="en-US" sz="1200" b="0" i="0" u="none" strike="noStrike" kern="1200" cap="none" spc="0" normalizeH="0" baseline="0" noProof="0" smtClean="0">
+                <a:ln>
+                  <a:noFill/>
+                </a:ln>
+                <a:solidFill>
+                  <a:srgbClr val="5B9CD5"/>
+                </a:solidFill>
+                <a:effectLst/>
+                <a:uLnTx/>
+                <a:uFillTx/>
+                <a:latin typeface="Arial" panose="020B0604020202020204" pitchFamily="34" charset="0"/>
+                <a:ea typeface="+mn-ea"/>
+                <a:cs typeface="Arial" panose="020B0604020202020204" pitchFamily="34" charset="0"/>
+              </a:rPr>
+              <a:t>Zone 1</a:t>
+            </a:r>
+            <a:endParaRPr kumimoji="0" lang="en-US" sz="1200" b="0" i="0" u="none" strike="noStrike" kern="1200" cap="none" spc="0" normalizeH="0" baseline="0" noProof="0" dirty="0">
+              <a:ln>
+                <a:noFill/>
+              </a:ln>
+              <a:solidFill>
+                <a:srgbClr val="5B9CD5"/>
+              </a:solidFill>
+              <a:effectLst/>
+              <a:uLnTx/>
+              <a:uFillTx/>
+              <a:latin typeface="Arial" panose="020B0604020202020204" pitchFamily="34" charset="0"/>
+              <a:ea typeface="+mn-ea"/>
+              <a:cs typeface="Arial" panose="020B0604020202020204" pitchFamily="34" charset="0"/>
+            </a:endParaRPr>
+          </a:p>
+        </p:txBody>
+      </p:sp>
       <p:sp>
         <p:nvSpPr>
           <p:cNvPr id="6" name="Rectangle 5">
@@ -3086,8 +4062,8 @@
         </p:nvSpPr>
         <p:spPr>
           <a:xfrm>
-            <a:off x="1523999" y="1600200"/>
-            <a:ext cx="2743201" cy="1447800"/>
+            <a:off x="1691641" y="1600200"/>
+            <a:ext cx="2319949" cy="1447800"/>
           </a:xfrm>
           <a:prstGeom prst="rect">
             <a:avLst/>
@@ -3127,12 +4103,34 @@
           </a:bodyPr>
           <a:lstStyle/>
           <a:p>
-            <a:pPr algn="l"/>
-            <a:r>
-              <a:rPr lang="en-US" sz="1200" dirty="0">
+            <a:pPr marL="0" marR="0" lvl="0" indent="0" algn="l" defTabSz="914400" rtl="0" eaLnBrk="1" fontAlgn="auto" latinLnBrk="0" hangingPunct="1">
+              <a:lnSpc>
+                <a:spcPct val="100000"/>
+              </a:lnSpc>
+              <a:spcBef>
+                <a:spcPts val="0"/>
+              </a:spcBef>
+              <a:spcAft>
+                <a:spcPts val="0"/>
+              </a:spcAft>
+              <a:buClrTx/>
+              <a:buSzTx/>
+              <a:buFontTx/>
+              <a:buNone/>
+              <a:tabLst/>
+              <a:defRPr/>
+            </a:pPr>
+            <a:r>
+              <a:rPr kumimoji="0" lang="en-US" sz="1200" b="0" i="0" u="none" strike="noStrike" kern="1200" cap="none" spc="0" normalizeH="0" baseline="0" noProof="0" dirty="0">
+                <a:ln>
+                  <a:noFill/>
+                </a:ln>
                 <a:solidFill>
-                  <a:schemeClr val="accent6"/>
+                  <a:srgbClr val="70AD47"/>
                 </a:solidFill>
+                <a:effectLst/>
+                <a:uLnTx/>
+                <a:uFillTx/>
                 <a:latin typeface="Arial" panose="020B0604020202020204" pitchFamily="34" charset="0"/>
                 <a:ea typeface="Amazon Ember" panose="020B0603020204020204" pitchFamily="34" charset="0"/>
                 <a:cs typeface="Arial" panose="020B0604020202020204" pitchFamily="34" charset="0"/>
@@ -3141,11 +4139,33 @@
             </a:r>
           </a:p>
           <a:p>
-            <a:pPr algn="l"/>
-            <a:endParaRPr lang="en-US" sz="1200" dirty="0">
+            <a:pPr marL="0" marR="0" lvl="0" indent="0" algn="l" defTabSz="914400" rtl="0" eaLnBrk="1" fontAlgn="auto" latinLnBrk="0" hangingPunct="1">
+              <a:lnSpc>
+                <a:spcPct val="100000"/>
+              </a:lnSpc>
+              <a:spcBef>
+                <a:spcPts val="0"/>
+              </a:spcBef>
+              <a:spcAft>
+                <a:spcPts val="0"/>
+              </a:spcAft>
+              <a:buClrTx/>
+              <a:buSzTx/>
+              <a:buFontTx/>
+              <a:buNone/>
+              <a:tabLst/>
+              <a:defRPr/>
+            </a:pPr>
+            <a:endParaRPr kumimoji="0" lang="en-US" sz="1200" b="0" i="0" u="none" strike="noStrike" kern="1200" cap="none" spc="0" normalizeH="0" baseline="0" noProof="0" dirty="0">
+              <a:ln>
+                <a:noFill/>
+              </a:ln>
               <a:solidFill>
-                <a:schemeClr val="accent5"/>
+                <a:srgbClr val="4472C4"/>
               </a:solidFill>
+              <a:effectLst/>
+              <a:uLnTx/>
+              <a:uFillTx/>
               <a:latin typeface="Arial" panose="020B0604020202020204" pitchFamily="34" charset="0"/>
               <a:ea typeface="Amazon Ember" panose="020B0603020204020204" pitchFamily="34" charset="0"/>
               <a:cs typeface="Arial" panose="020B0604020202020204" pitchFamily="34" charset="0"/>
@@ -3168,7 +4188,7 @@
           <p:nvPr/>
         </p:nvPicPr>
         <p:blipFill>
-          <a:blip r:embed="rId4">
+          <a:blip r:embed="rId13">
             <a:extLst>
               <a:ext uri="{96DAC541-7B7A-43D3-8B79-37D633B846F1}">
                 <asvg:svgBlip xmlns="" xmlns:asvg="http://schemas.microsoft.com/office/drawing/2016/SVG/main" r:embed="rId7"/>
@@ -3181,7 +4201,7 @@
         </p:blipFill>
         <p:spPr>
           <a:xfrm>
-            <a:off x="1524000" y="1597841"/>
+            <a:off x="1691640" y="1600200"/>
             <a:ext cx="274320" cy="274320"/>
           </a:xfrm>
           <a:prstGeom prst="rect">
@@ -3203,8 +4223,8 @@
         </p:nvSpPr>
         <p:spPr>
           <a:xfrm>
-            <a:off x="1521068" y="3124200"/>
-            <a:ext cx="2746132" cy="1905000"/>
+            <a:off x="1691640" y="3124200"/>
+            <a:ext cx="2318483" cy="1676400"/>
           </a:xfrm>
           <a:prstGeom prst="rect">
             <a:avLst/>
@@ -3244,12 +4264,34 @@
           </a:bodyPr>
           <a:lstStyle/>
           <a:p>
-            <a:pPr algn="l"/>
-            <a:r>
-              <a:rPr lang="en-US" sz="1200" dirty="0">
+            <a:pPr marL="0" marR="0" lvl="0" indent="0" algn="l" defTabSz="914400" rtl="0" eaLnBrk="1" fontAlgn="auto" latinLnBrk="0" hangingPunct="1">
+              <a:lnSpc>
+                <a:spcPct val="100000"/>
+              </a:lnSpc>
+              <a:spcBef>
+                <a:spcPts val="0"/>
+              </a:spcBef>
+              <a:spcAft>
+                <a:spcPts val="0"/>
+              </a:spcAft>
+              <a:buClrTx/>
+              <a:buSzTx/>
+              <a:buFontTx/>
+              <a:buNone/>
+              <a:tabLst/>
+              <a:defRPr/>
+            </a:pPr>
+            <a:r>
+              <a:rPr kumimoji="0" lang="en-US" sz="1200" b="0" i="0" u="none" strike="noStrike" kern="1200" cap="none" spc="0" normalizeH="0" baseline="0" noProof="0" dirty="0">
+                <a:ln>
+                  <a:noFill/>
+                </a:ln>
                 <a:solidFill>
-                  <a:schemeClr val="accent1"/>
+                  <a:srgbClr val="5B9BD5"/>
                 </a:solidFill>
+                <a:effectLst/>
+                <a:uLnTx/>
+                <a:uFillTx/>
                 <a:latin typeface="Arial" panose="020B0604020202020204" pitchFamily="34" charset="0"/>
                 <a:ea typeface="Amazon Ember" panose="020B0603020204020204" pitchFamily="34" charset="0"/>
                 <a:cs typeface="Arial" panose="020B0604020202020204" pitchFamily="34" charset="0"/>
@@ -3258,11 +4300,33 @@
             </a:r>
           </a:p>
           <a:p>
-            <a:pPr algn="l"/>
-            <a:endParaRPr lang="en-US" sz="1200" dirty="0">
+            <a:pPr marL="0" marR="0" lvl="0" indent="0" algn="l" defTabSz="914400" rtl="0" eaLnBrk="1" fontAlgn="auto" latinLnBrk="0" hangingPunct="1">
+              <a:lnSpc>
+                <a:spcPct val="100000"/>
+              </a:lnSpc>
+              <a:spcBef>
+                <a:spcPts val="0"/>
+              </a:spcBef>
+              <a:spcAft>
+                <a:spcPts val="0"/>
+              </a:spcAft>
+              <a:buClrTx/>
+              <a:buSzTx/>
+              <a:buFontTx/>
+              <a:buNone/>
+              <a:tabLst/>
+              <a:defRPr/>
+            </a:pPr>
+            <a:endParaRPr kumimoji="0" lang="en-US" sz="1200" b="0" i="0" u="none" strike="noStrike" kern="1200" cap="none" spc="0" normalizeH="0" baseline="0" noProof="0" dirty="0">
+              <a:ln>
+                <a:noFill/>
+              </a:ln>
               <a:solidFill>
-                <a:schemeClr val="accent3"/>
+                <a:srgbClr val="A5A5A5"/>
               </a:solidFill>
+              <a:effectLst/>
+              <a:uLnTx/>
+              <a:uFillTx/>
               <a:latin typeface="Arial" panose="020B0604020202020204" pitchFamily="34" charset="0"/>
               <a:ea typeface="Amazon Ember" panose="020B0603020204020204" pitchFamily="34" charset="0"/>
               <a:cs typeface="Arial" panose="020B0604020202020204" pitchFamily="34" charset="0"/>
@@ -3285,7 +4349,7 @@
           <p:nvPr/>
         </p:nvPicPr>
         <p:blipFill>
-          <a:blip r:embed="rId8">
+          <a:blip r:embed="rId14">
             <a:extLst>
               <a:ext uri="{96DAC541-7B7A-43D3-8B79-37D633B846F1}">
                 <asvg:svgBlip xmlns="" xmlns:asvg="http://schemas.microsoft.com/office/drawing/2016/SVG/main" r:embed="rId9"/>
@@ -3298,167 +4362,8 @@
         </p:blipFill>
         <p:spPr>
           <a:xfrm>
-            <a:off x="1521069" y="3147646"/>
+            <a:off x="1691640" y="3121627"/>
             <a:ext cx="274320" cy="274320"/>
-          </a:xfrm>
-          <a:prstGeom prst="rect">
-            <a:avLst/>
-          </a:prstGeom>
-        </p:spPr>
-      </p:pic>
-      <p:sp>
-        <p:nvSpPr>
-          <p:cNvPr id="10" name="Rectangle 9">
-            <a:extLst>
-              <a:ext uri="{FF2B5EF4-FFF2-40B4-BE49-F238E27FC236}">
-                <a16:creationId xmlns:a16="http://schemas.microsoft.com/office/drawing/2014/main" id="{25B2706C-95D8-A94F-9EC8-6497FA7FB136}"/>
-              </a:ext>
-            </a:extLst>
-          </p:cNvPr>
-          <p:cNvSpPr/>
-          <p:nvPr/>
-        </p:nvSpPr>
-        <p:spPr>
-          <a:xfrm>
-            <a:off x="2971800" y="1828800"/>
-            <a:ext cx="3657600" cy="1143000"/>
-          </a:xfrm>
-          <a:prstGeom prst="rect">
-            <a:avLst/>
-          </a:prstGeom>
-          <a:noFill/>
-          <a:ln w="12700">
-            <a:solidFill>
-              <a:srgbClr val="D86613"/>
-            </a:solidFill>
-            <a:prstDash val="dash"/>
-          </a:ln>
-        </p:spPr>
-        <p:style>
-          <a:lnRef idx="2">
-            <a:schemeClr val="accent1">
-              <a:shade val="50000"/>
-            </a:schemeClr>
-          </a:lnRef>
-          <a:fillRef idx="1">
-            <a:schemeClr val="accent1"/>
-          </a:fillRef>
-          <a:effectRef idx="0">
-            <a:schemeClr val="accent1"/>
-          </a:effectRef>
-          <a:fontRef idx="minor">
-            <a:schemeClr val="lt1"/>
-          </a:fontRef>
-        </p:style>
-        <p:txBody>
-          <a:bodyPr rot="0" spcFirstLastPara="0" vertOverflow="overflow" horzOverflow="overflow" vert="horz" wrap="square" lIns="91440" tIns="91440" rIns="91440" bIns="45720" numCol="1" spcCol="0" rtlCol="0" fromWordArt="0" anchor="t" anchorCtr="0" forceAA="0" compatLnSpc="1">
-            <a:prstTxWarp prst="textNoShape">
-              <a:avLst/>
-            </a:prstTxWarp>
-            <a:noAutofit/>
-          </a:bodyPr>
-          <a:lstStyle/>
-          <a:p>
-            <a:pPr algn="ctr"/>
-            <a:endParaRPr lang="en-US" sz="1200" dirty="0">
-              <a:solidFill>
-                <a:srgbClr val="D86613"/>
-              </a:solidFill>
-              <a:latin typeface="Arial" panose="020B0604020202020204" pitchFamily="34" charset="0"/>
-              <a:ea typeface="Amazon Ember" panose="020B0603020204020204" pitchFamily="34" charset="0"/>
-              <a:cs typeface="Arial" panose="020B0604020202020204" pitchFamily="34" charset="0"/>
-            </a:endParaRPr>
-          </a:p>
-          <a:p>
-            <a:pPr algn="ctr"/>
-            <a:endParaRPr lang="en-US" sz="1200" dirty="0">
-              <a:solidFill>
-                <a:srgbClr val="D86613"/>
-              </a:solidFill>
-              <a:latin typeface="Arial" panose="020B0604020202020204" pitchFamily="34" charset="0"/>
-              <a:ea typeface="Amazon Ember" panose="020B0603020204020204" pitchFamily="34" charset="0"/>
-              <a:cs typeface="Arial" panose="020B0604020202020204" pitchFamily="34" charset="0"/>
-            </a:endParaRPr>
-          </a:p>
-          <a:p>
-            <a:pPr algn="ctr"/>
-            <a:r>
-              <a:rPr lang="en-US" sz="1200">
-                <a:solidFill>
-                  <a:srgbClr val="D86613"/>
-                </a:solidFill>
-                <a:latin typeface="Arial" panose="020B0604020202020204" pitchFamily="34" charset="0"/>
-                <a:ea typeface="Amazon Ember" panose="020B0603020204020204" pitchFamily="34" charset="0"/>
-                <a:cs typeface="Arial" panose="020B0604020202020204" pitchFamily="34" charset="0"/>
-              </a:rPr>
-              <a:t>Auto </a:t>
-            </a:r>
-            <a:r>
-              <a:rPr lang="en-US" sz="1200" smtClean="0">
-                <a:solidFill>
-                  <a:srgbClr val="D86613"/>
-                </a:solidFill>
-                <a:latin typeface="Arial" panose="020B0604020202020204" pitchFamily="34" charset="0"/>
-                <a:ea typeface="Amazon Ember" panose="020B0603020204020204" pitchFamily="34" charset="0"/>
-                <a:cs typeface="Arial" panose="020B0604020202020204" pitchFamily="34" charset="0"/>
-              </a:rPr>
-              <a:t>Scaling</a:t>
-            </a:r>
-          </a:p>
-          <a:p>
-            <a:pPr algn="ctr"/>
-            <a:r>
-              <a:rPr lang="en-US" sz="1200" smtClean="0">
-                <a:solidFill>
-                  <a:srgbClr val="D86613"/>
-                </a:solidFill>
-                <a:latin typeface="Arial" panose="020B0604020202020204" pitchFamily="34" charset="0"/>
-                <a:ea typeface="Amazon Ember" panose="020B0603020204020204" pitchFamily="34" charset="0"/>
-                <a:cs typeface="Arial" panose="020B0604020202020204" pitchFamily="34" charset="0"/>
-              </a:rPr>
-              <a:t>group</a:t>
-            </a:r>
-            <a:endParaRPr lang="en-US" sz="1200" dirty="0">
-              <a:solidFill>
-                <a:srgbClr val="D86613"/>
-              </a:solidFill>
-              <a:latin typeface="Arial" panose="020B0604020202020204" pitchFamily="34" charset="0"/>
-              <a:ea typeface="Amazon Ember" panose="020B0603020204020204" pitchFamily="34" charset="0"/>
-              <a:cs typeface="Arial" panose="020B0604020202020204" pitchFamily="34" charset="0"/>
-            </a:endParaRPr>
-          </a:p>
-        </p:txBody>
-      </p:sp>
-      <p:pic>
-        <p:nvPicPr>
-          <p:cNvPr id="11" name="Graphic 3">
-            <a:extLst>
-              <a:ext uri="{FF2B5EF4-FFF2-40B4-BE49-F238E27FC236}">
-                <a16:creationId xmlns:a16="http://schemas.microsoft.com/office/drawing/2014/main" id="{D7A7873E-A1CC-804E-816C-DC0FF152D82D}"/>
-              </a:ext>
-            </a:extLst>
-          </p:cNvPr>
-          <p:cNvPicPr>
-            <a:picLocks noChangeAspect="1"/>
-          </p:cNvPicPr>
-          <p:nvPr/>
-        </p:nvPicPr>
-        <p:blipFill>
-          <a:blip r:embed="rId10">
-            <a:extLst>
-              <a:ext uri="{96DAC541-7B7A-43D3-8B79-37D633B846F1}">
-                <asvg:svgBlip xmlns="" xmlns:asvg="http://schemas.microsoft.com/office/drawing/2016/SVG/main" r:embed="rId11"/>
-              </a:ext>
-            </a:extLst>
-          </a:blip>
-          <a:stretch>
-            <a:fillRect/>
-          </a:stretch>
-        </p:blipFill>
-        <p:spPr>
-          <a:xfrm>
-            <a:off x="4622800" y="1828800"/>
-            <a:ext cx="330200" cy="330200"/>
           </a:xfrm>
           <a:prstGeom prst="rect">
             <a:avLst/>
@@ -3480,10 +4385,10 @@
           <p:nvPr/>
         </p:nvPicPr>
         <p:blipFill>
-          <a:blip r:embed="rId12">
+          <a:blip r:embed="rId15">
             <a:extLst>
               <a:ext uri="{96DAC541-7B7A-43D3-8B79-37D633B846F1}">
-                <asvg:svgBlip xmlns="" xmlns:asvg="http://schemas.microsoft.com/office/drawing/2016/SVG/main" r:embed="rId13"/>
+                <asvg:svgBlip xmlns="" xmlns:asvg="http://schemas.microsoft.com/office/drawing/2016/SVG/main" r:embed="rId17"/>
               </a:ext>
             </a:extLst>
           </a:blip>
@@ -3493,7 +4398,7 @@
         </p:blipFill>
         <p:spPr>
           <a:xfrm>
-            <a:off x="3269735" y="2094808"/>
+            <a:off x="3188702" y="2032718"/>
             <a:ext cx="469900" cy="469900"/>
           </a:xfrm>
           <a:prstGeom prst="rect">
@@ -3515,8 +4420,8 @@
         </p:nvSpPr>
         <p:spPr>
           <a:xfrm>
-            <a:off x="2748033" y="2540217"/>
-            <a:ext cx="1513305" cy="276999"/>
+            <a:off x="2885049" y="2498439"/>
+            <a:ext cx="1077207" cy="461665"/>
           </a:xfrm>
           <a:prstGeom prst="rect">
             <a:avLst/>
@@ -3529,16 +4434,86 @@
           </a:bodyPr>
           <a:lstStyle/>
           <a:p>
-            <a:pPr algn="ctr"/>
-            <a:r>
-              <a:rPr lang="en-US" sz="1200" smtClean="0">
+            <a:pPr marL="0" marR="0" lvl="0" indent="0" algn="ctr" defTabSz="914400" rtl="0" eaLnBrk="1" fontAlgn="auto" latinLnBrk="0" hangingPunct="1">
+              <a:lnSpc>
+                <a:spcPct val="100000"/>
+              </a:lnSpc>
+              <a:spcBef>
+                <a:spcPts val="0"/>
+              </a:spcBef>
+              <a:spcAft>
+                <a:spcPts val="0"/>
+              </a:spcAft>
+              <a:buClrTx/>
+              <a:buSzTx/>
+              <a:buFontTx/>
+              <a:buNone/>
+              <a:tabLst/>
+              <a:defRPr/>
+            </a:pPr>
+            <a:r>
+              <a:rPr kumimoji="0" lang="en-US" sz="1200" b="0" i="0" u="none" strike="noStrike" kern="1200" cap="none" spc="0" normalizeH="0" baseline="0" noProof="0" dirty="0" smtClean="0">
+                <a:ln>
+                  <a:noFill/>
+                </a:ln>
+                <a:solidFill>
+                  <a:prstClr val="black"/>
+                </a:solidFill>
+                <a:effectLst/>
+                <a:uLnTx/>
+                <a:uFillTx/>
                 <a:latin typeface="Arial" panose="020B0604020202020204" pitchFamily="34" charset="0"/>
                 <a:ea typeface="Amazon Ember" panose="020B0603020204020204" pitchFamily="34" charset="0"/>
                 <a:cs typeface="Arial" panose="020B0604020202020204" pitchFamily="34" charset="0"/>
               </a:rPr>
-              <a:t>Linux Bastion</a:t>
-            </a:r>
-            <a:endParaRPr lang="en-US" sz="1200" dirty="0">
+              <a:t>Linux</a:t>
+            </a:r>
+          </a:p>
+          <a:p>
+            <a:pPr marL="0" marR="0" lvl="0" indent="0" algn="ctr" defTabSz="914400" rtl="0" eaLnBrk="1" fontAlgn="auto" latinLnBrk="0" hangingPunct="1">
+              <a:lnSpc>
+                <a:spcPct val="100000"/>
+              </a:lnSpc>
+              <a:spcBef>
+                <a:spcPts val="0"/>
+              </a:spcBef>
+              <a:spcAft>
+                <a:spcPts val="0"/>
+              </a:spcAft>
+              <a:buClrTx/>
+              <a:buSzTx/>
+              <a:buFontTx/>
+              <a:buNone/>
+              <a:tabLst/>
+              <a:defRPr/>
+            </a:pPr>
+            <a:r>
+              <a:rPr kumimoji="0" lang="en-US" sz="1200" b="0" i="0" u="none" strike="noStrike" kern="1200" cap="none" spc="0" normalizeH="0" noProof="0" dirty="0" smtClean="0">
+                <a:ln>
+                  <a:noFill/>
+                </a:ln>
+                <a:solidFill>
+                  <a:prstClr val="black"/>
+                </a:solidFill>
+                <a:effectLst/>
+                <a:uLnTx/>
+                <a:uFillTx/>
+                <a:latin typeface="Arial" panose="020B0604020202020204" pitchFamily="34" charset="0"/>
+                <a:ea typeface="Amazon Ember" panose="020B0603020204020204" pitchFamily="34" charset="0"/>
+                <a:cs typeface="Arial" panose="020B0604020202020204" pitchFamily="34" charset="0"/>
+              </a:rPr>
+              <a:t>bastion host</a:t>
+            </a:r>
+            <a:endParaRPr kumimoji="0" lang="en-US" sz="1200" b="0" i="0" u="none" strike="noStrike" kern="1200" cap="none" spc="0" normalizeH="0" baseline="0" noProof="0" dirty="0">
+              <a:ln>
+                <a:noFill/>
+              </a:ln>
+              <a:solidFill>
+                <a:prstClr val="black"/>
+              </a:solidFill>
+              <a:effectLst/>
+              <a:uLnTx/>
+              <a:uFillTx/>
               <a:latin typeface="Arial" panose="020B0604020202020204" pitchFamily="34" charset="0"/>
               <a:ea typeface="Amazon Ember" panose="020B0603020204020204" pitchFamily="34" charset="0"/>
               <a:cs typeface="Arial" panose="020B0604020202020204" pitchFamily="34" charset="0"/>
@@ -3560,7 +4535,7 @@
         </p:nvSpPr>
         <p:spPr>
           <a:xfrm>
-            <a:off x="1637639" y="2542641"/>
+            <a:off x="1676400" y="2510978"/>
             <a:ext cx="1236442" cy="276999"/>
           </a:xfrm>
           <a:prstGeom prst="rect">
@@ -3574,9 +4549,34 @@
           </a:bodyPr>
           <a:lstStyle/>
           <a:p>
-            <a:pPr algn="ctr"/>
-            <a:r>
-              <a:rPr lang="en-US" sz="1200" dirty="0">
+            <a:pPr marL="0" marR="0" lvl="0" indent="0" algn="ctr" defTabSz="914400" rtl="0" eaLnBrk="1" fontAlgn="auto" latinLnBrk="0" hangingPunct="1">
+              <a:lnSpc>
+                <a:spcPct val="100000"/>
+              </a:lnSpc>
+              <a:spcBef>
+                <a:spcPts val="0"/>
+              </a:spcBef>
+              <a:spcAft>
+                <a:spcPts val="0"/>
+              </a:spcAft>
+              <a:buClrTx/>
+              <a:buSzTx/>
+              <a:buFontTx/>
+              <a:buNone/>
+              <a:tabLst/>
+              <a:defRPr/>
+            </a:pPr>
+            <a:r>
+              <a:rPr kumimoji="0" lang="en-US" sz="1200" b="0" i="0" u="none" strike="noStrike" kern="1200" cap="none" spc="0" normalizeH="0" baseline="0" noProof="0" dirty="0">
+                <a:ln>
+                  <a:noFill/>
+                </a:ln>
+                <a:solidFill>
+                  <a:prstClr val="black"/>
+                </a:solidFill>
+                <a:effectLst/>
+                <a:uLnTx/>
+                <a:uFillTx/>
                 <a:latin typeface="Arial" panose="020B0604020202020204" pitchFamily="34" charset="0"/>
                 <a:ea typeface="Amazon Ember" panose="020B0603020204020204" pitchFamily="34" charset="0"/>
                 <a:cs typeface="Arial" panose="020B0604020202020204" pitchFamily="34" charset="0"/>
@@ -3601,7 +4601,43 @@
           <p:nvPr/>
         </p:nvPicPr>
         <p:blipFill>
-          <a:blip r:embed="rId14">
+          <a:blip r:embed="rId18">
+            <a:extLst>
+              <a:ext uri="{96DAC541-7B7A-43D3-8B79-37D633B846F1}">
+                <asvg:svgBlip xmlns="" xmlns:asvg="http://schemas.microsoft.com/office/drawing/2016/SVG/main" r:embed="rId19"/>
+              </a:ext>
+            </a:extLst>
+          </a:blip>
+          <a:stretch>
+            <a:fillRect/>
+          </a:stretch>
+        </p:blipFill>
+        <p:spPr>
+          <a:xfrm>
+            <a:off x="2059671" y="2032718"/>
+            <a:ext cx="469900" cy="469900"/>
+          </a:xfrm>
+          <a:prstGeom prst="rect">
+            <a:avLst/>
+          </a:prstGeom>
+        </p:spPr>
+      </p:pic>
+      <p:pic>
+        <p:nvPicPr>
+          <p:cNvPr id="43" name="Graphic 135">
+            <a:extLst>
+              <a:ext uri="{FF2B5EF4-FFF2-40B4-BE49-F238E27FC236}">
+                <a16:creationId xmlns:a16="http://schemas.microsoft.com/office/drawing/2014/main" id="{C19987B1-DB3A-1640-994D-BCB81FCC1AE4}"/>
+              </a:ext>
+            </a:extLst>
+          </p:cNvPr>
+          <p:cNvPicPr>
+            <a:picLocks noChangeAspect="1"/>
+          </p:cNvPicPr>
+          <p:nvPr/>
+        </p:nvPicPr>
+        <p:blipFill>
+          <a:blip r:embed="rId15">
             <a:extLst>
               <a:ext uri="{96DAC541-7B7A-43D3-8B79-37D633B846F1}">
                 <asvg:svgBlip xmlns="" xmlns:asvg="http://schemas.microsoft.com/office/drawing/2016/SVG/main" r:embed="rId17"/>
@@ -3614,7 +4650,7 @@
         </p:blipFill>
         <p:spPr>
           <a:xfrm>
-            <a:off x="2020910" y="2057400"/>
+            <a:off x="3188702" y="3660315"/>
             <a:ext cx="469900" cy="469900"/>
           </a:xfrm>
           <a:prstGeom prst="rect">
@@ -3622,6 +4658,389 @@
           </a:prstGeom>
         </p:spPr>
       </p:pic>
+      <p:sp>
+        <p:nvSpPr>
+          <p:cNvPr id="44" name="TextBox 43">
+            <a:extLst>
+              <a:ext uri="{FF2B5EF4-FFF2-40B4-BE49-F238E27FC236}">
+                <a16:creationId xmlns:a16="http://schemas.microsoft.com/office/drawing/2014/main" id="{F90C1CC4-DFE6-0445-BD1C-DB610E1A07F5}"/>
+              </a:ext>
+            </a:extLst>
+          </p:cNvPr>
+          <p:cNvSpPr txBox="1"/>
+          <p:nvPr/>
+        </p:nvSpPr>
+        <p:spPr>
+          <a:xfrm>
+            <a:off x="2667000" y="4092822"/>
+            <a:ext cx="1513305" cy="461665"/>
+          </a:xfrm>
+          <a:prstGeom prst="rect">
+            <a:avLst/>
+          </a:prstGeom>
+          <a:noFill/>
+        </p:spPr>
+        <p:txBody>
+          <a:bodyPr wrap="square" rtlCol="0">
+            <a:spAutoFit/>
+          </a:bodyPr>
+          <a:lstStyle/>
+          <a:p>
+            <a:pPr marL="0" marR="0" lvl="0" indent="0" algn="ctr" defTabSz="914400" rtl="0" eaLnBrk="1" fontAlgn="auto" latinLnBrk="0" hangingPunct="1">
+              <a:lnSpc>
+                <a:spcPct val="100000"/>
+              </a:lnSpc>
+              <a:spcBef>
+                <a:spcPts val="0"/>
+              </a:spcBef>
+              <a:spcAft>
+                <a:spcPts val="0"/>
+              </a:spcAft>
+              <a:buClrTx/>
+              <a:buSzTx/>
+              <a:buFontTx/>
+              <a:buNone/>
+              <a:tabLst/>
+              <a:defRPr/>
+            </a:pPr>
+            <a:r>
+              <a:rPr kumimoji="0" lang="en-US" sz="1200" b="0" i="0" u="none" strike="noStrike" kern="1200" cap="none" spc="0" normalizeH="0" baseline="0" noProof="0" dirty="0" smtClean="0">
+                <a:ln>
+                  <a:noFill/>
+                </a:ln>
+                <a:solidFill>
+                  <a:prstClr val="black"/>
+                </a:solidFill>
+                <a:effectLst/>
+                <a:uLnTx/>
+                <a:uFillTx/>
+                <a:latin typeface="Arial" panose="020B0604020202020204" pitchFamily="34" charset="0"/>
+                <a:ea typeface="Amazon Ember" panose="020B0603020204020204" pitchFamily="34" charset="0"/>
+                <a:cs typeface="Arial" panose="020B0604020202020204" pitchFamily="34" charset="0"/>
+              </a:rPr>
+              <a:t>SIOS Protection</a:t>
+            </a:r>
+            <a:r>
+              <a:rPr kumimoji="0" lang="en-US" sz="1200" b="0" i="0" u="none" strike="noStrike" kern="1200" cap="none" spc="0" normalizeH="0" noProof="0" dirty="0" smtClean="0">
+                <a:ln>
+                  <a:noFill/>
+                </a:ln>
+                <a:solidFill>
+                  <a:prstClr val="black"/>
+                </a:solidFill>
+                <a:effectLst/>
+                <a:uLnTx/>
+                <a:uFillTx/>
+                <a:latin typeface="Arial" panose="020B0604020202020204" pitchFamily="34" charset="0"/>
+                <a:ea typeface="Amazon Ember" panose="020B0603020204020204" pitchFamily="34" charset="0"/>
+                <a:cs typeface="Arial" panose="020B0604020202020204" pitchFamily="34" charset="0"/>
+              </a:rPr>
+              <a:t> Suite for Linux</a:t>
+            </a:r>
+            <a:endParaRPr kumimoji="0" lang="en-US" sz="1200" b="0" i="0" u="none" strike="noStrike" kern="1200" cap="none" spc="0" normalizeH="0" baseline="0" noProof="0" dirty="0">
+              <a:ln>
+                <a:noFill/>
+              </a:ln>
+              <a:solidFill>
+                <a:prstClr val="black"/>
+              </a:solidFill>
+              <a:effectLst/>
+              <a:uLnTx/>
+              <a:uFillTx/>
+              <a:latin typeface="Arial" panose="020B0604020202020204" pitchFamily="34" charset="0"/>
+              <a:ea typeface="Amazon Ember" panose="020B0603020204020204" pitchFamily="34" charset="0"/>
+              <a:cs typeface="Arial" panose="020B0604020202020204" pitchFamily="34" charset="0"/>
+            </a:endParaRPr>
+          </a:p>
+        </p:txBody>
+      </p:sp>
+      <p:sp>
+        <p:nvSpPr>
+          <p:cNvPr id="42" name="Rectangle 41">
+            <a:extLst>
+              <a:ext uri="{FF2B5EF4-FFF2-40B4-BE49-F238E27FC236}">
+                <a16:creationId xmlns:a16="http://schemas.microsoft.com/office/drawing/2014/main" id="{FFA89DF7-D079-0947-8E29-4EEA4975DBBD}"/>
+              </a:ext>
+            </a:extLst>
+          </p:cNvPr>
+          <p:cNvSpPr/>
+          <p:nvPr/>
+        </p:nvSpPr>
+        <p:spPr>
+          <a:xfrm>
+            <a:off x="2799088" y="3585857"/>
+            <a:ext cx="3754111" cy="953693"/>
+          </a:xfrm>
+          <a:prstGeom prst="rect">
+            <a:avLst/>
+          </a:prstGeom>
+          <a:noFill/>
+          <a:ln w="12700">
+            <a:solidFill>
+              <a:srgbClr val="5A6B86"/>
+            </a:solidFill>
+            <a:prstDash val="dash"/>
+          </a:ln>
+        </p:spPr>
+        <p:style>
+          <a:lnRef idx="2">
+            <a:schemeClr val="accent1">
+              <a:shade val="50000"/>
+            </a:schemeClr>
+          </a:lnRef>
+          <a:fillRef idx="1">
+            <a:schemeClr val="accent1"/>
+          </a:fillRef>
+          <a:effectRef idx="0">
+            <a:schemeClr val="accent1"/>
+          </a:effectRef>
+          <a:fontRef idx="minor">
+            <a:schemeClr val="lt1"/>
+          </a:fontRef>
+        </p:style>
+        <p:txBody>
+          <a:bodyPr lIns="91440" tIns="91440" rIns="91440"/>
+          <a:lstStyle/>
+          <a:p>
+            <a:pPr marL="0" marR="0" lvl="0" indent="0" algn="ctr" defTabSz="914400" rtl="0" eaLnBrk="1" fontAlgn="auto" latinLnBrk="0" hangingPunct="1">
+              <a:lnSpc>
+                <a:spcPct val="100000"/>
+              </a:lnSpc>
+              <a:spcBef>
+                <a:spcPts val="0"/>
+              </a:spcBef>
+              <a:spcAft>
+                <a:spcPts val="0"/>
+              </a:spcAft>
+              <a:buClrTx/>
+              <a:buSzTx/>
+              <a:buFontTx/>
+              <a:buNone/>
+              <a:tabLst/>
+              <a:defRPr/>
+            </a:pPr>
+            <a:r>
+              <a:rPr kumimoji="0" lang="en-US" sz="1200" b="0" i="0" u="none" strike="noStrike" kern="1200" cap="none" spc="0" normalizeH="0" baseline="0" noProof="0" dirty="0" smtClean="0">
+                <a:ln>
+                  <a:noFill/>
+                </a:ln>
+                <a:solidFill>
+                  <a:srgbClr val="5A6B86"/>
+                </a:solidFill>
+                <a:effectLst/>
+                <a:uLnTx/>
+                <a:uFillTx/>
+                <a:latin typeface="Arial" panose="020B0604020202020204" pitchFamily="34" charset="0"/>
+                <a:ea typeface="+mn-ea"/>
+                <a:cs typeface="Arial" panose="020B0604020202020204" pitchFamily="34" charset="0"/>
+              </a:rPr>
+              <a:t>Linux</a:t>
+            </a:r>
+          </a:p>
+          <a:p>
+            <a:pPr marL="0" marR="0" lvl="0" indent="0" algn="ctr" defTabSz="914400" rtl="0" eaLnBrk="1" fontAlgn="auto" latinLnBrk="0" hangingPunct="1">
+              <a:lnSpc>
+                <a:spcPct val="100000"/>
+              </a:lnSpc>
+              <a:spcBef>
+                <a:spcPts val="0"/>
+              </a:spcBef>
+              <a:spcAft>
+                <a:spcPts val="0"/>
+              </a:spcAft>
+              <a:buClrTx/>
+              <a:buSzTx/>
+              <a:buFontTx/>
+              <a:buNone/>
+              <a:tabLst/>
+              <a:defRPr/>
+            </a:pPr>
+            <a:r>
+              <a:rPr kumimoji="0" lang="en-US" sz="1200" b="0" i="0" u="none" strike="noStrike" kern="1200" cap="none" spc="0" normalizeH="0" baseline="0" noProof="0" dirty="0" smtClean="0">
+                <a:ln>
+                  <a:noFill/>
+                </a:ln>
+                <a:solidFill>
+                  <a:srgbClr val="5A6B86"/>
+                </a:solidFill>
+                <a:effectLst/>
+                <a:uLnTx/>
+                <a:uFillTx/>
+                <a:latin typeface="Arial" panose="020B0604020202020204" pitchFamily="34" charset="0"/>
+                <a:ea typeface="+mn-ea"/>
+                <a:cs typeface="Arial" panose="020B0604020202020204" pitchFamily="34" charset="0"/>
+              </a:rPr>
+              <a:t>high availability</a:t>
+            </a:r>
+          </a:p>
+          <a:p>
+            <a:pPr marL="0" marR="0" lvl="0" indent="0" algn="ctr" defTabSz="914400" rtl="0" eaLnBrk="1" fontAlgn="auto" latinLnBrk="0" hangingPunct="1">
+              <a:lnSpc>
+                <a:spcPct val="100000"/>
+              </a:lnSpc>
+              <a:spcBef>
+                <a:spcPts val="0"/>
+              </a:spcBef>
+              <a:spcAft>
+                <a:spcPts val="0"/>
+              </a:spcAft>
+              <a:buClrTx/>
+              <a:buSzTx/>
+              <a:buFontTx/>
+              <a:buNone/>
+              <a:tabLst/>
+              <a:defRPr/>
+            </a:pPr>
+            <a:r>
+              <a:rPr kumimoji="0" lang="en-US" sz="1200" b="0" i="0" u="none" strike="noStrike" kern="1200" cap="none" spc="0" normalizeH="0" noProof="0" dirty="0" smtClean="0">
+                <a:ln>
+                  <a:noFill/>
+                </a:ln>
+                <a:solidFill>
+                  <a:srgbClr val="5A6B86"/>
+                </a:solidFill>
+                <a:effectLst/>
+                <a:uLnTx/>
+                <a:uFillTx/>
+                <a:latin typeface="Arial" panose="020B0604020202020204" pitchFamily="34" charset="0"/>
+                <a:ea typeface="+mn-ea"/>
+                <a:cs typeface="Arial" panose="020B0604020202020204" pitchFamily="34" charset="0"/>
+              </a:rPr>
+              <a:t>cluster</a:t>
+            </a:r>
+            <a:endParaRPr kumimoji="0" lang="en-US" sz="1200" b="0" i="0" u="none" strike="noStrike" kern="1200" cap="none" spc="0" normalizeH="0" baseline="0" noProof="0" dirty="0">
+              <a:ln>
+                <a:noFill/>
+              </a:ln>
+              <a:solidFill>
+                <a:srgbClr val="5A6B86"/>
+              </a:solidFill>
+              <a:effectLst/>
+              <a:uLnTx/>
+              <a:uFillTx/>
+              <a:latin typeface="Arial" panose="020B0604020202020204" pitchFamily="34" charset="0"/>
+              <a:ea typeface="+mn-ea"/>
+              <a:cs typeface="Arial" panose="020B0604020202020204" pitchFamily="34" charset="0"/>
+            </a:endParaRPr>
+          </a:p>
+        </p:txBody>
+      </p:sp>
+      <p:sp>
+        <p:nvSpPr>
+          <p:cNvPr id="55" name="Rectangle 54">
+            <a:extLst>
+              <a:ext uri="{FF2B5EF4-FFF2-40B4-BE49-F238E27FC236}">
+                <a16:creationId xmlns:a16="http://schemas.microsoft.com/office/drawing/2014/main" id="{D246DAA1-0260-E449-8CA2-92FF0101149D}"/>
+              </a:ext>
+            </a:extLst>
+          </p:cNvPr>
+          <p:cNvSpPr/>
+          <p:nvPr/>
+        </p:nvSpPr>
+        <p:spPr>
+          <a:xfrm>
+            <a:off x="5257800" y="863600"/>
+            <a:ext cx="2455642" cy="4165600"/>
+          </a:xfrm>
+          <a:prstGeom prst="rect">
+            <a:avLst/>
+          </a:prstGeom>
+          <a:noFill/>
+          <a:ln w="12700">
+            <a:solidFill>
+              <a:srgbClr val="5B9CD5"/>
+            </a:solidFill>
+            <a:prstDash val="dash"/>
+          </a:ln>
+        </p:spPr>
+        <p:style>
+          <a:lnRef idx="2">
+            <a:schemeClr val="accent1">
+              <a:shade val="50000"/>
+            </a:schemeClr>
+          </a:lnRef>
+          <a:fillRef idx="1">
+            <a:schemeClr val="accent1"/>
+          </a:fillRef>
+          <a:effectRef idx="0">
+            <a:schemeClr val="accent1"/>
+          </a:effectRef>
+          <a:fontRef idx="minor">
+            <a:schemeClr val="lt1"/>
+          </a:fontRef>
+        </p:style>
+        <p:txBody>
+          <a:bodyPr tIns="91440"/>
+          <a:lstStyle/>
+          <a:p>
+            <a:pPr marL="0" marR="0" lvl="0" indent="0" algn="ctr" defTabSz="914400" rtl="0" eaLnBrk="1" fontAlgn="auto" latinLnBrk="0" hangingPunct="1">
+              <a:lnSpc>
+                <a:spcPct val="100000"/>
+              </a:lnSpc>
+              <a:spcBef>
+                <a:spcPts val="0"/>
+              </a:spcBef>
+              <a:spcAft>
+                <a:spcPts val="0"/>
+              </a:spcAft>
+              <a:buClrTx/>
+              <a:buSzTx/>
+              <a:buFontTx/>
+              <a:buNone/>
+              <a:tabLst/>
+              <a:defRPr/>
+            </a:pPr>
+            <a:r>
+              <a:rPr kumimoji="0" lang="en-US" sz="1200" b="0" i="0" u="none" strike="noStrike" kern="1200" cap="none" spc="0" normalizeH="0" baseline="0" noProof="0" dirty="0">
+                <a:ln>
+                  <a:noFill/>
+                </a:ln>
+                <a:solidFill>
+                  <a:srgbClr val="5B9CD5"/>
+                </a:solidFill>
+                <a:effectLst/>
+                <a:uLnTx/>
+                <a:uFillTx/>
+                <a:latin typeface="Arial" panose="020B0604020202020204" pitchFamily="34" charset="0"/>
+                <a:ea typeface="+mn-ea"/>
+                <a:cs typeface="Arial" panose="020B0604020202020204" pitchFamily="34" charset="0"/>
+              </a:rPr>
+              <a:t>Availability </a:t>
+            </a:r>
+            <a:r>
+              <a:rPr kumimoji="0" lang="en-US" sz="1200" b="0" i="0" u="none" strike="noStrike" kern="1200" cap="none" spc="0" normalizeH="0" baseline="0" noProof="0" dirty="0" smtClean="0">
+                <a:ln>
+                  <a:noFill/>
+                </a:ln>
+                <a:solidFill>
+                  <a:srgbClr val="5B9CD5"/>
+                </a:solidFill>
+                <a:effectLst/>
+                <a:uLnTx/>
+                <a:uFillTx/>
+                <a:latin typeface="Arial" panose="020B0604020202020204" pitchFamily="34" charset="0"/>
+                <a:ea typeface="+mn-ea"/>
+                <a:cs typeface="Arial" panose="020B0604020202020204" pitchFamily="34" charset="0"/>
+              </a:rPr>
+              <a:t>Zone 2</a:t>
+            </a:r>
+            <a:endParaRPr kumimoji="0" lang="en-US" sz="1200" b="0" i="0" u="none" strike="noStrike" kern="1200" cap="none" spc="0" normalizeH="0" baseline="0" noProof="0" dirty="0">
+              <a:ln>
+                <a:noFill/>
+              </a:ln>
+              <a:solidFill>
+                <a:srgbClr val="5B9CD5"/>
+              </a:solidFill>
+              <a:effectLst/>
+              <a:uLnTx/>
+              <a:uFillTx/>
+              <a:latin typeface="Arial" panose="020B0604020202020204" pitchFamily="34" charset="0"/>
+              <a:ea typeface="+mn-ea"/>
+              <a:cs typeface="Arial" panose="020B0604020202020204" pitchFamily="34" charset="0"/>
+            </a:endParaRPr>
+          </a:p>
+        </p:txBody>
+      </p:sp>
       <p:sp>
         <p:nvSpPr>
           <p:cNvPr id="18" name="Rectangle 17">
@@ -3636,8 +5055,8 @@
         </p:nvSpPr>
         <p:spPr>
           <a:xfrm>
-            <a:off x="5335075" y="1576754"/>
-            <a:ext cx="2743201" cy="1447800"/>
+            <a:off x="5328625" y="1602559"/>
+            <a:ext cx="2322576" cy="1447800"/>
           </a:xfrm>
           <a:prstGeom prst="rect">
             <a:avLst/>
@@ -3677,12 +5096,34 @@
           </a:bodyPr>
           <a:lstStyle/>
           <a:p>
-            <a:pPr algn="l"/>
-            <a:r>
-              <a:rPr lang="en-US" sz="1200" dirty="0">
+            <a:pPr marL="0" marR="0" lvl="0" indent="0" algn="l" defTabSz="914400" rtl="0" eaLnBrk="1" fontAlgn="auto" latinLnBrk="0" hangingPunct="1">
+              <a:lnSpc>
+                <a:spcPct val="100000"/>
+              </a:lnSpc>
+              <a:spcBef>
+                <a:spcPts val="0"/>
+              </a:spcBef>
+              <a:spcAft>
+                <a:spcPts val="0"/>
+              </a:spcAft>
+              <a:buClrTx/>
+              <a:buSzTx/>
+              <a:buFontTx/>
+              <a:buNone/>
+              <a:tabLst/>
+              <a:defRPr/>
+            </a:pPr>
+            <a:r>
+              <a:rPr kumimoji="0" lang="en-US" sz="1200" b="0" i="0" u="none" strike="noStrike" kern="1200" cap="none" spc="0" normalizeH="0" baseline="0" noProof="0" dirty="0">
+                <a:ln>
+                  <a:noFill/>
+                </a:ln>
                 <a:solidFill>
-                  <a:schemeClr val="accent6"/>
+                  <a:srgbClr val="70AD47"/>
                 </a:solidFill>
+                <a:effectLst/>
+                <a:uLnTx/>
+                <a:uFillTx/>
                 <a:latin typeface="Arial" panose="020B0604020202020204" pitchFamily="34" charset="0"/>
                 <a:ea typeface="Amazon Ember" panose="020B0603020204020204" pitchFamily="34" charset="0"/>
                 <a:cs typeface="Arial" panose="020B0604020202020204" pitchFamily="34" charset="0"/>
@@ -3691,11 +5132,33 @@
             </a:r>
           </a:p>
           <a:p>
-            <a:pPr algn="l"/>
-            <a:endParaRPr lang="en-US" sz="1200" dirty="0">
+            <a:pPr marL="0" marR="0" lvl="0" indent="0" algn="l" defTabSz="914400" rtl="0" eaLnBrk="1" fontAlgn="auto" latinLnBrk="0" hangingPunct="1">
+              <a:lnSpc>
+                <a:spcPct val="100000"/>
+              </a:lnSpc>
+              <a:spcBef>
+                <a:spcPts val="0"/>
+              </a:spcBef>
+              <a:spcAft>
+                <a:spcPts val="0"/>
+              </a:spcAft>
+              <a:buClrTx/>
+              <a:buSzTx/>
+              <a:buFontTx/>
+              <a:buNone/>
+              <a:tabLst/>
+              <a:defRPr/>
+            </a:pPr>
+            <a:endParaRPr kumimoji="0" lang="en-US" sz="1200" b="0" i="0" u="none" strike="noStrike" kern="1200" cap="none" spc="0" normalizeH="0" baseline="0" noProof="0" dirty="0">
+              <a:ln>
+                <a:noFill/>
+              </a:ln>
               <a:solidFill>
-                <a:schemeClr val="accent5"/>
+                <a:srgbClr val="4472C4"/>
               </a:solidFill>
+              <a:effectLst/>
+              <a:uLnTx/>
+              <a:uFillTx/>
               <a:latin typeface="Arial" panose="020B0604020202020204" pitchFamily="34" charset="0"/>
               <a:ea typeface="Amazon Ember" panose="020B0603020204020204" pitchFamily="34" charset="0"/>
               <a:cs typeface="Arial" panose="020B0604020202020204" pitchFamily="34" charset="0"/>
@@ -3718,7 +5181,7 @@
           <p:nvPr/>
         </p:nvPicPr>
         <p:blipFill>
-          <a:blip r:embed="rId4">
+          <a:blip r:embed="rId13">
             <a:extLst>
               <a:ext uri="{96DAC541-7B7A-43D3-8B79-37D633B846F1}">
                 <asvg:svgBlip xmlns="" xmlns:asvg="http://schemas.microsoft.com/office/drawing/2016/SVG/main" r:embed="rId7"/>
@@ -3731,7 +5194,7 @@
         </p:blipFill>
         <p:spPr>
           <a:xfrm>
-            <a:off x="5335076" y="1574395"/>
+            <a:off x="5330092" y="1600200"/>
             <a:ext cx="274320" cy="274320"/>
           </a:xfrm>
           <a:prstGeom prst="rect">
@@ -3753,8 +5216,8 @@
         </p:nvSpPr>
         <p:spPr>
           <a:xfrm>
-            <a:off x="5332144" y="3124200"/>
-            <a:ext cx="2746132" cy="1905000"/>
+            <a:off x="5328625" y="3150005"/>
+            <a:ext cx="2322576" cy="1650595"/>
           </a:xfrm>
           <a:prstGeom prst="rect">
             <a:avLst/>
@@ -3794,12 +5257,34 @@
           </a:bodyPr>
           <a:lstStyle/>
           <a:p>
-            <a:pPr algn="l"/>
-            <a:r>
-              <a:rPr lang="en-US" sz="1200" dirty="0">
+            <a:pPr marL="0" marR="0" lvl="0" indent="0" algn="l" defTabSz="914400" rtl="0" eaLnBrk="1" fontAlgn="auto" latinLnBrk="0" hangingPunct="1">
+              <a:lnSpc>
+                <a:spcPct val="100000"/>
+              </a:lnSpc>
+              <a:spcBef>
+                <a:spcPts val="0"/>
+              </a:spcBef>
+              <a:spcAft>
+                <a:spcPts val="0"/>
+              </a:spcAft>
+              <a:buClrTx/>
+              <a:buSzTx/>
+              <a:buFontTx/>
+              <a:buNone/>
+              <a:tabLst/>
+              <a:defRPr/>
+            </a:pPr>
+            <a:r>
+              <a:rPr kumimoji="0" lang="en-US" sz="1200" b="0" i="0" u="none" strike="noStrike" kern="1200" cap="none" spc="0" normalizeH="0" baseline="0" noProof="0" dirty="0">
+                <a:ln>
+                  <a:noFill/>
+                </a:ln>
                 <a:solidFill>
-                  <a:schemeClr val="accent1"/>
+                  <a:srgbClr val="5B9BD5"/>
                 </a:solidFill>
+                <a:effectLst/>
+                <a:uLnTx/>
+                <a:uFillTx/>
                 <a:latin typeface="Arial" panose="020B0604020202020204" pitchFamily="34" charset="0"/>
                 <a:ea typeface="Amazon Ember" panose="020B0603020204020204" pitchFamily="34" charset="0"/>
                 <a:cs typeface="Arial" panose="020B0604020202020204" pitchFamily="34" charset="0"/>
@@ -3808,11 +5293,33 @@
             </a:r>
           </a:p>
           <a:p>
-            <a:pPr algn="l"/>
-            <a:endParaRPr lang="en-US" sz="1200" dirty="0">
+            <a:pPr marL="0" marR="0" lvl="0" indent="0" algn="l" defTabSz="914400" rtl="0" eaLnBrk="1" fontAlgn="auto" latinLnBrk="0" hangingPunct="1">
+              <a:lnSpc>
+                <a:spcPct val="100000"/>
+              </a:lnSpc>
+              <a:spcBef>
+                <a:spcPts val="0"/>
+              </a:spcBef>
+              <a:spcAft>
+                <a:spcPts val="0"/>
+              </a:spcAft>
+              <a:buClrTx/>
+              <a:buSzTx/>
+              <a:buFontTx/>
+              <a:buNone/>
+              <a:tabLst/>
+              <a:defRPr/>
+            </a:pPr>
+            <a:endParaRPr kumimoji="0" lang="en-US" sz="1200" b="0" i="0" u="none" strike="noStrike" kern="1200" cap="none" spc="0" normalizeH="0" baseline="0" noProof="0" dirty="0">
+              <a:ln>
+                <a:noFill/>
+              </a:ln>
               <a:solidFill>
-                <a:schemeClr val="accent3"/>
+                <a:srgbClr val="A5A5A5"/>
               </a:solidFill>
+              <a:effectLst/>
+              <a:uLnTx/>
+              <a:uFillTx/>
               <a:latin typeface="Arial" panose="020B0604020202020204" pitchFamily="34" charset="0"/>
               <a:ea typeface="Amazon Ember" panose="020B0603020204020204" pitchFamily="34" charset="0"/>
               <a:cs typeface="Arial" panose="020B0604020202020204" pitchFamily="34" charset="0"/>
@@ -3835,7 +5342,7 @@
           <p:nvPr/>
         </p:nvPicPr>
         <p:blipFill>
-          <a:blip r:embed="rId8">
+          <a:blip r:embed="rId14">
             <a:extLst>
               <a:ext uri="{96DAC541-7B7A-43D3-8B79-37D633B846F1}">
                 <asvg:svgBlip xmlns="" xmlns:asvg="http://schemas.microsoft.com/office/drawing/2016/SVG/main" r:embed="rId9"/>
@@ -3848,7 +5355,7 @@
         </p:blipFill>
         <p:spPr>
           <a:xfrm>
-            <a:off x="5332145" y="3124200"/>
+            <a:off x="5327161" y="3150005"/>
             <a:ext cx="274320" cy="274320"/>
           </a:xfrm>
           <a:prstGeom prst="rect">
@@ -3856,57 +5363,307 @@
           </a:prstGeom>
         </p:spPr>
       </p:pic>
-      <p:sp>
-        <p:nvSpPr>
-          <p:cNvPr id="22" name="TextBox 21">
-            <a:extLst>
-              <a:ext uri="{FF2B5EF4-FFF2-40B4-BE49-F238E27FC236}">
-                <a16:creationId xmlns:a16="http://schemas.microsoft.com/office/drawing/2014/main" id="{F90C1CC4-DFE6-0445-BD1C-DB610E1A07F5}"/>
-              </a:ext>
-            </a:extLst>
-          </p:cNvPr>
-          <p:cNvSpPr txBox="1"/>
+      <p:grpSp>
+        <p:nvGrpSpPr>
+          <p:cNvPr id="16" name="Group 15"/>
+          <p:cNvGrpSpPr/>
           <p:nvPr/>
-        </p:nvSpPr>
-        <p:spPr>
+        </p:nvGrpSpPr>
+        <p:grpSpPr>
           <a:xfrm>
-            <a:off x="5257800" y="2516771"/>
-            <a:ext cx="1513305" cy="276999"/>
+            <a:off x="5138928" y="2032718"/>
+            <a:ext cx="1513305" cy="2521769"/>
+            <a:chOff x="5105400" y="2032718"/>
+            <a:chExt cx="1513305" cy="2521769"/>
           </a:xfrm>
-          <a:prstGeom prst="rect">
-            <a:avLst/>
-          </a:prstGeom>
-          <a:noFill/>
-          <a:effectLst>
-            <a:softEdge rad="0"/>
-          </a:effectLst>
-        </p:spPr>
-        <p:txBody>
-          <a:bodyPr wrap="square" rtlCol="0">
-            <a:spAutoFit/>
-          </a:bodyPr>
-          <a:lstStyle/>
-          <a:p>
-            <a:pPr algn="ctr"/>
-            <a:r>
-              <a:rPr lang="en-US" sz="1200" smtClean="0">
+        </p:grpSpPr>
+        <p:pic>
+          <p:nvPicPr>
+            <p:cNvPr id="45" name="Graphic 135">
+              <a:extLst>
+                <a:ext uri="{FF2B5EF4-FFF2-40B4-BE49-F238E27FC236}">
+                  <a16:creationId xmlns:a16="http://schemas.microsoft.com/office/drawing/2014/main" id="{C19987B1-DB3A-1640-994D-BCB81FCC1AE4}"/>
+                </a:ext>
+              </a:extLst>
+            </p:cNvPr>
+            <p:cNvPicPr>
+              <a:picLocks noChangeAspect="1"/>
+            </p:cNvPicPr>
+            <p:nvPr/>
+          </p:nvPicPr>
+          <p:blipFill>
+            <a:blip r:embed="rId15">
+              <a:extLst>
+                <a:ext uri="{96DAC541-7B7A-43D3-8B79-37D633B846F1}">
+                  <asvg:svgBlip xmlns="" xmlns:asvg="http://schemas.microsoft.com/office/drawing/2016/SVG/main" r:embed="rId17"/>
+                </a:ext>
+              </a:extLst>
+            </a:blip>
+            <a:stretch>
+              <a:fillRect/>
+            </a:stretch>
+          </p:blipFill>
+          <p:spPr>
+            <a:xfrm>
+              <a:off x="5627102" y="3660315"/>
+              <a:ext cx="469900" cy="469900"/>
+            </a:xfrm>
+            <a:prstGeom prst="rect">
+              <a:avLst/>
+            </a:prstGeom>
+          </p:spPr>
+        </p:pic>
+        <p:sp>
+          <p:nvSpPr>
+            <p:cNvPr id="48" name="TextBox 47">
+              <a:extLst>
+                <a:ext uri="{FF2B5EF4-FFF2-40B4-BE49-F238E27FC236}">
+                  <a16:creationId xmlns:a16="http://schemas.microsoft.com/office/drawing/2014/main" id="{F90C1CC4-DFE6-0445-BD1C-DB610E1A07F5}"/>
+                </a:ext>
+              </a:extLst>
+            </p:cNvPr>
+            <p:cNvSpPr txBox="1"/>
+            <p:nvPr/>
+          </p:nvSpPr>
+          <p:spPr>
+            <a:xfrm>
+              <a:off x="5105400" y="4092822"/>
+              <a:ext cx="1513305" cy="461665"/>
+            </a:xfrm>
+            <a:prstGeom prst="rect">
+              <a:avLst/>
+            </a:prstGeom>
+            <a:noFill/>
+          </p:spPr>
+          <p:txBody>
+            <a:bodyPr wrap="square" rtlCol="0">
+              <a:spAutoFit/>
+            </a:bodyPr>
+            <a:lstStyle/>
+            <a:p>
+              <a:pPr marL="0" marR="0" lvl="0" indent="0" algn="ctr" defTabSz="914400" rtl="0" eaLnBrk="1" fontAlgn="auto" latinLnBrk="0" hangingPunct="1">
+                <a:lnSpc>
+                  <a:spcPct val="100000"/>
+                </a:lnSpc>
+                <a:spcBef>
+                  <a:spcPts val="0"/>
+                </a:spcBef>
+                <a:spcAft>
+                  <a:spcPts val="0"/>
+                </a:spcAft>
+                <a:buClrTx/>
+                <a:buSzTx/>
+                <a:buFontTx/>
+                <a:buNone/>
+                <a:tabLst/>
+                <a:defRPr/>
+              </a:pPr>
+              <a:r>
+                <a:rPr kumimoji="0" lang="en-US" sz="1200" b="0" i="0" u="none" strike="noStrike" kern="1200" cap="none" spc="0" normalizeH="0" baseline="0" noProof="0" dirty="0" smtClean="0">
+                  <a:ln>
+                    <a:noFill/>
+                  </a:ln>
+                  <a:solidFill>
+                    <a:prstClr val="black"/>
+                  </a:solidFill>
+                  <a:effectLst/>
+                  <a:uLnTx/>
+                  <a:uFillTx/>
+                  <a:latin typeface="Arial" panose="020B0604020202020204" pitchFamily="34" charset="0"/>
+                  <a:ea typeface="Amazon Ember" panose="020B0603020204020204" pitchFamily="34" charset="0"/>
+                  <a:cs typeface="Arial" panose="020B0604020202020204" pitchFamily="34" charset="0"/>
+                </a:rPr>
+                <a:t>SIOS Protection</a:t>
+              </a:r>
+              <a:r>
+                <a:rPr kumimoji="0" lang="en-US" sz="1200" b="0" i="0" u="none" strike="noStrike" kern="1200" cap="none" spc="0" normalizeH="0" noProof="0" dirty="0" smtClean="0">
+                  <a:ln>
+                    <a:noFill/>
+                  </a:ln>
+                  <a:solidFill>
+                    <a:prstClr val="black"/>
+                  </a:solidFill>
+                  <a:effectLst/>
+                  <a:uLnTx/>
+                  <a:uFillTx/>
+                  <a:latin typeface="Arial" panose="020B0604020202020204" pitchFamily="34" charset="0"/>
+                  <a:ea typeface="Amazon Ember" panose="020B0603020204020204" pitchFamily="34" charset="0"/>
+                  <a:cs typeface="Arial" panose="020B0604020202020204" pitchFamily="34" charset="0"/>
+                </a:rPr>
+                <a:t> Suite for Linux</a:t>
+              </a:r>
+              <a:endParaRPr kumimoji="0" lang="en-US" sz="1200" b="0" i="0" u="none" strike="noStrike" kern="1200" cap="none" spc="0" normalizeH="0" baseline="0" noProof="0" dirty="0">
+                <a:ln>
+                  <a:noFill/>
+                </a:ln>
+                <a:solidFill>
+                  <a:prstClr val="black"/>
+                </a:solidFill>
+                <a:effectLst/>
+                <a:uLnTx/>
+                <a:uFillTx/>
                 <a:latin typeface="Arial" panose="020B0604020202020204" pitchFamily="34" charset="0"/>
                 <a:ea typeface="Amazon Ember" panose="020B0603020204020204" pitchFamily="34" charset="0"/>
                 <a:cs typeface="Arial" panose="020B0604020202020204" pitchFamily="34" charset="0"/>
-              </a:rPr>
-              <a:t>Linux Bastion</a:t>
-            </a:r>
-            <a:endParaRPr lang="en-US" sz="1200" dirty="0">
-              <a:latin typeface="Arial" panose="020B0604020202020204" pitchFamily="34" charset="0"/>
-              <a:ea typeface="Amazon Ember" panose="020B0603020204020204" pitchFamily="34" charset="0"/>
-              <a:cs typeface="Arial" panose="020B0604020202020204" pitchFamily="34" charset="0"/>
-            </a:endParaRPr>
-          </a:p>
-        </p:txBody>
-      </p:sp>
-      <p:sp>
-        <p:nvSpPr>
-          <p:cNvPr id="23" name="TextBox 22">
+              </a:endParaRPr>
+            </a:p>
+          </p:txBody>
+        </p:sp>
+        <p:pic>
+          <p:nvPicPr>
+            <p:cNvPr id="49" name="Graphic 135">
+              <a:extLst>
+                <a:ext uri="{FF2B5EF4-FFF2-40B4-BE49-F238E27FC236}">
+                  <a16:creationId xmlns:a16="http://schemas.microsoft.com/office/drawing/2014/main" id="{C19987B1-DB3A-1640-994D-BCB81FCC1AE4}"/>
+                </a:ext>
+              </a:extLst>
+            </p:cNvPr>
+            <p:cNvPicPr>
+              <a:picLocks noChangeAspect="1"/>
+            </p:cNvPicPr>
+            <p:nvPr/>
+          </p:nvPicPr>
+          <p:blipFill>
+            <a:blip r:embed="rId15">
+              <a:extLst>
+                <a:ext uri="{96DAC541-7B7A-43D3-8B79-37D633B846F1}">
+                  <asvg:svgBlip xmlns="" xmlns:asvg="http://schemas.microsoft.com/office/drawing/2016/SVG/main" r:embed="rId17"/>
+                </a:ext>
+              </a:extLst>
+            </a:blip>
+            <a:stretch>
+              <a:fillRect/>
+            </a:stretch>
+          </p:blipFill>
+          <p:spPr>
+            <a:xfrm flipH="1">
+              <a:off x="5627102" y="2032718"/>
+              <a:ext cx="469900" cy="469900"/>
+            </a:xfrm>
+            <a:prstGeom prst="rect">
+              <a:avLst/>
+            </a:prstGeom>
+          </p:spPr>
+        </p:pic>
+        <p:sp>
+          <p:nvSpPr>
+            <p:cNvPr id="50" name="TextBox 49">
+              <a:extLst>
+                <a:ext uri="{FF2B5EF4-FFF2-40B4-BE49-F238E27FC236}">
+                  <a16:creationId xmlns:a16="http://schemas.microsoft.com/office/drawing/2014/main" id="{F90C1CC4-DFE6-0445-BD1C-DB610E1A07F5}"/>
+                </a:ext>
+              </a:extLst>
+            </p:cNvPr>
+            <p:cNvSpPr txBox="1"/>
+            <p:nvPr/>
+          </p:nvSpPr>
+          <p:spPr>
+            <a:xfrm flipH="1">
+              <a:off x="5323449" y="2498439"/>
+              <a:ext cx="1077207" cy="461665"/>
+            </a:xfrm>
+            <a:prstGeom prst="rect">
+              <a:avLst/>
+            </a:prstGeom>
+            <a:noFill/>
+          </p:spPr>
+          <p:txBody>
+            <a:bodyPr wrap="square" rtlCol="0">
+              <a:spAutoFit/>
+            </a:bodyPr>
+            <a:lstStyle/>
+            <a:p>
+              <a:pPr marL="0" marR="0" lvl="0" indent="0" algn="ctr" defTabSz="914400" rtl="0" eaLnBrk="1" fontAlgn="auto" latinLnBrk="0" hangingPunct="1">
+                <a:lnSpc>
+                  <a:spcPct val="100000"/>
+                </a:lnSpc>
+                <a:spcBef>
+                  <a:spcPts val="0"/>
+                </a:spcBef>
+                <a:spcAft>
+                  <a:spcPts val="0"/>
+                </a:spcAft>
+                <a:buClrTx/>
+                <a:buSzTx/>
+                <a:buFontTx/>
+                <a:buNone/>
+                <a:tabLst/>
+                <a:defRPr/>
+              </a:pPr>
+              <a:r>
+                <a:rPr kumimoji="0" lang="en-US" sz="1200" b="0" i="0" u="none" strike="noStrike" kern="1200" cap="none" spc="0" normalizeH="0" baseline="0" noProof="0" dirty="0" smtClean="0">
+                  <a:ln>
+                    <a:noFill/>
+                  </a:ln>
+                  <a:solidFill>
+                    <a:prstClr val="black"/>
+                  </a:solidFill>
+                  <a:effectLst/>
+                  <a:uLnTx/>
+                  <a:uFillTx/>
+                  <a:latin typeface="Arial" panose="020B0604020202020204" pitchFamily="34" charset="0"/>
+                  <a:ea typeface="Amazon Ember" panose="020B0603020204020204" pitchFamily="34" charset="0"/>
+                  <a:cs typeface="Arial" panose="020B0604020202020204" pitchFamily="34" charset="0"/>
+                </a:rPr>
+                <a:t>Linux</a:t>
+              </a:r>
+            </a:p>
+            <a:p>
+              <a:pPr marL="0" marR="0" lvl="0" indent="0" algn="ctr" defTabSz="914400" rtl="0" eaLnBrk="1" fontAlgn="auto" latinLnBrk="0" hangingPunct="1">
+                <a:lnSpc>
+                  <a:spcPct val="100000"/>
+                </a:lnSpc>
+                <a:spcBef>
+                  <a:spcPts val="0"/>
+                </a:spcBef>
+                <a:spcAft>
+                  <a:spcPts val="0"/>
+                </a:spcAft>
+                <a:buClrTx/>
+                <a:buSzTx/>
+                <a:buFontTx/>
+                <a:buNone/>
+                <a:tabLst/>
+                <a:defRPr/>
+              </a:pPr>
+              <a:r>
+                <a:rPr kumimoji="0" lang="en-US" sz="1200" b="0" i="0" u="none" strike="noStrike" kern="1200" cap="none" spc="0" normalizeH="0" noProof="0" dirty="0" smtClean="0">
+                  <a:ln>
+                    <a:noFill/>
+                  </a:ln>
+                  <a:solidFill>
+                    <a:prstClr val="black"/>
+                  </a:solidFill>
+                  <a:effectLst/>
+                  <a:uLnTx/>
+                  <a:uFillTx/>
+                  <a:latin typeface="Arial" panose="020B0604020202020204" pitchFamily="34" charset="0"/>
+                  <a:ea typeface="Amazon Ember" panose="020B0603020204020204" pitchFamily="34" charset="0"/>
+                  <a:cs typeface="Arial" panose="020B0604020202020204" pitchFamily="34" charset="0"/>
+                </a:rPr>
+                <a:t>bastion host</a:t>
+              </a:r>
+              <a:endParaRPr kumimoji="0" lang="en-US" sz="1200" b="0" i="0" u="none" strike="noStrike" kern="1200" cap="none" spc="0" normalizeH="0" baseline="0" noProof="0" dirty="0">
+                <a:ln>
+                  <a:noFill/>
+                </a:ln>
+                <a:solidFill>
+                  <a:prstClr val="black"/>
+                </a:solidFill>
+                <a:effectLst/>
+                <a:uLnTx/>
+                <a:uFillTx/>
+                <a:latin typeface="Arial" panose="020B0604020202020204" pitchFamily="34" charset="0"/>
+                <a:ea typeface="Amazon Ember" panose="020B0603020204020204" pitchFamily="34" charset="0"/>
+                <a:cs typeface="Arial" panose="020B0604020202020204" pitchFamily="34" charset="0"/>
+              </a:endParaRPr>
+            </a:p>
+          </p:txBody>
+        </p:sp>
+      </p:grpSp>
+      <p:sp>
+        <p:nvSpPr>
+          <p:cNvPr id="51" name="TextBox 50">
             <a:extLst>
               <a:ext uri="{FF2B5EF4-FFF2-40B4-BE49-F238E27FC236}">
                 <a16:creationId xmlns:a16="http://schemas.microsoft.com/office/drawing/2014/main" id="{517096B6-EF64-C245-A3E7-BEEF81BDCB9C}"/>
@@ -3917,8 +5674,8 @@
           <p:nvPr/>
         </p:nvSpPr>
         <p:spPr>
-          <a:xfrm>
-            <a:off x="6781800" y="2519195"/>
+          <a:xfrm flipH="1">
+            <a:off x="6459758" y="2510978"/>
             <a:ext cx="1236442" cy="276999"/>
           </a:xfrm>
           <a:prstGeom prst="rect">
@@ -3932,9 +5689,34 @@
           </a:bodyPr>
           <a:lstStyle/>
           <a:p>
-            <a:pPr algn="ctr"/>
-            <a:r>
-              <a:rPr lang="en-US" sz="1200" dirty="0">
+            <a:pPr marL="0" marR="0" lvl="0" indent="0" algn="ctr" defTabSz="914400" rtl="0" eaLnBrk="1" fontAlgn="auto" latinLnBrk="0" hangingPunct="1">
+              <a:lnSpc>
+                <a:spcPct val="100000"/>
+              </a:lnSpc>
+              <a:spcBef>
+                <a:spcPts val="0"/>
+              </a:spcBef>
+              <a:spcAft>
+                <a:spcPts val="0"/>
+              </a:spcAft>
+              <a:buClrTx/>
+              <a:buSzTx/>
+              <a:buFontTx/>
+              <a:buNone/>
+              <a:tabLst/>
+              <a:defRPr/>
+            </a:pPr>
+            <a:r>
+              <a:rPr kumimoji="0" lang="en-US" sz="1200" b="0" i="0" u="none" strike="noStrike" kern="1200" cap="none" spc="0" normalizeH="0" baseline="0" noProof="0" dirty="0">
+                <a:ln>
+                  <a:noFill/>
+                </a:ln>
+                <a:solidFill>
+                  <a:prstClr val="black"/>
+                </a:solidFill>
+                <a:effectLst/>
+                <a:uLnTx/>
+                <a:uFillTx/>
                 <a:latin typeface="Arial" panose="020B0604020202020204" pitchFamily="34" charset="0"/>
                 <a:ea typeface="Amazon Ember" panose="020B0603020204020204" pitchFamily="34" charset="0"/>
                 <a:cs typeface="Arial" panose="020B0604020202020204" pitchFamily="34" charset="0"/>
@@ -3946,7 +5728,7 @@
       </p:sp>
       <p:pic>
         <p:nvPicPr>
-          <p:cNvPr id="24" name="Graphic 40">
+          <p:cNvPr id="52" name="Graphic 40">
             <a:extLst>
               <a:ext uri="{FF2B5EF4-FFF2-40B4-BE49-F238E27FC236}">
                 <a16:creationId xmlns:a16="http://schemas.microsoft.com/office/drawing/2014/main" id="{C322592C-EAB9-0640-95A5-D8FF5B8E5FE6}"/>
@@ -3959,10 +5741,10 @@
           <p:nvPr/>
         </p:nvPicPr>
         <p:blipFill>
-          <a:blip r:embed="rId14">
+          <a:blip r:embed="rId18">
             <a:extLst>
               <a:ext uri="{96DAC541-7B7A-43D3-8B79-37D633B846F1}">
-                <asvg:svgBlip xmlns="" xmlns:asvg="http://schemas.microsoft.com/office/drawing/2016/SVG/main" r:embed="rId17"/>
+                <asvg:svgBlip xmlns="" xmlns:asvg="http://schemas.microsoft.com/office/drawing/2016/SVG/main" r:embed="rId19"/>
               </a:ext>
             </a:extLst>
           </a:blip>
@@ -3972,7 +5754,7 @@
         </p:blipFill>
         <p:spPr>
           <a:xfrm>
-            <a:off x="7165071" y="2033954"/>
+            <a:off x="6843029" y="2032718"/>
             <a:ext cx="469900" cy="469900"/>
           </a:xfrm>
           <a:prstGeom prst="rect">
@@ -3980,1061 +5762,492 @@
           </a:prstGeom>
         </p:spPr>
       </p:pic>
-      <p:pic>
-        <p:nvPicPr>
-          <p:cNvPr id="27" name="Graphic 43">
+      <p:grpSp>
+        <p:nvGrpSpPr>
+          <p:cNvPr id="2" name="Group 1"/>
+          <p:cNvGrpSpPr/>
+          <p:nvPr/>
+        </p:nvGrpSpPr>
+        <p:grpSpPr>
+          <a:xfrm>
+            <a:off x="7807697" y="2032718"/>
+            <a:ext cx="2292350" cy="2351559"/>
+            <a:chOff x="7807697" y="1600200"/>
+            <a:chExt cx="2292350" cy="2351559"/>
+          </a:xfrm>
+        </p:grpSpPr>
+        <p:pic>
+          <p:nvPicPr>
+            <p:cNvPr id="30" name="Graphic 15">
+              <a:extLst>
+                <a:ext uri="{FF2B5EF4-FFF2-40B4-BE49-F238E27FC236}">
+                  <a16:creationId xmlns:a16="http://schemas.microsoft.com/office/drawing/2014/main" id="{3A010F8A-DF9B-CA43-8D41-3A122544E272}"/>
+                </a:ext>
+              </a:extLst>
+            </p:cNvPr>
+            <p:cNvPicPr>
+              <a:picLocks noChangeAspect="1" noChangeArrowheads="1"/>
+            </p:cNvPicPr>
+            <p:nvPr/>
+          </p:nvPicPr>
+          <p:blipFill>
+            <a:blip r:embed="rId20" cstate="print">
+              <a:extLst>
+                <a:ext uri="{28A0092B-C50C-407E-A947-70E740481C1C}">
+                  <a14:useLocalDpi xmlns:a14="http://schemas.microsoft.com/office/drawing/2010/main" val="0"/>
+                </a:ext>
+              </a:extLst>
+            </a:blip>
+            <a:srcRect/>
+            <a:stretch>
+              <a:fillRect/>
+            </a:stretch>
+          </p:blipFill>
+          <p:spPr bwMode="auto">
+            <a:xfrm>
+              <a:off x="8566522" y="2921567"/>
+              <a:ext cx="762000" cy="762000"/>
+            </a:xfrm>
+            <a:prstGeom prst="rect">
+              <a:avLst/>
+            </a:prstGeom>
+            <a:noFill/>
+            <a:ln>
+              <a:noFill/>
+            </a:ln>
             <a:extLst>
-              <a:ext uri="{FF2B5EF4-FFF2-40B4-BE49-F238E27FC236}">
-                <a16:creationId xmlns:a16="http://schemas.microsoft.com/office/drawing/2014/main" id="{AA07898E-3D66-5446-8B50-9BAB110FEFDB}"/>
+              <a:ext uri="{909E8E84-426E-40DD-AFC4-6F175D3DCCD1}">
+                <a14:hiddenFill xmlns:a14="http://schemas.microsoft.com/office/drawing/2010/main">
+                  <a:solidFill>
+                    <a:srgbClr val="FFFFFF"/>
+                  </a:solidFill>
+                </a14:hiddenFill>
+              </a:ext>
+              <a:ext uri="{91240B29-F687-4F45-9708-019B960494DF}">
+                <a14:hiddenLine xmlns:a14="http://schemas.microsoft.com/office/drawing/2010/main" w="9525">
+                  <a:solidFill>
+                    <a:srgbClr val="000000"/>
+                  </a:solidFill>
+                  <a:miter lim="800000"/>
+                  <a:headEnd/>
+                  <a:tailEnd/>
+                </a14:hiddenLine>
               </a:ext>
             </a:extLst>
-          </p:cNvPr>
-          <p:cNvPicPr>
-            <a:picLocks noChangeAspect="1"/>
-          </p:cNvPicPr>
-          <p:nvPr/>
-        </p:nvPicPr>
-        <p:blipFill>
-          <a:blip r:embed="rId18">
+          </p:spPr>
+        </p:pic>
+        <p:sp>
+          <p:nvSpPr>
+            <p:cNvPr id="31" name="TextBox 11">
+              <a:extLst>
+                <a:ext uri="{FF2B5EF4-FFF2-40B4-BE49-F238E27FC236}">
+                  <a16:creationId xmlns:a16="http://schemas.microsoft.com/office/drawing/2014/main" id="{EE7EF599-CC93-1843-94CE-F010641A8D23}"/>
+                </a:ext>
+              </a:extLst>
+            </p:cNvPr>
+            <p:cNvSpPr txBox="1">
+              <a:spLocks noChangeArrowheads="1"/>
+            </p:cNvSpPr>
+            <p:nvPr/>
+          </p:nvSpPr>
+          <p:spPr bwMode="auto">
+            <a:xfrm>
+              <a:off x="7807697" y="3674760"/>
+              <a:ext cx="2292350" cy="276999"/>
+            </a:xfrm>
+            <a:prstGeom prst="rect">
+              <a:avLst/>
+            </a:prstGeom>
+            <a:noFill/>
+            <a:ln>
+              <a:noFill/>
+            </a:ln>
             <a:extLst>
-              <a:ext uri="{BEBA8EAE-BF5A-486C-A8C5-ECC9F3942E4B}">
-                <a14:imgProps xmlns:a14="http://schemas.microsoft.com/office/drawing/2010/main">
-                  <a14:imgLayer r:embed="rId19">
-                    <a14:imgEffect>
-                      <a14:artisticBlur/>
-                    </a14:imgEffect>
-                  </a14:imgLayer>
-                </a14:imgProps>
+              <a:ext uri="{909E8E84-426E-40DD-AFC4-6F175D3DCCD1}">
+                <a14:hiddenFill xmlns:a14="http://schemas.microsoft.com/office/drawing/2010/main">
+                  <a:solidFill>
+                    <a:srgbClr val="FFFFFF"/>
+                  </a:solidFill>
+                </a14:hiddenFill>
               </a:ext>
-              <a:ext uri="{96DAC541-7B7A-43D3-8B79-37D633B846F1}">
-                <asvg:svgBlip xmlns="" xmlns:asvg="http://schemas.microsoft.com/office/drawing/2016/SVG/main" r:embed="rId32"/>
+              <a:ext uri="{91240B29-F687-4F45-9708-019B960494DF}">
+                <a14:hiddenLine xmlns:a14="http://schemas.microsoft.com/office/drawing/2010/main" w="9525">
+                  <a:solidFill>
+                    <a:srgbClr val="000000"/>
+                  </a:solidFill>
+                  <a:miter lim="800000"/>
+                  <a:headEnd/>
+                  <a:tailEnd/>
+                </a14:hiddenLine>
               </a:ext>
             </a:extLst>
-          </a:blip>
-          <a:stretch>
-            <a:fillRect/>
-          </a:stretch>
-        </p:blipFill>
-        <p:spPr>
-          <a:xfrm>
-            <a:off x="5778500" y="2094808"/>
-            <a:ext cx="469900" cy="469900"/>
-          </a:xfrm>
-          <a:prstGeom prst="rect">
-            <a:avLst/>
-          </a:prstGeom>
-        </p:spPr>
-      </p:pic>
-      <p:pic>
-        <p:nvPicPr>
-          <p:cNvPr id="30" name="Graphic 15">
+          </p:spPr>
+          <p:txBody>
+            <a:bodyPr>
+              <a:spAutoFit/>
+            </a:bodyPr>
+            <a:lstStyle>
+              <a:lvl1pPr>
+                <a:defRPr>
+                  <a:solidFill>
+                    <a:schemeClr val="tx1"/>
+                  </a:solidFill>
+                  <a:latin typeface="Calibri" panose="020F0502020204030204" pitchFamily="34" charset="0"/>
+                </a:defRPr>
+              </a:lvl1pPr>
+              <a:lvl2pPr marL="742950" indent="-285750">
+                <a:defRPr>
+                  <a:solidFill>
+                    <a:schemeClr val="tx1"/>
+                  </a:solidFill>
+                  <a:latin typeface="Calibri" panose="020F0502020204030204" pitchFamily="34" charset="0"/>
+                </a:defRPr>
+              </a:lvl2pPr>
+              <a:lvl3pPr marL="1143000" indent="-228600">
+                <a:defRPr>
+                  <a:solidFill>
+                    <a:schemeClr val="tx1"/>
+                  </a:solidFill>
+                  <a:latin typeface="Calibri" panose="020F0502020204030204" pitchFamily="34" charset="0"/>
+                </a:defRPr>
+              </a:lvl3pPr>
+              <a:lvl4pPr marL="1600200" indent="-228600">
+                <a:defRPr>
+                  <a:solidFill>
+                    <a:schemeClr val="tx1"/>
+                  </a:solidFill>
+                  <a:latin typeface="Calibri" panose="020F0502020204030204" pitchFamily="34" charset="0"/>
+                </a:defRPr>
+              </a:lvl4pPr>
+              <a:lvl5pPr marL="2057400" indent="-228600">
+                <a:defRPr>
+                  <a:solidFill>
+                    <a:schemeClr val="tx1"/>
+                  </a:solidFill>
+                  <a:latin typeface="Calibri" panose="020F0502020204030204" pitchFamily="34" charset="0"/>
+                </a:defRPr>
+              </a:lvl5pPr>
+              <a:lvl6pPr marL="2514600" indent="-228600" eaLnBrk="0" fontAlgn="base" hangingPunct="0">
+                <a:spcBef>
+                  <a:spcPct val="0"/>
+                </a:spcBef>
+                <a:spcAft>
+                  <a:spcPct val="0"/>
+                </a:spcAft>
+                <a:defRPr>
+                  <a:solidFill>
+                    <a:schemeClr val="tx1"/>
+                  </a:solidFill>
+                  <a:latin typeface="Calibri" panose="020F0502020204030204" pitchFamily="34" charset="0"/>
+                </a:defRPr>
+              </a:lvl6pPr>
+              <a:lvl7pPr marL="2971800" indent="-228600" eaLnBrk="0" fontAlgn="base" hangingPunct="0">
+                <a:spcBef>
+                  <a:spcPct val="0"/>
+                </a:spcBef>
+                <a:spcAft>
+                  <a:spcPct val="0"/>
+                </a:spcAft>
+                <a:defRPr>
+                  <a:solidFill>
+                    <a:schemeClr val="tx1"/>
+                  </a:solidFill>
+                  <a:latin typeface="Calibri" panose="020F0502020204030204" pitchFamily="34" charset="0"/>
+                </a:defRPr>
+              </a:lvl7pPr>
+              <a:lvl8pPr marL="3429000" indent="-228600" eaLnBrk="0" fontAlgn="base" hangingPunct="0">
+                <a:spcBef>
+                  <a:spcPct val="0"/>
+                </a:spcBef>
+                <a:spcAft>
+                  <a:spcPct val="0"/>
+                </a:spcAft>
+                <a:defRPr>
+                  <a:solidFill>
+                    <a:schemeClr val="tx1"/>
+                  </a:solidFill>
+                  <a:latin typeface="Calibri" panose="020F0502020204030204" pitchFamily="34" charset="0"/>
+                </a:defRPr>
+              </a:lvl8pPr>
+              <a:lvl9pPr marL="3886200" indent="-228600" eaLnBrk="0" fontAlgn="base" hangingPunct="0">
+                <a:spcBef>
+                  <a:spcPct val="0"/>
+                </a:spcBef>
+                <a:spcAft>
+                  <a:spcPct val="0"/>
+                </a:spcAft>
+                <a:defRPr>
+                  <a:solidFill>
+                    <a:schemeClr val="tx1"/>
+                  </a:solidFill>
+                  <a:latin typeface="Calibri" panose="020F0502020204030204" pitchFamily="34" charset="0"/>
+                </a:defRPr>
+              </a:lvl9pPr>
+            </a:lstStyle>
+            <a:p>
+              <a:pPr marL="0" marR="0" lvl="0" indent="0" algn="ctr" defTabSz="914400" rtl="0" eaLnBrk="1" fontAlgn="auto" latinLnBrk="0" hangingPunct="1">
+                <a:lnSpc>
+                  <a:spcPct val="100000"/>
+                </a:lnSpc>
+                <a:spcBef>
+                  <a:spcPts val="0"/>
+                </a:spcBef>
+                <a:spcAft>
+                  <a:spcPts val="0"/>
+                </a:spcAft>
+                <a:buClrTx/>
+                <a:buSzTx/>
+                <a:buFontTx/>
+                <a:buNone/>
+                <a:tabLst/>
+                <a:defRPr/>
+              </a:pPr>
+              <a:r>
+                <a:rPr kumimoji="0" lang="en-US" altLang="en-US" sz="1200" b="0" i="0" u="none" strike="noStrike" kern="1200" cap="none" spc="0" normalizeH="0" baseline="0" noProof="0" dirty="0">
+                  <a:ln>
+                    <a:noFill/>
+                  </a:ln>
+                  <a:solidFill>
+                    <a:prstClr val="black"/>
+                  </a:solidFill>
+                  <a:effectLst/>
+                  <a:uLnTx/>
+                  <a:uFillTx/>
+                  <a:latin typeface="Arial" panose="020B0604020202020204" pitchFamily="34" charset="0"/>
+                  <a:ea typeface="Amazon Ember" panose="020B0603020204020204" pitchFamily="34" charset="0"/>
+                  <a:cs typeface="Arial" panose="020B0604020202020204" pitchFamily="34" charset="0"/>
+                </a:rPr>
+                <a:t>AWS Systems Manager</a:t>
+              </a:r>
+            </a:p>
+          </p:txBody>
+        </p:sp>
+        <p:pic>
+          <p:nvPicPr>
+            <p:cNvPr id="37" name="Graphic 17">
+              <a:extLst>
+                <a:ext uri="{FF2B5EF4-FFF2-40B4-BE49-F238E27FC236}">
+                  <a16:creationId xmlns:a16="http://schemas.microsoft.com/office/drawing/2014/main" id="{443A8EDD-16C2-6848-83A6-4582C7B74B70}"/>
+                </a:ext>
+              </a:extLst>
+            </p:cNvPr>
+            <p:cNvPicPr>
+              <a:picLocks noChangeAspect="1" noChangeArrowheads="1"/>
+            </p:cNvPicPr>
+            <p:nvPr/>
+          </p:nvPicPr>
+          <p:blipFill>
+            <a:blip r:embed="rId21" cstate="print">
+              <a:extLst>
+                <a:ext uri="{28A0092B-C50C-407E-A947-70E740481C1C}">
+                  <a14:useLocalDpi xmlns:a14="http://schemas.microsoft.com/office/drawing/2010/main" val="0"/>
+                </a:ext>
+              </a:extLst>
+            </a:blip>
+            <a:srcRect/>
+            <a:stretch>
+              <a:fillRect/>
+            </a:stretch>
+          </p:blipFill>
+          <p:spPr bwMode="auto">
+            <a:xfrm>
+              <a:off x="8558784" y="1600200"/>
+              <a:ext cx="762000" cy="762000"/>
+            </a:xfrm>
+            <a:prstGeom prst="rect">
+              <a:avLst/>
+            </a:prstGeom>
+            <a:noFill/>
+            <a:ln>
+              <a:noFill/>
+            </a:ln>
             <a:extLst>
-              <a:ext uri="{FF2B5EF4-FFF2-40B4-BE49-F238E27FC236}">
-                <a16:creationId xmlns:a16="http://schemas.microsoft.com/office/drawing/2014/main" id="{3A010F8A-DF9B-CA43-8D41-3A122544E272}"/>
+              <a:ext uri="{909E8E84-426E-40DD-AFC4-6F175D3DCCD1}">
+                <a14:hiddenFill xmlns:a14="http://schemas.microsoft.com/office/drawing/2010/main">
+                  <a:solidFill>
+                    <a:srgbClr val="FFFFFF"/>
+                  </a:solidFill>
+                </a14:hiddenFill>
+              </a:ext>
+              <a:ext uri="{91240B29-F687-4F45-9708-019B960494DF}">
+                <a14:hiddenLine xmlns:a14="http://schemas.microsoft.com/office/drawing/2010/main" w="9525">
+                  <a:solidFill>
+                    <a:srgbClr val="000000"/>
+                  </a:solidFill>
+                  <a:miter lim="800000"/>
+                  <a:headEnd/>
+                  <a:tailEnd/>
+                </a14:hiddenLine>
               </a:ext>
             </a:extLst>
-          </p:cNvPr>
-          <p:cNvPicPr>
-            <a:picLocks noChangeAspect="1" noChangeArrowheads="1"/>
-          </p:cNvPicPr>
-          <p:nvPr/>
-        </p:nvPicPr>
-        <p:blipFill>
-          <a:blip r:embed="rId33" cstate="print">
+          </p:spPr>
+        </p:pic>
+        <p:sp>
+          <p:nvSpPr>
+            <p:cNvPr id="38" name="TextBox 9">
+              <a:extLst>
+                <a:ext uri="{FF2B5EF4-FFF2-40B4-BE49-F238E27FC236}">
+                  <a16:creationId xmlns:a16="http://schemas.microsoft.com/office/drawing/2014/main" id="{F9D6EE48-441C-334D-8184-61EA0808B9C5}"/>
+                </a:ext>
+              </a:extLst>
+            </p:cNvPr>
+            <p:cNvSpPr txBox="1">
+              <a:spLocks noChangeArrowheads="1"/>
+            </p:cNvSpPr>
+            <p:nvPr/>
+          </p:nvSpPr>
+          <p:spPr bwMode="auto">
+            <a:xfrm>
+              <a:off x="7816164" y="2349330"/>
+              <a:ext cx="2243137" cy="276999"/>
+            </a:xfrm>
+            <a:prstGeom prst="rect">
+              <a:avLst/>
+            </a:prstGeom>
+            <a:noFill/>
+            <a:ln>
+              <a:noFill/>
+            </a:ln>
             <a:extLst>
-              <a:ext uri="{28A0092B-C50C-407E-A947-70E740481C1C}">
-                <a14:useLocalDpi xmlns:a14="http://schemas.microsoft.com/office/drawing/2010/main" val="0"/>
+              <a:ext uri="{909E8E84-426E-40DD-AFC4-6F175D3DCCD1}">
+                <a14:hiddenFill xmlns:a14="http://schemas.microsoft.com/office/drawing/2010/main">
+                  <a:solidFill>
+                    <a:srgbClr val="FFFFFF"/>
+                  </a:solidFill>
+                </a14:hiddenFill>
+              </a:ext>
+              <a:ext uri="{91240B29-F687-4F45-9708-019B960494DF}">
+                <a14:hiddenLine xmlns:a14="http://schemas.microsoft.com/office/drawing/2010/main" w="9525">
+                  <a:solidFill>
+                    <a:srgbClr val="000000"/>
+                  </a:solidFill>
+                  <a:miter lim="800000"/>
+                  <a:headEnd/>
+                  <a:tailEnd/>
+                </a14:hiddenLine>
               </a:ext>
             </a:extLst>
-          </a:blip>
-          <a:srcRect/>
-          <a:stretch>
-            <a:fillRect/>
-          </a:stretch>
-        </p:blipFill>
-        <p:spPr bwMode="auto">
-          <a:xfrm>
-            <a:off x="8677275" y="3313208"/>
-            <a:ext cx="762000" cy="762000"/>
-          </a:xfrm>
-          <a:prstGeom prst="rect">
-            <a:avLst/>
-          </a:prstGeom>
-          <a:noFill/>
-          <a:ln>
-            <a:noFill/>
-          </a:ln>
-          <a:extLst>
-            <a:ext uri="{909E8E84-426E-40DD-AFC4-6F175D3DCCD1}">
-              <a14:hiddenFill xmlns:a14="http://schemas.microsoft.com/office/drawing/2010/main">
-                <a:solidFill>
-                  <a:srgbClr val="FFFFFF"/>
-                </a:solidFill>
-              </a14:hiddenFill>
-            </a:ext>
-            <a:ext uri="{91240B29-F687-4F45-9708-019B960494DF}">
-              <a14:hiddenLine xmlns:a14="http://schemas.microsoft.com/office/drawing/2010/main" w="9525">
-                <a:solidFill>
-                  <a:srgbClr val="000000"/>
-                </a:solidFill>
-                <a:miter lim="800000"/>
-                <a:headEnd/>
-                <a:tailEnd/>
-              </a14:hiddenLine>
-            </a:ext>
-          </a:extLst>
-        </p:spPr>
-      </p:pic>
-      <p:sp>
-        <p:nvSpPr>
-          <p:cNvPr id="31" name="TextBox 11">
-            <a:extLst>
-              <a:ext uri="{FF2B5EF4-FFF2-40B4-BE49-F238E27FC236}">
-                <a16:creationId xmlns:a16="http://schemas.microsoft.com/office/drawing/2014/main" id="{EE7EF599-CC93-1843-94CE-F010641A8D23}"/>
-              </a:ext>
-            </a:extLst>
-          </p:cNvPr>
-          <p:cNvSpPr txBox="1">
-            <a:spLocks noChangeArrowheads="1"/>
-          </p:cNvSpPr>
-          <p:nvPr/>
-        </p:nvSpPr>
-        <p:spPr bwMode="auto">
-          <a:xfrm>
-            <a:off x="7918450" y="4066401"/>
-            <a:ext cx="2292350" cy="276999"/>
-          </a:xfrm>
-          <a:prstGeom prst="rect">
-            <a:avLst/>
-          </a:prstGeom>
-          <a:noFill/>
-          <a:ln>
-            <a:noFill/>
-          </a:ln>
-          <a:extLst>
-            <a:ext uri="{909E8E84-426E-40DD-AFC4-6F175D3DCCD1}">
-              <a14:hiddenFill xmlns:a14="http://schemas.microsoft.com/office/drawing/2010/main">
-                <a:solidFill>
-                  <a:srgbClr val="FFFFFF"/>
-                </a:solidFill>
-              </a14:hiddenFill>
-            </a:ext>
-            <a:ext uri="{91240B29-F687-4F45-9708-019B960494DF}">
-              <a14:hiddenLine xmlns:a14="http://schemas.microsoft.com/office/drawing/2010/main" w="9525">
-                <a:solidFill>
-                  <a:srgbClr val="000000"/>
-                </a:solidFill>
-                <a:miter lim="800000"/>
-                <a:headEnd/>
-                <a:tailEnd/>
-              </a14:hiddenLine>
-            </a:ext>
-          </a:extLst>
-        </p:spPr>
-        <p:txBody>
-          <a:bodyPr>
-            <a:spAutoFit/>
-          </a:bodyPr>
-          <a:lstStyle>
-            <a:lvl1pPr>
-              <a:defRPr>
-                <a:solidFill>
-                  <a:schemeClr val="tx1"/>
-                </a:solidFill>
-                <a:latin typeface="Calibri" panose="020F0502020204030204" pitchFamily="34" charset="0"/>
-              </a:defRPr>
-            </a:lvl1pPr>
-            <a:lvl2pPr marL="742950" indent="-285750">
-              <a:defRPr>
-                <a:solidFill>
-                  <a:schemeClr val="tx1"/>
-                </a:solidFill>
-                <a:latin typeface="Calibri" panose="020F0502020204030204" pitchFamily="34" charset="0"/>
-              </a:defRPr>
-            </a:lvl2pPr>
-            <a:lvl3pPr marL="1143000" indent="-228600">
-              <a:defRPr>
-                <a:solidFill>
-                  <a:schemeClr val="tx1"/>
-                </a:solidFill>
-                <a:latin typeface="Calibri" panose="020F0502020204030204" pitchFamily="34" charset="0"/>
-              </a:defRPr>
-            </a:lvl3pPr>
-            <a:lvl4pPr marL="1600200" indent="-228600">
-              <a:defRPr>
-                <a:solidFill>
-                  <a:schemeClr val="tx1"/>
-                </a:solidFill>
-                <a:latin typeface="Calibri" panose="020F0502020204030204" pitchFamily="34" charset="0"/>
-              </a:defRPr>
-            </a:lvl4pPr>
-            <a:lvl5pPr marL="2057400" indent="-228600">
-              <a:defRPr>
-                <a:solidFill>
-                  <a:schemeClr val="tx1"/>
-                </a:solidFill>
-                <a:latin typeface="Calibri" panose="020F0502020204030204" pitchFamily="34" charset="0"/>
-              </a:defRPr>
-            </a:lvl5pPr>
-            <a:lvl6pPr marL="2514600" indent="-228600" eaLnBrk="0" fontAlgn="base" hangingPunct="0">
-              <a:spcBef>
-                <a:spcPct val="0"/>
-              </a:spcBef>
-              <a:spcAft>
-                <a:spcPct val="0"/>
-              </a:spcAft>
-              <a:defRPr>
-                <a:solidFill>
-                  <a:schemeClr val="tx1"/>
-                </a:solidFill>
-                <a:latin typeface="Calibri" panose="020F0502020204030204" pitchFamily="34" charset="0"/>
-              </a:defRPr>
-            </a:lvl6pPr>
-            <a:lvl7pPr marL="2971800" indent="-228600" eaLnBrk="0" fontAlgn="base" hangingPunct="0">
-              <a:spcBef>
-                <a:spcPct val="0"/>
-              </a:spcBef>
-              <a:spcAft>
-                <a:spcPct val="0"/>
-              </a:spcAft>
-              <a:defRPr>
-                <a:solidFill>
-                  <a:schemeClr val="tx1"/>
-                </a:solidFill>
-                <a:latin typeface="Calibri" panose="020F0502020204030204" pitchFamily="34" charset="0"/>
-              </a:defRPr>
-            </a:lvl7pPr>
-            <a:lvl8pPr marL="3429000" indent="-228600" eaLnBrk="0" fontAlgn="base" hangingPunct="0">
-              <a:spcBef>
-                <a:spcPct val="0"/>
-              </a:spcBef>
-              <a:spcAft>
-                <a:spcPct val="0"/>
-              </a:spcAft>
-              <a:defRPr>
-                <a:solidFill>
-                  <a:schemeClr val="tx1"/>
-                </a:solidFill>
-                <a:latin typeface="Calibri" panose="020F0502020204030204" pitchFamily="34" charset="0"/>
-              </a:defRPr>
-            </a:lvl8pPr>
-            <a:lvl9pPr marL="3886200" indent="-228600" eaLnBrk="0" fontAlgn="base" hangingPunct="0">
-              <a:spcBef>
-                <a:spcPct val="0"/>
-              </a:spcBef>
-              <a:spcAft>
-                <a:spcPct val="0"/>
-              </a:spcAft>
-              <a:defRPr>
-                <a:solidFill>
-                  <a:schemeClr val="tx1"/>
-                </a:solidFill>
-                <a:latin typeface="Calibri" panose="020F0502020204030204" pitchFamily="34" charset="0"/>
-              </a:defRPr>
-            </a:lvl9pPr>
-          </a:lstStyle>
-          <a:p>
-            <a:pPr algn="ctr" eaLnBrk="1" hangingPunct="1"/>
-            <a:r>
-              <a:rPr lang="en-US" altLang="en-US" sz="1200" dirty="0">
-                <a:latin typeface="Arial" panose="020B0604020202020204" pitchFamily="34" charset="0"/>
-                <a:ea typeface="Amazon Ember" panose="020B0603020204020204" pitchFamily="34" charset="0"/>
-                <a:cs typeface="Arial" panose="020B0604020202020204" pitchFamily="34" charset="0"/>
-              </a:rPr>
-              <a:t>AWS Systems Manager</a:t>
-            </a:r>
-          </a:p>
-        </p:txBody>
-      </p:sp>
-      <p:sp>
-        <p:nvSpPr>
-          <p:cNvPr id="39" name="Rectangle 38">
-            <a:extLst>
-              <a:ext uri="{FF2B5EF4-FFF2-40B4-BE49-F238E27FC236}">
-                <a16:creationId xmlns:a16="http://schemas.microsoft.com/office/drawing/2014/main" id="{34D72B91-09F3-9A42-B66A-106F01CCE8B4}"/>
-              </a:ext>
-            </a:extLst>
-          </p:cNvPr>
-          <p:cNvSpPr/>
-          <p:nvPr/>
-        </p:nvSpPr>
-        <p:spPr>
-          <a:xfrm>
-            <a:off x="1044620" y="1214882"/>
-            <a:ext cx="7184980" cy="4042918"/>
-          </a:xfrm>
-          <a:prstGeom prst="rect">
-            <a:avLst/>
-          </a:prstGeom>
-          <a:noFill/>
-          <a:ln w="12700">
-            <a:solidFill>
-              <a:srgbClr val="1E8900"/>
-            </a:solidFill>
-          </a:ln>
-        </p:spPr>
-        <p:style>
-          <a:lnRef idx="2">
-            <a:schemeClr val="accent1">
-              <a:shade val="50000"/>
-            </a:schemeClr>
-          </a:lnRef>
-          <a:fillRef idx="1">
-            <a:schemeClr val="accent1"/>
-          </a:fillRef>
-          <a:effectRef idx="0">
-            <a:schemeClr val="accent1"/>
-          </a:effectRef>
-          <a:fontRef idx="minor">
-            <a:schemeClr val="lt1"/>
-          </a:fontRef>
-        </p:style>
-        <p:txBody>
-          <a:bodyPr lIns="457200" tIns="91440"/>
-          <a:lstStyle/>
-          <a:p>
-            <a:pPr eaLnBrk="1" fontAlgn="auto" hangingPunct="1">
-              <a:spcBef>
-                <a:spcPts val="0"/>
-              </a:spcBef>
-              <a:spcAft>
-                <a:spcPts val="0"/>
-              </a:spcAft>
-              <a:defRPr/>
-            </a:pPr>
-            <a:r>
-              <a:rPr lang="en-US" sz="1200" dirty="0">
-                <a:ln w="0"/>
-                <a:solidFill>
-                  <a:srgbClr val="1E8900"/>
-                </a:solidFill>
-                <a:latin typeface="Arial" panose="020B0604020202020204" pitchFamily="34" charset="0"/>
-                <a:cs typeface="Arial" panose="020B0604020202020204" pitchFamily="34" charset="0"/>
-              </a:rPr>
-              <a:t>VPC</a:t>
-            </a:r>
-          </a:p>
-        </p:txBody>
-      </p:sp>
-      <p:pic>
-        <p:nvPicPr>
-          <p:cNvPr id="40" name="Graphic 28">
-            <a:extLst>
-              <a:ext uri="{FF2B5EF4-FFF2-40B4-BE49-F238E27FC236}">
-                <a16:creationId xmlns:a16="http://schemas.microsoft.com/office/drawing/2014/main" id="{88C69878-A4A8-CE45-B624-0223CB16619E}"/>
-              </a:ext>
-            </a:extLst>
-          </p:cNvPr>
-          <p:cNvPicPr>
-            <a:picLocks noChangeAspect="1" noChangeArrowheads="1"/>
-          </p:cNvPicPr>
-          <p:nvPr/>
-        </p:nvPicPr>
-        <p:blipFill>
-          <a:blip r:embed="rId34" cstate="print">
-            <a:extLst>
-              <a:ext uri="{28A0092B-C50C-407E-A947-70E740481C1C}">
-                <a14:useLocalDpi xmlns:a14="http://schemas.microsoft.com/office/drawing/2010/main" val="0"/>
-              </a:ext>
-            </a:extLst>
-          </a:blip>
-          <a:srcRect/>
-          <a:stretch>
-            <a:fillRect/>
-          </a:stretch>
-        </p:blipFill>
-        <p:spPr bwMode="auto">
-          <a:xfrm>
-            <a:off x="1044620" y="1214882"/>
-            <a:ext cx="330200" cy="330200"/>
-          </a:xfrm>
-          <a:prstGeom prst="rect">
-            <a:avLst/>
-          </a:prstGeom>
-          <a:noFill/>
-          <a:ln>
-            <a:noFill/>
-          </a:ln>
-          <a:extLst>
-            <a:ext uri="{909E8E84-426E-40DD-AFC4-6F175D3DCCD1}">
-              <a14:hiddenFill xmlns:a14="http://schemas.microsoft.com/office/drawing/2010/main">
-                <a:solidFill>
-                  <a:srgbClr val="FFFFFF"/>
-                </a:solidFill>
-              </a14:hiddenFill>
-            </a:ext>
-            <a:ext uri="{91240B29-F687-4F45-9708-019B960494DF}">
-              <a14:hiddenLine xmlns:a14="http://schemas.microsoft.com/office/drawing/2010/main" w="9525">
-                <a:solidFill>
-                  <a:srgbClr val="000000"/>
-                </a:solidFill>
-                <a:miter lim="800000"/>
-                <a:headEnd/>
-                <a:tailEnd/>
-              </a14:hiddenLine>
-            </a:ext>
-          </a:extLst>
-        </p:spPr>
-      </p:pic>
-      <p:sp>
-        <p:nvSpPr>
-          <p:cNvPr id="41" name="Rectangle 40">
-            <a:extLst>
-              <a:ext uri="{FF2B5EF4-FFF2-40B4-BE49-F238E27FC236}">
-                <a16:creationId xmlns:a16="http://schemas.microsoft.com/office/drawing/2014/main" id="{D246DAA1-0260-E449-8CA2-92FF0101149D}"/>
-              </a:ext>
-            </a:extLst>
-          </p:cNvPr>
-          <p:cNvSpPr/>
-          <p:nvPr/>
-        </p:nvSpPr>
-        <p:spPr>
-          <a:xfrm>
-            <a:off x="1447800" y="932962"/>
-            <a:ext cx="2884905" cy="4401038"/>
-          </a:xfrm>
-          <a:prstGeom prst="rect">
-            <a:avLst/>
-          </a:prstGeom>
-          <a:noFill/>
-          <a:ln w="12700">
-            <a:solidFill>
-              <a:srgbClr val="5B9CD5"/>
-            </a:solidFill>
-            <a:prstDash val="dash"/>
-          </a:ln>
-        </p:spPr>
-        <p:style>
-          <a:lnRef idx="2">
-            <a:schemeClr val="accent1">
-              <a:shade val="50000"/>
-            </a:schemeClr>
-          </a:lnRef>
-          <a:fillRef idx="1">
-            <a:schemeClr val="accent1"/>
-          </a:fillRef>
-          <a:effectRef idx="0">
-            <a:schemeClr val="accent1"/>
-          </a:effectRef>
-          <a:fontRef idx="minor">
-            <a:schemeClr val="lt1"/>
-          </a:fontRef>
-        </p:style>
-        <p:txBody>
-          <a:bodyPr tIns="91440"/>
-          <a:lstStyle/>
-          <a:p>
-            <a:pPr algn="ctr" eaLnBrk="1" fontAlgn="auto" hangingPunct="1">
-              <a:spcBef>
-                <a:spcPts val="0"/>
-              </a:spcBef>
-              <a:spcAft>
-                <a:spcPts val="0"/>
-              </a:spcAft>
-              <a:defRPr/>
-            </a:pPr>
-            <a:r>
-              <a:rPr lang="en-US" sz="1200">
-                <a:solidFill>
-                  <a:srgbClr val="5B9CD5"/>
-                </a:solidFill>
-                <a:latin typeface="Arial" panose="020B0604020202020204" pitchFamily="34" charset="0"/>
-                <a:cs typeface="Arial" panose="020B0604020202020204" pitchFamily="34" charset="0"/>
-              </a:rPr>
-              <a:t>Availability </a:t>
-            </a:r>
-            <a:r>
-              <a:rPr lang="en-US" sz="1200" smtClean="0">
-                <a:solidFill>
-                  <a:srgbClr val="5B9CD5"/>
-                </a:solidFill>
-                <a:latin typeface="Arial" panose="020B0604020202020204" pitchFamily="34" charset="0"/>
-                <a:cs typeface="Arial" panose="020B0604020202020204" pitchFamily="34" charset="0"/>
-              </a:rPr>
-              <a:t>Zone 1</a:t>
-            </a:r>
-            <a:endParaRPr lang="en-US" sz="1200" dirty="0">
-              <a:solidFill>
-                <a:srgbClr val="5B9CD5"/>
-              </a:solidFill>
-              <a:latin typeface="Arial" panose="020B0604020202020204" pitchFamily="34" charset="0"/>
-              <a:cs typeface="Arial" panose="020B0604020202020204" pitchFamily="34" charset="0"/>
-            </a:endParaRPr>
-          </a:p>
-        </p:txBody>
-      </p:sp>
-      <p:sp>
-        <p:nvSpPr>
-          <p:cNvPr id="42" name="Rectangle 41">
-            <a:extLst>
-              <a:ext uri="{FF2B5EF4-FFF2-40B4-BE49-F238E27FC236}">
-                <a16:creationId xmlns:a16="http://schemas.microsoft.com/office/drawing/2014/main" id="{D246DAA1-0260-E449-8CA2-92FF0101149D}"/>
-              </a:ext>
-            </a:extLst>
-          </p:cNvPr>
-          <p:cNvSpPr/>
-          <p:nvPr/>
-        </p:nvSpPr>
-        <p:spPr>
-          <a:xfrm>
-            <a:off x="5268495" y="932962"/>
-            <a:ext cx="2884905" cy="4401038"/>
-          </a:xfrm>
-          <a:prstGeom prst="rect">
-            <a:avLst/>
-          </a:prstGeom>
-          <a:noFill/>
-          <a:ln w="12700">
-            <a:solidFill>
-              <a:srgbClr val="5B9CD5"/>
-            </a:solidFill>
-            <a:prstDash val="dash"/>
-          </a:ln>
-        </p:spPr>
-        <p:style>
-          <a:lnRef idx="2">
-            <a:schemeClr val="accent1">
-              <a:shade val="50000"/>
-            </a:schemeClr>
-          </a:lnRef>
-          <a:fillRef idx="1">
-            <a:schemeClr val="accent1"/>
-          </a:fillRef>
-          <a:effectRef idx="0">
-            <a:schemeClr val="accent1"/>
-          </a:effectRef>
-          <a:fontRef idx="minor">
-            <a:schemeClr val="lt1"/>
-          </a:fontRef>
-        </p:style>
-        <p:txBody>
-          <a:bodyPr tIns="91440"/>
-          <a:lstStyle/>
-          <a:p>
-            <a:pPr algn="ctr" eaLnBrk="1" fontAlgn="auto" hangingPunct="1">
-              <a:spcBef>
-                <a:spcPts val="0"/>
-              </a:spcBef>
-              <a:spcAft>
-                <a:spcPts val="0"/>
-              </a:spcAft>
-              <a:defRPr/>
-            </a:pPr>
-            <a:r>
-              <a:rPr lang="en-US" sz="1200">
-                <a:solidFill>
-                  <a:srgbClr val="5B9CD5"/>
-                </a:solidFill>
-                <a:latin typeface="Arial" panose="020B0604020202020204" pitchFamily="34" charset="0"/>
-                <a:cs typeface="Arial" panose="020B0604020202020204" pitchFamily="34" charset="0"/>
-              </a:rPr>
-              <a:t>Availability </a:t>
-            </a:r>
-            <a:r>
-              <a:rPr lang="en-US" sz="1200" smtClean="0">
-                <a:solidFill>
-                  <a:srgbClr val="5B9CD5"/>
-                </a:solidFill>
-                <a:latin typeface="Arial" panose="020B0604020202020204" pitchFamily="34" charset="0"/>
-                <a:cs typeface="Arial" panose="020B0604020202020204" pitchFamily="34" charset="0"/>
-              </a:rPr>
-              <a:t>Zone 2</a:t>
-            </a:r>
-            <a:endParaRPr lang="en-US" sz="1200" dirty="0">
-              <a:solidFill>
-                <a:srgbClr val="5B9CD5"/>
-              </a:solidFill>
-              <a:latin typeface="Arial" panose="020B0604020202020204" pitchFamily="34" charset="0"/>
-              <a:cs typeface="Arial" panose="020B0604020202020204" pitchFamily="34" charset="0"/>
-            </a:endParaRPr>
-          </a:p>
-        </p:txBody>
-      </p:sp>
-      <p:pic>
-        <p:nvPicPr>
-          <p:cNvPr id="43" name="Graphic 135">
-            <a:extLst>
-              <a:ext uri="{FF2B5EF4-FFF2-40B4-BE49-F238E27FC236}">
-                <a16:creationId xmlns:a16="http://schemas.microsoft.com/office/drawing/2014/main" id="{C19987B1-DB3A-1640-994D-BCB81FCC1AE4}"/>
-              </a:ext>
-            </a:extLst>
-          </p:cNvPr>
-          <p:cNvPicPr>
-            <a:picLocks noChangeAspect="1"/>
-          </p:cNvPicPr>
-          <p:nvPr/>
-        </p:nvPicPr>
-        <p:blipFill>
-          <a:blip r:embed="rId12">
-            <a:extLst>
-              <a:ext uri="{96DAC541-7B7A-43D3-8B79-37D633B846F1}">
-                <asvg:svgBlip xmlns="" xmlns:asvg="http://schemas.microsoft.com/office/drawing/2016/SVG/main" r:embed="rId13"/>
-              </a:ext>
-            </a:extLst>
-          </a:blip>
-          <a:stretch>
-            <a:fillRect/>
-          </a:stretch>
-        </p:blipFill>
-        <p:spPr>
-          <a:xfrm>
-            <a:off x="3341102" y="3810000"/>
-            <a:ext cx="469900" cy="469900"/>
-          </a:xfrm>
-          <a:prstGeom prst="rect">
-            <a:avLst/>
-          </a:prstGeom>
-        </p:spPr>
-      </p:pic>
-      <p:sp>
-        <p:nvSpPr>
-          <p:cNvPr id="44" name="TextBox 43">
-            <a:extLst>
-              <a:ext uri="{FF2B5EF4-FFF2-40B4-BE49-F238E27FC236}">
-                <a16:creationId xmlns:a16="http://schemas.microsoft.com/office/drawing/2014/main" id="{F90C1CC4-DFE6-0445-BD1C-DB610E1A07F5}"/>
-              </a:ext>
-            </a:extLst>
-          </p:cNvPr>
-          <p:cNvSpPr txBox="1"/>
-          <p:nvPr/>
-        </p:nvSpPr>
-        <p:spPr>
-          <a:xfrm>
-            <a:off x="2819400" y="4255409"/>
-            <a:ext cx="1513305" cy="276999"/>
-          </a:xfrm>
-          <a:prstGeom prst="rect">
-            <a:avLst/>
-          </a:prstGeom>
-          <a:noFill/>
-        </p:spPr>
-        <p:txBody>
-          <a:bodyPr wrap="square" rtlCol="0">
-            <a:spAutoFit/>
-          </a:bodyPr>
-          <a:lstStyle/>
-          <a:p>
-            <a:pPr algn="ctr"/>
-            <a:r>
-              <a:rPr lang="en-US" sz="1200" smtClean="0">
-                <a:latin typeface="Arial" panose="020B0604020202020204" pitchFamily="34" charset="0"/>
-                <a:ea typeface="Amazon Ember" panose="020B0603020204020204" pitchFamily="34" charset="0"/>
-                <a:cs typeface="Arial" panose="020B0604020202020204" pitchFamily="34" charset="0"/>
-              </a:rPr>
-              <a:t>Cluster node 1</a:t>
-            </a:r>
-            <a:endParaRPr lang="en-US" sz="1200" dirty="0">
-              <a:latin typeface="Arial" panose="020B0604020202020204" pitchFamily="34" charset="0"/>
-              <a:ea typeface="Amazon Ember" panose="020B0603020204020204" pitchFamily="34" charset="0"/>
-              <a:cs typeface="Arial" panose="020B0604020202020204" pitchFamily="34" charset="0"/>
-            </a:endParaRPr>
-          </a:p>
-        </p:txBody>
-      </p:sp>
-      <p:pic>
-        <p:nvPicPr>
-          <p:cNvPr id="45" name="Graphic 135">
-            <a:extLst>
-              <a:ext uri="{FF2B5EF4-FFF2-40B4-BE49-F238E27FC236}">
-                <a16:creationId xmlns:a16="http://schemas.microsoft.com/office/drawing/2014/main" id="{C19987B1-DB3A-1640-994D-BCB81FCC1AE4}"/>
-              </a:ext>
-            </a:extLst>
-          </p:cNvPr>
-          <p:cNvPicPr>
-            <a:picLocks noChangeAspect="1"/>
-          </p:cNvPicPr>
-          <p:nvPr/>
-        </p:nvPicPr>
-        <p:blipFill>
-          <a:blip r:embed="rId12">
-            <a:extLst>
-              <a:ext uri="{96DAC541-7B7A-43D3-8B79-37D633B846F1}">
-                <asvg:svgBlip xmlns="" xmlns:asvg="http://schemas.microsoft.com/office/drawing/2016/SVG/main" r:embed="rId13"/>
-              </a:ext>
-            </a:extLst>
-          </a:blip>
-          <a:stretch>
-            <a:fillRect/>
-          </a:stretch>
-        </p:blipFill>
-        <p:spPr>
-          <a:xfrm>
-            <a:off x="5779502" y="3810000"/>
-            <a:ext cx="469900" cy="469900"/>
-          </a:xfrm>
-          <a:prstGeom prst="rect">
-            <a:avLst/>
-          </a:prstGeom>
-        </p:spPr>
-      </p:pic>
-      <p:sp>
-        <p:nvSpPr>
-          <p:cNvPr id="46" name="TextBox 45">
-            <a:extLst>
-              <a:ext uri="{FF2B5EF4-FFF2-40B4-BE49-F238E27FC236}">
-                <a16:creationId xmlns:a16="http://schemas.microsoft.com/office/drawing/2014/main" id="{F90C1CC4-DFE6-0445-BD1C-DB610E1A07F5}"/>
-              </a:ext>
-            </a:extLst>
-          </p:cNvPr>
-          <p:cNvSpPr txBox="1"/>
-          <p:nvPr/>
-        </p:nvSpPr>
-        <p:spPr>
-          <a:xfrm>
-            <a:off x="5257800" y="4255409"/>
-            <a:ext cx="1513305" cy="276999"/>
-          </a:xfrm>
-          <a:prstGeom prst="rect">
-            <a:avLst/>
-          </a:prstGeom>
-          <a:noFill/>
-        </p:spPr>
-        <p:txBody>
-          <a:bodyPr wrap="square" rtlCol="0">
-            <a:spAutoFit/>
-          </a:bodyPr>
-          <a:lstStyle/>
-          <a:p>
-            <a:pPr algn="ctr"/>
-            <a:r>
-              <a:rPr lang="en-US" sz="1200" smtClean="0">
-                <a:latin typeface="Arial" panose="020B0604020202020204" pitchFamily="34" charset="0"/>
-                <a:ea typeface="Amazon Ember" panose="020B0603020204020204" pitchFamily="34" charset="0"/>
-                <a:cs typeface="Arial" panose="020B0604020202020204" pitchFamily="34" charset="0"/>
-              </a:rPr>
-              <a:t>Cluster node 2</a:t>
-            </a:r>
-            <a:endParaRPr lang="en-US" sz="1200" dirty="0">
-              <a:latin typeface="Arial" panose="020B0604020202020204" pitchFamily="34" charset="0"/>
-              <a:ea typeface="Amazon Ember" panose="020B0603020204020204" pitchFamily="34" charset="0"/>
-              <a:cs typeface="Arial" panose="020B0604020202020204" pitchFamily="34" charset="0"/>
-            </a:endParaRPr>
-          </a:p>
-        </p:txBody>
-      </p:sp>
-      <p:sp>
-        <p:nvSpPr>
-          <p:cNvPr id="47" name="Rectangle 46">
-            <a:extLst>
-              <a:ext uri="{FF2B5EF4-FFF2-40B4-BE49-F238E27FC236}">
-                <a16:creationId xmlns:a16="http://schemas.microsoft.com/office/drawing/2014/main" id="{FFA89DF7-D079-0947-8E29-4EEA4975DBBD}"/>
-              </a:ext>
-            </a:extLst>
-          </p:cNvPr>
-          <p:cNvSpPr/>
-          <p:nvPr/>
-        </p:nvSpPr>
-        <p:spPr>
-          <a:xfrm>
-            <a:off x="2971800" y="3733800"/>
-            <a:ext cx="3657600" cy="838200"/>
-          </a:xfrm>
-          <a:prstGeom prst="rect">
-            <a:avLst/>
-          </a:prstGeom>
-          <a:noFill/>
-          <a:ln w="12700">
-            <a:solidFill>
-              <a:srgbClr val="5A6B86"/>
-            </a:solidFill>
-            <a:prstDash val="dash"/>
-          </a:ln>
-        </p:spPr>
-        <p:style>
-          <a:lnRef idx="2">
-            <a:schemeClr val="accent1">
-              <a:shade val="50000"/>
-            </a:schemeClr>
-          </a:lnRef>
-          <a:fillRef idx="1">
-            <a:schemeClr val="accent1"/>
-          </a:fillRef>
-          <a:effectRef idx="0">
-            <a:schemeClr val="accent1"/>
-          </a:effectRef>
-          <a:fontRef idx="minor">
-            <a:schemeClr val="lt1"/>
-          </a:fontRef>
-        </p:style>
-        <p:txBody>
-          <a:bodyPr tIns="91440"/>
-          <a:lstStyle/>
-          <a:p>
-            <a:pPr algn="ctr" eaLnBrk="1" fontAlgn="auto" hangingPunct="1">
-              <a:spcBef>
-                <a:spcPts val="0"/>
-              </a:spcBef>
-              <a:spcAft>
-                <a:spcPts val="0"/>
-              </a:spcAft>
-              <a:defRPr/>
-            </a:pPr>
-            <a:r>
-              <a:rPr lang="en-US" sz="1200" smtClean="0">
-                <a:solidFill>
-                  <a:srgbClr val="5A6B86"/>
-                </a:solidFill>
-                <a:latin typeface="Arial" panose="020B0604020202020204" pitchFamily="34" charset="0"/>
-                <a:cs typeface="Arial" panose="020B0604020202020204" pitchFamily="34" charset="0"/>
-              </a:rPr>
-              <a:t>Linux high</a:t>
-            </a:r>
-          </a:p>
-          <a:p>
-            <a:pPr algn="ctr" eaLnBrk="1" fontAlgn="auto" hangingPunct="1">
-              <a:spcBef>
-                <a:spcPts val="0"/>
-              </a:spcBef>
-              <a:spcAft>
-                <a:spcPts val="0"/>
-              </a:spcAft>
-              <a:defRPr/>
-            </a:pPr>
-            <a:r>
-              <a:rPr lang="en-US" sz="1200" smtClean="0">
-                <a:solidFill>
-                  <a:srgbClr val="5A6B86"/>
-                </a:solidFill>
-                <a:latin typeface="Arial" panose="020B0604020202020204" pitchFamily="34" charset="0"/>
-                <a:cs typeface="Arial" panose="020B0604020202020204" pitchFamily="34" charset="0"/>
-              </a:rPr>
-              <a:t>availability cluster</a:t>
-            </a:r>
-            <a:endParaRPr lang="en-US" sz="1200" dirty="0">
-              <a:solidFill>
-                <a:srgbClr val="5A6B86"/>
-              </a:solidFill>
-              <a:latin typeface="Arial" panose="020B0604020202020204" pitchFamily="34" charset="0"/>
-              <a:cs typeface="Arial" panose="020B0604020202020204" pitchFamily="34" charset="0"/>
-            </a:endParaRPr>
-          </a:p>
-        </p:txBody>
-      </p:sp>
-      <p:pic>
-        <p:nvPicPr>
-          <p:cNvPr id="48" name="Graphic 17">
-            <a:extLst>
-              <a:ext uri="{FF2B5EF4-FFF2-40B4-BE49-F238E27FC236}">
-                <a16:creationId xmlns:a16="http://schemas.microsoft.com/office/drawing/2014/main" id="{443A8EDD-16C2-6848-83A6-4582C7B74B70}"/>
-              </a:ext>
-            </a:extLst>
-          </p:cNvPr>
-          <p:cNvPicPr>
-            <a:picLocks noChangeAspect="1" noChangeArrowheads="1"/>
-          </p:cNvPicPr>
-          <p:nvPr/>
-        </p:nvPicPr>
-        <p:blipFill>
-          <a:blip r:embed="rId35" cstate="print">
-            <a:extLst>
-              <a:ext uri="{28A0092B-C50C-407E-A947-70E740481C1C}">
-                <a14:useLocalDpi xmlns:a14="http://schemas.microsoft.com/office/drawing/2010/main" val="0"/>
-              </a:ext>
-            </a:extLst>
-          </a:blip>
-          <a:srcRect/>
-          <a:stretch>
-            <a:fillRect/>
-          </a:stretch>
-        </p:blipFill>
-        <p:spPr bwMode="auto">
-          <a:xfrm>
-            <a:off x="8686800" y="1600200"/>
-            <a:ext cx="762000" cy="762000"/>
-          </a:xfrm>
-          <a:prstGeom prst="rect">
-            <a:avLst/>
-          </a:prstGeom>
-          <a:noFill/>
-          <a:ln>
-            <a:noFill/>
-          </a:ln>
-          <a:extLst>
-            <a:ext uri="{909E8E84-426E-40DD-AFC4-6F175D3DCCD1}">
-              <a14:hiddenFill xmlns:a14="http://schemas.microsoft.com/office/drawing/2010/main">
-                <a:solidFill>
-                  <a:srgbClr val="FFFFFF"/>
-                </a:solidFill>
-              </a14:hiddenFill>
-            </a:ext>
-            <a:ext uri="{91240B29-F687-4F45-9708-019B960494DF}">
-              <a14:hiddenLine xmlns:a14="http://schemas.microsoft.com/office/drawing/2010/main" w="9525">
-                <a:solidFill>
-                  <a:srgbClr val="000000"/>
-                </a:solidFill>
-                <a:miter lim="800000"/>
-                <a:headEnd/>
-                <a:tailEnd/>
-              </a14:hiddenLine>
-            </a:ext>
-          </a:extLst>
-        </p:spPr>
-      </p:pic>
-      <p:sp>
-        <p:nvSpPr>
-          <p:cNvPr id="49" name="TextBox 9">
-            <a:extLst>
-              <a:ext uri="{FF2B5EF4-FFF2-40B4-BE49-F238E27FC236}">
-                <a16:creationId xmlns:a16="http://schemas.microsoft.com/office/drawing/2014/main" id="{F9D6EE48-441C-334D-8184-61EA0808B9C5}"/>
-              </a:ext>
-            </a:extLst>
-          </p:cNvPr>
-          <p:cNvSpPr txBox="1">
-            <a:spLocks noChangeArrowheads="1"/>
-          </p:cNvSpPr>
-          <p:nvPr/>
-        </p:nvSpPr>
-        <p:spPr bwMode="auto">
-          <a:xfrm>
-            <a:off x="7947025" y="2362200"/>
-            <a:ext cx="2243137" cy="276999"/>
-          </a:xfrm>
-          <a:prstGeom prst="rect">
-            <a:avLst/>
-          </a:prstGeom>
-          <a:noFill/>
-          <a:ln>
-            <a:noFill/>
-          </a:ln>
-          <a:extLst>
-            <a:ext uri="{909E8E84-426E-40DD-AFC4-6F175D3DCCD1}">
-              <a14:hiddenFill xmlns:a14="http://schemas.microsoft.com/office/drawing/2010/main">
-                <a:solidFill>
-                  <a:srgbClr val="FFFFFF"/>
-                </a:solidFill>
-              </a14:hiddenFill>
-            </a:ext>
-            <a:ext uri="{91240B29-F687-4F45-9708-019B960494DF}">
-              <a14:hiddenLine xmlns:a14="http://schemas.microsoft.com/office/drawing/2010/main" w="9525">
-                <a:solidFill>
-                  <a:srgbClr val="000000"/>
-                </a:solidFill>
-                <a:miter lim="800000"/>
-                <a:headEnd/>
-                <a:tailEnd/>
-              </a14:hiddenLine>
-            </a:ext>
-          </a:extLst>
-        </p:spPr>
-        <p:txBody>
-          <a:bodyPr>
-            <a:spAutoFit/>
-          </a:bodyPr>
-          <a:lstStyle>
-            <a:lvl1pPr>
-              <a:defRPr>
-                <a:solidFill>
-                  <a:schemeClr val="tx1"/>
-                </a:solidFill>
-                <a:latin typeface="Calibri" panose="020F0502020204030204" pitchFamily="34" charset="0"/>
-              </a:defRPr>
-            </a:lvl1pPr>
-            <a:lvl2pPr marL="742950" indent="-285750">
-              <a:defRPr>
-                <a:solidFill>
-                  <a:schemeClr val="tx1"/>
-                </a:solidFill>
-                <a:latin typeface="Calibri" panose="020F0502020204030204" pitchFamily="34" charset="0"/>
-              </a:defRPr>
-            </a:lvl2pPr>
-            <a:lvl3pPr marL="1143000" indent="-228600">
-              <a:defRPr>
-                <a:solidFill>
-                  <a:schemeClr val="tx1"/>
-                </a:solidFill>
-                <a:latin typeface="Calibri" panose="020F0502020204030204" pitchFamily="34" charset="0"/>
-              </a:defRPr>
-            </a:lvl3pPr>
-            <a:lvl4pPr marL="1600200" indent="-228600">
-              <a:defRPr>
-                <a:solidFill>
-                  <a:schemeClr val="tx1"/>
-                </a:solidFill>
-                <a:latin typeface="Calibri" panose="020F0502020204030204" pitchFamily="34" charset="0"/>
-              </a:defRPr>
-            </a:lvl4pPr>
-            <a:lvl5pPr marL="2057400" indent="-228600">
-              <a:defRPr>
-                <a:solidFill>
-                  <a:schemeClr val="tx1"/>
-                </a:solidFill>
-                <a:latin typeface="Calibri" panose="020F0502020204030204" pitchFamily="34" charset="0"/>
-              </a:defRPr>
-            </a:lvl5pPr>
-            <a:lvl6pPr marL="2514600" indent="-228600" eaLnBrk="0" fontAlgn="base" hangingPunct="0">
-              <a:spcBef>
-                <a:spcPct val="0"/>
-              </a:spcBef>
-              <a:spcAft>
-                <a:spcPct val="0"/>
-              </a:spcAft>
-              <a:defRPr>
-                <a:solidFill>
-                  <a:schemeClr val="tx1"/>
-                </a:solidFill>
-                <a:latin typeface="Calibri" panose="020F0502020204030204" pitchFamily="34" charset="0"/>
-              </a:defRPr>
-            </a:lvl6pPr>
-            <a:lvl7pPr marL="2971800" indent="-228600" eaLnBrk="0" fontAlgn="base" hangingPunct="0">
-              <a:spcBef>
-                <a:spcPct val="0"/>
-              </a:spcBef>
-              <a:spcAft>
-                <a:spcPct val="0"/>
-              </a:spcAft>
-              <a:defRPr>
-                <a:solidFill>
-                  <a:schemeClr val="tx1"/>
-                </a:solidFill>
-                <a:latin typeface="Calibri" panose="020F0502020204030204" pitchFamily="34" charset="0"/>
-              </a:defRPr>
-            </a:lvl7pPr>
-            <a:lvl8pPr marL="3429000" indent="-228600" eaLnBrk="0" fontAlgn="base" hangingPunct="0">
-              <a:spcBef>
-                <a:spcPct val="0"/>
-              </a:spcBef>
-              <a:spcAft>
-                <a:spcPct val="0"/>
-              </a:spcAft>
-              <a:defRPr>
-                <a:solidFill>
-                  <a:schemeClr val="tx1"/>
-                </a:solidFill>
-                <a:latin typeface="Calibri" panose="020F0502020204030204" pitchFamily="34" charset="0"/>
-              </a:defRPr>
-            </a:lvl8pPr>
-            <a:lvl9pPr marL="3886200" indent="-228600" eaLnBrk="0" fontAlgn="base" hangingPunct="0">
-              <a:spcBef>
-                <a:spcPct val="0"/>
-              </a:spcBef>
-              <a:spcAft>
-                <a:spcPct val="0"/>
-              </a:spcAft>
-              <a:defRPr>
-                <a:solidFill>
-                  <a:schemeClr val="tx1"/>
-                </a:solidFill>
-                <a:latin typeface="Calibri" panose="020F0502020204030204" pitchFamily="34" charset="0"/>
-              </a:defRPr>
-            </a:lvl9pPr>
-          </a:lstStyle>
-          <a:p>
-            <a:pPr algn="ctr" eaLnBrk="1" hangingPunct="1"/>
-            <a:r>
-              <a:rPr lang="en-US" altLang="en-US" sz="1200" dirty="0">
-                <a:latin typeface="Arial" panose="020B0604020202020204" pitchFamily="34" charset="0"/>
-                <a:ea typeface="Amazon Ember" panose="020B0603020204020204" pitchFamily="34" charset="0"/>
-                <a:cs typeface="Arial" panose="020B0604020202020204" pitchFamily="34" charset="0"/>
-              </a:rPr>
-              <a:t>Amazon CloudWatch</a:t>
-            </a:r>
-          </a:p>
-        </p:txBody>
-      </p:sp>
+          </p:spPr>
+          <p:txBody>
+            <a:bodyPr>
+              <a:spAutoFit/>
+            </a:bodyPr>
+            <a:lstStyle>
+              <a:lvl1pPr>
+                <a:defRPr>
+                  <a:solidFill>
+                    <a:schemeClr val="tx1"/>
+                  </a:solidFill>
+                  <a:latin typeface="Calibri" panose="020F0502020204030204" pitchFamily="34" charset="0"/>
+                </a:defRPr>
+              </a:lvl1pPr>
+              <a:lvl2pPr marL="742950" indent="-285750">
+                <a:defRPr>
+                  <a:solidFill>
+                    <a:schemeClr val="tx1"/>
+                  </a:solidFill>
+                  <a:latin typeface="Calibri" panose="020F0502020204030204" pitchFamily="34" charset="0"/>
+                </a:defRPr>
+              </a:lvl2pPr>
+              <a:lvl3pPr marL="1143000" indent="-228600">
+                <a:defRPr>
+                  <a:solidFill>
+                    <a:schemeClr val="tx1"/>
+                  </a:solidFill>
+                  <a:latin typeface="Calibri" panose="020F0502020204030204" pitchFamily="34" charset="0"/>
+                </a:defRPr>
+              </a:lvl3pPr>
+              <a:lvl4pPr marL="1600200" indent="-228600">
+                <a:defRPr>
+                  <a:solidFill>
+                    <a:schemeClr val="tx1"/>
+                  </a:solidFill>
+                  <a:latin typeface="Calibri" panose="020F0502020204030204" pitchFamily="34" charset="0"/>
+                </a:defRPr>
+              </a:lvl4pPr>
+              <a:lvl5pPr marL="2057400" indent="-228600">
+                <a:defRPr>
+                  <a:solidFill>
+                    <a:schemeClr val="tx1"/>
+                  </a:solidFill>
+                  <a:latin typeface="Calibri" panose="020F0502020204030204" pitchFamily="34" charset="0"/>
+                </a:defRPr>
+              </a:lvl5pPr>
+              <a:lvl6pPr marL="2514600" indent="-228600" eaLnBrk="0" fontAlgn="base" hangingPunct="0">
+                <a:spcBef>
+                  <a:spcPct val="0"/>
+                </a:spcBef>
+                <a:spcAft>
+                  <a:spcPct val="0"/>
+                </a:spcAft>
+                <a:defRPr>
+                  <a:solidFill>
+                    <a:schemeClr val="tx1"/>
+                  </a:solidFill>
+                  <a:latin typeface="Calibri" panose="020F0502020204030204" pitchFamily="34" charset="0"/>
+                </a:defRPr>
+              </a:lvl6pPr>
+              <a:lvl7pPr marL="2971800" indent="-228600" eaLnBrk="0" fontAlgn="base" hangingPunct="0">
+                <a:spcBef>
+                  <a:spcPct val="0"/>
+                </a:spcBef>
+                <a:spcAft>
+                  <a:spcPct val="0"/>
+                </a:spcAft>
+                <a:defRPr>
+                  <a:solidFill>
+                    <a:schemeClr val="tx1"/>
+                  </a:solidFill>
+                  <a:latin typeface="Calibri" panose="020F0502020204030204" pitchFamily="34" charset="0"/>
+                </a:defRPr>
+              </a:lvl7pPr>
+              <a:lvl8pPr marL="3429000" indent="-228600" eaLnBrk="0" fontAlgn="base" hangingPunct="0">
+                <a:spcBef>
+                  <a:spcPct val="0"/>
+                </a:spcBef>
+                <a:spcAft>
+                  <a:spcPct val="0"/>
+                </a:spcAft>
+                <a:defRPr>
+                  <a:solidFill>
+                    <a:schemeClr val="tx1"/>
+                  </a:solidFill>
+                  <a:latin typeface="Calibri" panose="020F0502020204030204" pitchFamily="34" charset="0"/>
+                </a:defRPr>
+              </a:lvl8pPr>
+              <a:lvl9pPr marL="3886200" indent="-228600" eaLnBrk="0" fontAlgn="base" hangingPunct="0">
+                <a:spcBef>
+                  <a:spcPct val="0"/>
+                </a:spcBef>
+                <a:spcAft>
+                  <a:spcPct val="0"/>
+                </a:spcAft>
+                <a:defRPr>
+                  <a:solidFill>
+                    <a:schemeClr val="tx1"/>
+                  </a:solidFill>
+                  <a:latin typeface="Calibri" panose="020F0502020204030204" pitchFamily="34" charset="0"/>
+                </a:defRPr>
+              </a:lvl9pPr>
+            </a:lstStyle>
+            <a:p>
+              <a:pPr algn="ctr" eaLnBrk="1" hangingPunct="1"/>
+              <a:r>
+                <a:rPr lang="en-US" altLang="en-US" sz="1200" dirty="0">
+                  <a:latin typeface="Arial" panose="020B0604020202020204" pitchFamily="34" charset="0"/>
+                  <a:ea typeface="Amazon Ember" panose="020B0603020204020204" pitchFamily="34" charset="0"/>
+                  <a:cs typeface="Arial" panose="020B0604020202020204" pitchFamily="34" charset="0"/>
+                </a:rPr>
+                <a:t>Amazon CloudWatch</a:t>
+              </a:r>
+            </a:p>
+          </p:txBody>
+        </p:sp>
+      </p:grpSp>
     </p:spTree>
     <p:extLst>
       <p:ext uri="{BB962C8B-B14F-4D97-AF65-F5344CB8AC3E}">
-        <p14:creationId xmlns:p14="http://schemas.microsoft.com/office/powerpoint/2010/main" val="1591469941"/>
+        <p14:creationId xmlns:p14="http://schemas.microsoft.com/office/powerpoint/2010/main" val="2726345019"/>
       </p:ext>
     </p:extLst>
   </p:cSld>
@@ -5303,4 +6516,265 @@
     </a:ext>
   </a:extLst>
 </a:theme>
+</file>
+
+<file path=ppt/theme/theme2.xml><?xml version="1.0" encoding="utf-8"?>
+<a:theme xmlns:a="http://schemas.openxmlformats.org/drawingml/2006/main" name="Office Theme">
+  <a:themeElements>
+    <a:clrScheme name="Office">
+      <a:dk1>
+        <a:sysClr val="windowText" lastClr="000000"/>
+      </a:dk1>
+      <a:lt1>
+        <a:sysClr val="window" lastClr="FFFFFF"/>
+      </a:lt1>
+      <a:dk2>
+        <a:srgbClr val="44546A"/>
+      </a:dk2>
+      <a:lt2>
+        <a:srgbClr val="E7E6E6"/>
+      </a:lt2>
+      <a:accent1>
+        <a:srgbClr val="5B9BD5"/>
+      </a:accent1>
+      <a:accent2>
+        <a:srgbClr val="ED7D31"/>
+      </a:accent2>
+      <a:accent3>
+        <a:srgbClr val="A5A5A5"/>
+      </a:accent3>
+      <a:accent4>
+        <a:srgbClr val="FFC000"/>
+      </a:accent4>
+      <a:accent5>
+        <a:srgbClr val="4472C4"/>
+      </a:accent5>
+      <a:accent6>
+        <a:srgbClr val="70AD47"/>
+      </a:accent6>
+      <a:hlink>
+        <a:srgbClr val="0563C1"/>
+      </a:hlink>
+      <a:folHlink>
+        <a:srgbClr val="954F72"/>
+      </a:folHlink>
+    </a:clrScheme>
+    <a:fontScheme name="Office">
+      <a:majorFont>
+        <a:latin typeface="Calibri Light" panose="020F0302020204030204"/>
+        <a:ea typeface=""/>
+        <a:cs typeface=""/>
+        <a:font script="Jpan" typeface="游ゴシック Light"/>
+        <a:font script="Hang" typeface="맑은 고딕"/>
+        <a:font script="Hans" typeface="等线 Light"/>
+        <a:font script="Hant" typeface="新細明體"/>
+        <a:font script="Arab" typeface="Times New Roman"/>
+        <a:font script="Hebr" typeface="Times New Roman"/>
+        <a:font script="Thai" typeface="Angsana New"/>
+        <a:font script="Ethi" typeface="Nyala"/>
+        <a:font script="Beng" typeface="Vrinda"/>
+        <a:font script="Gujr" typeface="Shruti"/>
+        <a:font script="Khmr" typeface="MoolBoran"/>
+        <a:font script="Knda" typeface="Tunga"/>
+        <a:font script="Guru" typeface="Raavi"/>
+        <a:font script="Cans" typeface="Euphemia"/>
+        <a:font script="Cher" typeface="Plantagenet Cherokee"/>
+        <a:font script="Yiii" typeface="Microsoft Yi Baiti"/>
+        <a:font script="Tibt" typeface="Microsoft Himalaya"/>
+        <a:font script="Thaa" typeface="MV Boli"/>
+        <a:font script="Deva" typeface="Mangal"/>
+        <a:font script="Telu" typeface="Gautami"/>
+        <a:font script="Taml" typeface="Latha"/>
+        <a:font script="Syrc" typeface="Estrangelo Edessa"/>
+        <a:font script="Orya" typeface="Kalinga"/>
+        <a:font script="Mlym" typeface="Kartika"/>
+        <a:font script="Laoo" typeface="DokChampa"/>
+        <a:font script="Sinh" typeface="Iskoola Pota"/>
+        <a:font script="Mong" typeface="Mongolian Baiti"/>
+        <a:font script="Viet" typeface="Times New Roman"/>
+        <a:font script="Uigh" typeface="Microsoft Uighur"/>
+        <a:font script="Geor" typeface="Sylfaen"/>
+      </a:majorFont>
+      <a:minorFont>
+        <a:latin typeface="Calibri" panose="020F0502020204030204"/>
+        <a:ea typeface=""/>
+        <a:cs typeface=""/>
+        <a:font script="Jpan" typeface="游ゴシック"/>
+        <a:font script="Hang" typeface="맑은 고딕"/>
+        <a:font script="Hans" typeface="等线"/>
+        <a:font script="Hant" typeface="新細明體"/>
+        <a:font script="Arab" typeface="Arial"/>
+        <a:font script="Hebr" typeface="Arial"/>
+        <a:font script="Thai" typeface="Cordia New"/>
+        <a:font script="Ethi" typeface="Nyala"/>
+        <a:font script="Beng" typeface="Vrinda"/>
+        <a:font script="Gujr" typeface="Shruti"/>
+        <a:font script="Khmr" typeface="DaunPenh"/>
+        <a:font script="Knda" typeface="Tunga"/>
+        <a:font script="Guru" typeface="Raavi"/>
+        <a:font script="Cans" typeface="Euphemia"/>
+        <a:font script="Cher" typeface="Plantagenet Cherokee"/>
+        <a:font script="Yiii" typeface="Microsoft Yi Baiti"/>
+        <a:font script="Tibt" typeface="Microsoft Himalaya"/>
+        <a:font script="Thaa" typeface="MV Boli"/>
+        <a:font script="Deva" typeface="Mangal"/>
+        <a:font script="Telu" typeface="Gautami"/>
+        <a:font script="Taml" typeface="Latha"/>
+        <a:font script="Syrc" typeface="Estrangelo Edessa"/>
+        <a:font script="Orya" typeface="Kalinga"/>
+        <a:font script="Mlym" typeface="Kartika"/>
+        <a:font script="Laoo" typeface="DokChampa"/>
+        <a:font script="Sinh" typeface="Iskoola Pota"/>
+        <a:font script="Mong" typeface="Mongolian Baiti"/>
+        <a:font script="Viet" typeface="Arial"/>
+        <a:font script="Uigh" typeface="Microsoft Uighur"/>
+        <a:font script="Geor" typeface="Sylfaen"/>
+      </a:minorFont>
+    </a:fontScheme>
+    <a:fmtScheme name="Office">
+      <a:fillStyleLst>
+        <a:solidFill>
+          <a:schemeClr val="phClr"/>
+        </a:solidFill>
+        <a:gradFill rotWithShape="1">
+          <a:gsLst>
+            <a:gs pos="0">
+              <a:schemeClr val="phClr">
+                <a:lumMod val="110000"/>
+                <a:satMod val="105000"/>
+                <a:tint val="67000"/>
+              </a:schemeClr>
+            </a:gs>
+            <a:gs pos="50000">
+              <a:schemeClr val="phClr">
+                <a:lumMod val="105000"/>
+                <a:satMod val="103000"/>
+                <a:tint val="73000"/>
+              </a:schemeClr>
+            </a:gs>
+            <a:gs pos="100000">
+              <a:schemeClr val="phClr">
+                <a:lumMod val="105000"/>
+                <a:satMod val="109000"/>
+                <a:tint val="81000"/>
+              </a:schemeClr>
+            </a:gs>
+          </a:gsLst>
+          <a:lin ang="5400000" scaled="0"/>
+        </a:gradFill>
+        <a:gradFill rotWithShape="1">
+          <a:gsLst>
+            <a:gs pos="0">
+              <a:schemeClr val="phClr">
+                <a:satMod val="103000"/>
+                <a:lumMod val="102000"/>
+                <a:tint val="94000"/>
+              </a:schemeClr>
+            </a:gs>
+            <a:gs pos="50000">
+              <a:schemeClr val="phClr">
+                <a:satMod val="110000"/>
+                <a:lumMod val="100000"/>
+                <a:shade val="100000"/>
+              </a:schemeClr>
+            </a:gs>
+            <a:gs pos="100000">
+              <a:schemeClr val="phClr">
+                <a:lumMod val="99000"/>
+                <a:satMod val="120000"/>
+                <a:shade val="78000"/>
+              </a:schemeClr>
+            </a:gs>
+          </a:gsLst>
+          <a:lin ang="5400000" scaled="0"/>
+        </a:gradFill>
+      </a:fillStyleLst>
+      <a:lnStyleLst>
+        <a:ln w="6350" cap="flat" cmpd="sng" algn="ctr">
+          <a:solidFill>
+            <a:schemeClr val="phClr"/>
+          </a:solidFill>
+          <a:prstDash val="solid"/>
+          <a:miter lim="800000"/>
+        </a:ln>
+        <a:ln w="12700" cap="flat" cmpd="sng" algn="ctr">
+          <a:solidFill>
+            <a:schemeClr val="phClr"/>
+          </a:solidFill>
+          <a:prstDash val="solid"/>
+          <a:miter lim="800000"/>
+        </a:ln>
+        <a:ln w="19050" cap="flat" cmpd="sng" algn="ctr">
+          <a:solidFill>
+            <a:schemeClr val="phClr"/>
+          </a:solidFill>
+          <a:prstDash val="solid"/>
+          <a:miter lim="800000"/>
+        </a:ln>
+      </a:lnStyleLst>
+      <a:effectStyleLst>
+        <a:effectStyle>
+          <a:effectLst/>
+        </a:effectStyle>
+        <a:effectStyle>
+          <a:effectLst/>
+        </a:effectStyle>
+        <a:effectStyle>
+          <a:effectLst>
+            <a:outerShdw blurRad="57150" dist="19050" dir="5400000" algn="ctr" rotWithShape="0">
+              <a:srgbClr val="000000">
+                <a:alpha val="63000"/>
+              </a:srgbClr>
+            </a:outerShdw>
+          </a:effectLst>
+        </a:effectStyle>
+      </a:effectStyleLst>
+      <a:bgFillStyleLst>
+        <a:solidFill>
+          <a:schemeClr val="phClr"/>
+        </a:solidFill>
+        <a:solidFill>
+          <a:schemeClr val="phClr">
+            <a:tint val="95000"/>
+            <a:satMod val="170000"/>
+          </a:schemeClr>
+        </a:solidFill>
+        <a:gradFill rotWithShape="1">
+          <a:gsLst>
+            <a:gs pos="0">
+              <a:schemeClr val="phClr">
+                <a:tint val="93000"/>
+                <a:satMod val="150000"/>
+                <a:shade val="98000"/>
+                <a:lumMod val="102000"/>
+              </a:schemeClr>
+            </a:gs>
+            <a:gs pos="50000">
+              <a:schemeClr val="phClr">
+                <a:tint val="98000"/>
+                <a:satMod val="130000"/>
+                <a:shade val="90000"/>
+                <a:lumMod val="103000"/>
+              </a:schemeClr>
+            </a:gs>
+            <a:gs pos="100000">
+              <a:schemeClr val="phClr">
+                <a:shade val="63000"/>
+                <a:satMod val="120000"/>
+              </a:schemeClr>
+            </a:gs>
+          </a:gsLst>
+          <a:lin ang="5400000" scaled="0"/>
+        </a:gradFill>
+      </a:bgFillStyleLst>
+    </a:fmtScheme>
+  </a:themeElements>
+  <a:objectDefaults/>
+  <a:extraClrSchemeLst/>
+  <a:extLst>
+    <a:ext uri="{05A4C25C-085E-4340-85A3-A5531E510DB2}">
+      <thm15:themeFamily xmlns:thm15="http://schemas.microsoft.com/office/thememl/2012/main" name="Office Theme" id="{62F939B6-93AF-4DB8-9C6B-D6C7DFDC589F}" vid="{4A3C46E8-61CC-4603-A589-7422A47A8E4A}"/>
+    </a:ext>
+  </a:extLst>
+</a:theme>
 </file>
</xml_diff>